<commit_message>
The Icon Game v3
</commit_message>
<xml_diff>
--- a/The Azure Icon Game.pptx
+++ b/The Azure Icon Game.pptx
@@ -9,38 +9,44 @@
     <p:sldId id="260" r:id="rId3"/>
     <p:sldId id="302" r:id="rId4"/>
     <p:sldId id="274" r:id="rId5"/>
-    <p:sldId id="300" r:id="rId6"/>
-    <p:sldId id="288" r:id="rId7"/>
-    <p:sldId id="290" r:id="rId8"/>
-    <p:sldId id="301" r:id="rId9"/>
-    <p:sldId id="272" r:id="rId10"/>
-    <p:sldId id="297" r:id="rId11"/>
-    <p:sldId id="271" r:id="rId12"/>
-    <p:sldId id="273" r:id="rId13"/>
-    <p:sldId id="299" r:id="rId14"/>
-    <p:sldId id="275" r:id="rId15"/>
-    <p:sldId id="276" r:id="rId16"/>
-    <p:sldId id="294" r:id="rId17"/>
-    <p:sldId id="304" r:id="rId18"/>
-    <p:sldId id="282" r:id="rId19"/>
-    <p:sldId id="283" r:id="rId20"/>
-    <p:sldId id="298" r:id="rId21"/>
-    <p:sldId id="278" r:id="rId22"/>
-    <p:sldId id="284" r:id="rId23"/>
-    <p:sldId id="285" r:id="rId24"/>
-    <p:sldId id="279" r:id="rId25"/>
-    <p:sldId id="281" r:id="rId26"/>
-    <p:sldId id="289" r:id="rId27"/>
-    <p:sldId id="280" r:id="rId28"/>
-    <p:sldId id="295" r:id="rId29"/>
-    <p:sldId id="286" r:id="rId30"/>
-    <p:sldId id="287" r:id="rId31"/>
-    <p:sldId id="291" r:id="rId32"/>
-    <p:sldId id="303" r:id="rId33"/>
-    <p:sldId id="296" r:id="rId34"/>
-    <p:sldId id="266" r:id="rId35"/>
-    <p:sldId id="293" r:id="rId36"/>
-    <p:sldId id="269" r:id="rId37"/>
+    <p:sldId id="306" r:id="rId6"/>
+    <p:sldId id="300" r:id="rId7"/>
+    <p:sldId id="308" r:id="rId8"/>
+    <p:sldId id="288" r:id="rId9"/>
+    <p:sldId id="290" r:id="rId10"/>
+    <p:sldId id="272" r:id="rId11"/>
+    <p:sldId id="297" r:id="rId12"/>
+    <p:sldId id="313" r:id="rId13"/>
+    <p:sldId id="271" r:id="rId14"/>
+    <p:sldId id="273" r:id="rId15"/>
+    <p:sldId id="309" r:id="rId16"/>
+    <p:sldId id="299" r:id="rId17"/>
+    <p:sldId id="276" r:id="rId18"/>
+    <p:sldId id="294" r:id="rId19"/>
+    <p:sldId id="304" r:id="rId20"/>
+    <p:sldId id="282" r:id="rId21"/>
+    <p:sldId id="283" r:id="rId22"/>
+    <p:sldId id="298" r:id="rId23"/>
+    <p:sldId id="278" r:id="rId24"/>
+    <p:sldId id="284" r:id="rId25"/>
+    <p:sldId id="285" r:id="rId26"/>
+    <p:sldId id="279" r:id="rId27"/>
+    <p:sldId id="281" r:id="rId28"/>
+    <p:sldId id="289" r:id="rId29"/>
+    <p:sldId id="280" r:id="rId30"/>
+    <p:sldId id="295" r:id="rId31"/>
+    <p:sldId id="286" r:id="rId32"/>
+    <p:sldId id="287" r:id="rId33"/>
+    <p:sldId id="291" r:id="rId34"/>
+    <p:sldId id="303" r:id="rId35"/>
+    <p:sldId id="307" r:id="rId36"/>
+    <p:sldId id="310" r:id="rId37"/>
+    <p:sldId id="311" r:id="rId38"/>
+    <p:sldId id="312" r:id="rId39"/>
+    <p:sldId id="296" r:id="rId40"/>
+    <p:sldId id="266" r:id="rId41"/>
+    <p:sldId id="305" r:id="rId42"/>
+    <p:sldId id="269" r:id="rId43"/>
   </p:sldIdLst>
   <p:sldSz cx="12192000" cy="6858000"/>
   <p:notesSz cx="6858000" cy="9144000"/>
@@ -296,7 +302,7 @@
           <a:p>
             <a:fld id="{8CD9E07E-FA0D-404F-8FFA-F4C9C459F055}" type="datetimeFigureOut">
               <a:rPr lang="en-GB" smtClean="0"/>
-              <a:t>07/11/2019</a:t>
+              <a:t>16/03/2020</a:t>
             </a:fld>
             <a:endParaRPr lang="en-GB" dirty="0"/>
           </a:p>
@@ -496,7 +502,7 @@
           <a:p>
             <a:fld id="{8CD9E07E-FA0D-404F-8FFA-F4C9C459F055}" type="datetimeFigureOut">
               <a:rPr lang="en-GB" smtClean="0"/>
-              <a:t>07/11/2019</a:t>
+              <a:t>16/03/2020</a:t>
             </a:fld>
             <a:endParaRPr lang="en-GB" dirty="0"/>
           </a:p>
@@ -706,7 +712,7 @@
           <a:p>
             <a:fld id="{8CD9E07E-FA0D-404F-8FFA-F4C9C459F055}" type="datetimeFigureOut">
               <a:rPr lang="en-GB" smtClean="0"/>
-              <a:t>07/11/2019</a:t>
+              <a:t>16/03/2020</a:t>
             </a:fld>
             <a:endParaRPr lang="en-GB" dirty="0"/>
           </a:p>
@@ -906,7 +912,7 @@
           <a:p>
             <a:fld id="{8CD9E07E-FA0D-404F-8FFA-F4C9C459F055}" type="datetimeFigureOut">
               <a:rPr lang="en-GB" smtClean="0"/>
-              <a:t>07/11/2019</a:t>
+              <a:t>16/03/2020</a:t>
             </a:fld>
             <a:endParaRPr lang="en-GB" dirty="0"/>
           </a:p>
@@ -1182,7 +1188,7 @@
           <a:p>
             <a:fld id="{8CD9E07E-FA0D-404F-8FFA-F4C9C459F055}" type="datetimeFigureOut">
               <a:rPr lang="en-GB" smtClean="0"/>
-              <a:t>07/11/2019</a:t>
+              <a:t>16/03/2020</a:t>
             </a:fld>
             <a:endParaRPr lang="en-GB" dirty="0"/>
           </a:p>
@@ -1450,7 +1456,7 @@
           <a:p>
             <a:fld id="{8CD9E07E-FA0D-404F-8FFA-F4C9C459F055}" type="datetimeFigureOut">
               <a:rPr lang="en-GB" smtClean="0"/>
-              <a:t>07/11/2019</a:t>
+              <a:t>16/03/2020</a:t>
             </a:fld>
             <a:endParaRPr lang="en-GB" dirty="0"/>
           </a:p>
@@ -1865,7 +1871,7 @@
           <a:p>
             <a:fld id="{8CD9E07E-FA0D-404F-8FFA-F4C9C459F055}" type="datetimeFigureOut">
               <a:rPr lang="en-GB" smtClean="0"/>
-              <a:t>07/11/2019</a:t>
+              <a:t>16/03/2020</a:t>
             </a:fld>
             <a:endParaRPr lang="en-GB" dirty="0"/>
           </a:p>
@@ -2007,7 +2013,7 @@
           <a:p>
             <a:fld id="{8CD9E07E-FA0D-404F-8FFA-F4C9C459F055}" type="datetimeFigureOut">
               <a:rPr lang="en-GB" smtClean="0"/>
-              <a:t>07/11/2019</a:t>
+              <a:t>16/03/2020</a:t>
             </a:fld>
             <a:endParaRPr lang="en-GB" dirty="0"/>
           </a:p>
@@ -2120,7 +2126,7 @@
           <a:p>
             <a:fld id="{8CD9E07E-FA0D-404F-8FFA-F4C9C459F055}" type="datetimeFigureOut">
               <a:rPr lang="en-GB" smtClean="0"/>
-              <a:t>07/11/2019</a:t>
+              <a:t>16/03/2020</a:t>
             </a:fld>
             <a:endParaRPr lang="en-GB" dirty="0"/>
           </a:p>
@@ -2433,7 +2439,7 @@
           <a:p>
             <a:fld id="{8CD9E07E-FA0D-404F-8FFA-F4C9C459F055}" type="datetimeFigureOut">
               <a:rPr lang="en-GB" smtClean="0"/>
-              <a:t>07/11/2019</a:t>
+              <a:t>16/03/2020</a:t>
             </a:fld>
             <a:endParaRPr lang="en-GB" dirty="0"/>
           </a:p>
@@ -2722,7 +2728,7 @@
           <a:p>
             <a:fld id="{8CD9E07E-FA0D-404F-8FFA-F4C9C459F055}" type="datetimeFigureOut">
               <a:rPr lang="en-GB" smtClean="0"/>
-              <a:t>07/11/2019</a:t>
+              <a:t>16/03/2020</a:t>
             </a:fld>
             <a:endParaRPr lang="en-GB" dirty="0"/>
           </a:p>
@@ -2965,7 +2971,7 @@
           <a:p>
             <a:fld id="{8CD9E07E-FA0D-404F-8FFA-F4C9C459F055}" type="datetimeFigureOut">
               <a:rPr lang="en-GB" smtClean="0"/>
-              <a:t>07/11/2019</a:t>
+              <a:t>16/03/2020</a:t>
             </a:fld>
             <a:endParaRPr lang="en-GB" dirty="0"/>
           </a:p>
@@ -3384,10 +3390,10 @@
       </p:grpSpPr>
       <p:pic>
         <p:nvPicPr>
-          <p:cNvPr id="3" name="Picture 2">
-            <a:extLst>
-              <a:ext uri="{FF2B5EF4-FFF2-40B4-BE49-F238E27FC236}">
-                <a16:creationId xmlns:a16="http://schemas.microsoft.com/office/drawing/2014/main" id="{FCD69902-4B9B-4E07-8E56-2CDE55B6B45A}"/>
+          <p:cNvPr id="6" name="Picture 5">
+            <a:extLst>
+              <a:ext uri="{FF2B5EF4-FFF2-40B4-BE49-F238E27FC236}">
+                <a16:creationId xmlns:a16="http://schemas.microsoft.com/office/drawing/2014/main" id="{E2886EE7-822F-4525-8AC1-23E25342C267}"/>
               </a:ext>
             </a:extLst>
           </p:cNvPr>
@@ -3404,7 +3410,7 @@
         </p:blipFill>
         <p:spPr>
           <a:xfrm>
-            <a:off x="0" y="0"/>
+            <a:off x="-1" y="0"/>
             <a:ext cx="12192000" cy="6858000"/>
           </a:xfrm>
           <a:prstGeom prst="rect">
@@ -3738,10 +3744,10 @@
       </p:grpSpPr>
       <p:pic>
         <p:nvPicPr>
-          <p:cNvPr id="2" name="Picture 1">
-            <a:extLst>
-              <a:ext uri="{FF2B5EF4-FFF2-40B4-BE49-F238E27FC236}">
-                <a16:creationId xmlns:a16="http://schemas.microsoft.com/office/drawing/2014/main" id="{92977E48-CC7E-41E7-8A92-76D1AC757A1F}"/>
+          <p:cNvPr id="4" name="Graphic 3">
+            <a:extLst>
+              <a:ext uri="{FF2B5EF4-FFF2-40B4-BE49-F238E27FC236}">
+                <a16:creationId xmlns:a16="http://schemas.microsoft.com/office/drawing/2014/main" id="{FA15A619-EFBC-48F5-9207-66D55EB71AB8}"/>
               </a:ext>
             </a:extLst>
           </p:cNvPr>
@@ -3751,15 +3757,24 @@
           <p:nvPr/>
         </p:nvPicPr>
         <p:blipFill>
-          <a:blip r:embed="rId2"/>
+          <a:blip r:embed="rId2">
+            <a:extLst>
+              <a:ext uri="{28A0092B-C50C-407E-A947-70E740481C1C}">
+                <a14:useLocalDpi xmlns:a14="http://schemas.microsoft.com/office/drawing/2010/main" val="0"/>
+              </a:ext>
+              <a:ext uri="{96DAC541-7B7A-43D3-8B79-37D633B846F1}">
+                <asvg:svgBlip xmlns:asvg="http://schemas.microsoft.com/office/drawing/2016/SVG/main" r:embed="rId3"/>
+              </a:ext>
+            </a:extLst>
+          </a:blip>
           <a:stretch>
             <a:fillRect/>
           </a:stretch>
         </p:blipFill>
         <p:spPr>
           <a:xfrm>
-            <a:off x="2261887" y="590133"/>
-            <a:ext cx="7668226" cy="5677734"/>
+            <a:off x="2671010" y="8021"/>
+            <a:ext cx="6849979" cy="6849979"/>
           </a:xfrm>
           <a:prstGeom prst="rect">
             <a:avLst/>
@@ -3853,7 +3868,264 @@
                 </a:effectLst>
                 <a:latin typeface="Segoe UI Light"/>
               </a:rPr>
-              <a:t>Azure Kubernetes Service</a:t>
+              <a:t>Azure Active Directory</a:t>
+            </a:r>
+          </a:p>
+        </p:txBody>
+      </p:sp>
+    </p:spTree>
+    <p:extLst>
+      <p:ext uri="{BB962C8B-B14F-4D97-AF65-F5344CB8AC3E}">
+        <p14:creationId xmlns:p14="http://schemas.microsoft.com/office/powerpoint/2010/main" val="2470710082"/>
+      </p:ext>
+    </p:extLst>
+  </p:cSld>
+  <p:clrMapOvr>
+    <a:masterClrMapping/>
+  </p:clrMapOvr>
+  <p:timing>
+    <p:tnLst>
+      <p:par>
+        <p:cTn id="1" dur="indefinite" restart="never" nodeType="tmRoot">
+          <p:childTnLst>
+            <p:seq concurrent="1" nextAc="seek">
+              <p:cTn id="2" dur="indefinite" nodeType="mainSeq">
+                <p:childTnLst>
+                  <p:par>
+                    <p:cTn id="3" fill="hold">
+                      <p:stCondLst>
+                        <p:cond delay="indefinite"/>
+                      </p:stCondLst>
+                      <p:childTnLst>
+                        <p:par>
+                          <p:cTn id="4" fill="hold">
+                            <p:stCondLst>
+                              <p:cond delay="0"/>
+                            </p:stCondLst>
+                            <p:childTnLst>
+                              <p:par>
+                                <p:cTn id="5" presetID="10" presetClass="entr" presetSubtype="0" fill="hold" grpId="0" nodeType="clickEffect">
+                                  <p:stCondLst>
+                                    <p:cond delay="0"/>
+                                  </p:stCondLst>
+                                  <p:childTnLst>
+                                    <p:set>
+                                      <p:cBhvr>
+                                        <p:cTn id="6" dur="1" fill="hold">
+                                          <p:stCondLst>
+                                            <p:cond delay="0"/>
+                                          </p:stCondLst>
+                                        </p:cTn>
+                                        <p:tgtEl>
+                                          <p:spTgt spid="9"/>
+                                        </p:tgtEl>
+                                        <p:attrNameLst>
+                                          <p:attrName>style.visibility</p:attrName>
+                                        </p:attrNameLst>
+                                      </p:cBhvr>
+                                      <p:to>
+                                        <p:strVal val="visible"/>
+                                      </p:to>
+                                    </p:set>
+                                    <p:animEffect transition="in" filter="fade">
+                                      <p:cBhvr>
+                                        <p:cTn id="7" dur="500"/>
+                                        <p:tgtEl>
+                                          <p:spTgt spid="9"/>
+                                        </p:tgtEl>
+                                      </p:cBhvr>
+                                    </p:animEffect>
+                                  </p:childTnLst>
+                                </p:cTn>
+                              </p:par>
+                            </p:childTnLst>
+                          </p:cTn>
+                        </p:par>
+                      </p:childTnLst>
+                    </p:cTn>
+                  </p:par>
+                </p:childTnLst>
+              </p:cTn>
+              <p:prevCondLst>
+                <p:cond evt="onPrev" delay="0">
+                  <p:tgtEl>
+                    <p:sldTgt/>
+                  </p:tgtEl>
+                </p:cond>
+              </p:prevCondLst>
+              <p:nextCondLst>
+                <p:cond evt="onNext" delay="0">
+                  <p:tgtEl>
+                    <p:sldTgt/>
+                  </p:tgtEl>
+                </p:cond>
+              </p:nextCondLst>
+            </p:seq>
+          </p:childTnLst>
+        </p:cTn>
+      </p:par>
+    </p:tnLst>
+    <p:bldLst>
+      <p:bldP spid="9" grpId="0" animBg="1"/>
+    </p:bldLst>
+  </p:timing>
+</p:sld>
+</file>
+
+<file path=ppt/slides/slide11.xml><?xml version="1.0" encoding="utf-8"?>
+<p:sld xmlns:a="http://schemas.openxmlformats.org/drawingml/2006/main" xmlns:r="http://schemas.openxmlformats.org/officeDocument/2006/relationships" xmlns:p="http://schemas.openxmlformats.org/presentationml/2006/main">
+  <p:cSld>
+    <p:bg>
+      <p:bgPr>
+        <a:solidFill>
+          <a:schemeClr val="bg1">
+            <a:alpha val="50000"/>
+          </a:schemeClr>
+        </a:solidFill>
+        <a:effectLst/>
+      </p:bgPr>
+    </p:bg>
+    <p:spTree>
+      <p:nvGrpSpPr>
+        <p:cNvPr id="1" name=""/>
+        <p:cNvGrpSpPr/>
+        <p:nvPr/>
+      </p:nvGrpSpPr>
+      <p:grpSpPr>
+        <a:xfrm>
+          <a:off x="0" y="0"/>
+          <a:ext cx="0" cy="0"/>
+          <a:chOff x="0" y="0"/>
+          <a:chExt cx="0" cy="0"/>
+        </a:xfrm>
+      </p:grpSpPr>
+      <p:pic>
+        <p:nvPicPr>
+          <p:cNvPr id="4" name="Graphic 3">
+            <a:extLst>
+              <a:ext uri="{FF2B5EF4-FFF2-40B4-BE49-F238E27FC236}">
+                <a16:creationId xmlns:a16="http://schemas.microsoft.com/office/drawing/2014/main" id="{0F1F3EBC-10BA-45D8-84EC-A6A26C1A2734}"/>
+              </a:ext>
+            </a:extLst>
+          </p:cNvPr>
+          <p:cNvPicPr>
+            <a:picLocks noChangeAspect="1"/>
+          </p:cNvPicPr>
+          <p:nvPr/>
+        </p:nvPicPr>
+        <p:blipFill>
+          <a:blip r:embed="rId2">
+            <a:extLst>
+              <a:ext uri="{28A0092B-C50C-407E-A947-70E740481C1C}">
+                <a14:useLocalDpi xmlns:a14="http://schemas.microsoft.com/office/drawing/2010/main" val="0"/>
+              </a:ext>
+              <a:ext uri="{96DAC541-7B7A-43D3-8B79-37D633B846F1}">
+                <asvg:svgBlip xmlns:asvg="http://schemas.microsoft.com/office/drawing/2016/SVG/main" r:embed="rId3"/>
+              </a:ext>
+            </a:extLst>
+          </a:blip>
+          <a:stretch>
+            <a:fillRect/>
+          </a:stretch>
+        </p:blipFill>
+        <p:spPr>
+          <a:xfrm>
+            <a:off x="2695074" y="28074"/>
+            <a:ext cx="6801852" cy="6801852"/>
+          </a:xfrm>
+          <a:prstGeom prst="rect">
+            <a:avLst/>
+          </a:prstGeom>
+        </p:spPr>
+      </p:pic>
+      <p:sp>
+        <p:nvSpPr>
+          <p:cNvPr id="9" name="Title 2">
+            <a:extLst>
+              <a:ext uri="{FF2B5EF4-FFF2-40B4-BE49-F238E27FC236}">
+                <a16:creationId xmlns:a16="http://schemas.microsoft.com/office/drawing/2014/main" id="{CB877719-98D4-4914-B56E-634238E5C0E6}"/>
+              </a:ext>
+            </a:extLst>
+          </p:cNvPr>
+          <p:cNvSpPr txBox="1">
+            <a:spLocks/>
+          </p:cNvSpPr>
+          <p:nvPr/>
+        </p:nvSpPr>
+        <p:spPr>
+          <a:xfrm>
+            <a:off x="1" y="2834881"/>
+            <a:ext cx="12191999" cy="1191639"/>
+          </a:xfrm>
+          <a:prstGeom prst="rect">
+            <a:avLst/>
+          </a:prstGeom>
+          <a:solidFill>
+            <a:schemeClr val="bg1">
+              <a:alpha val="50000"/>
+            </a:schemeClr>
+          </a:solidFill>
+        </p:spPr>
+        <p:txBody>
+          <a:bodyPr vert="horz" wrap="square" lIns="143428" tIns="89642" rIns="143428" bIns="89642" rtlCol="0" anchor="t" anchorCtr="0">
+            <a:noAutofit/>
+          </a:bodyPr>
+          <a:lstStyle>
+            <a:lvl1pPr algn="l" defTabSz="932578" rtl="0" eaLnBrk="1" latinLnBrk="0" hangingPunct="1">
+              <a:lnSpc>
+                <a:spcPct val="90000"/>
+              </a:lnSpc>
+              <a:spcBef>
+                <a:spcPct val="0"/>
+              </a:spcBef>
+              <a:buNone/>
+              <a:defRPr lang="en-US" sz="5999" b="0" kern="1200" cap="none" spc="-100" baseline="0">
+                <a:ln w="3175">
+                  <a:noFill/>
+                </a:ln>
+                <a:gradFill>
+                  <a:gsLst>
+                    <a:gs pos="3333">
+                      <a:schemeClr val="tx1"/>
+                    </a:gs>
+                    <a:gs pos="39000">
+                      <a:schemeClr val="tx1"/>
+                    </a:gs>
+                  </a:gsLst>
+                  <a:lin ang="5400000" scaled="0"/>
+                </a:gradFill>
+                <a:effectLst/>
+                <a:latin typeface="+mj-lt"/>
+                <a:ea typeface="+mn-ea"/>
+                <a:cs typeface="Segoe UI" pitchFamily="34" charset="0"/>
+              </a:defRPr>
+            </a:lvl1pPr>
+          </a:lstStyle>
+          <a:p>
+            <a:pPr algn="ctr">
+              <a:spcBef>
+                <a:spcPts val="1200"/>
+              </a:spcBef>
+              <a:spcAft>
+                <a:spcPts val="1200"/>
+              </a:spcAft>
+              <a:defRPr/>
+            </a:pPr>
+            <a:r>
+              <a:rPr lang="en-GB" sz="7200" b="1" dirty="0">
+                <a:solidFill>
+                  <a:schemeClr val="tx1"/>
+                </a:solidFill>
+                <a:effectLst>
+                  <a:outerShdw blurRad="38100" dist="38100" dir="2700000" algn="tl">
+                    <a:srgbClr val="000000">
+                      <a:alpha val="43137"/>
+                    </a:srgbClr>
+                  </a:outerShdw>
+                </a:effectLst>
+                <a:latin typeface="Segoe UI Light"/>
+              </a:rPr>
+              <a:t>Kubernetes</a:t>
             </a:r>
           </a:p>
         </p:txBody>
@@ -3957,9 +4229,19 @@
 </p:sld>
 </file>
 
-<file path=ppt/slides/slide11.xml><?xml version="1.0" encoding="utf-8"?>
+<file path=ppt/slides/slide12.xml><?xml version="1.0" encoding="utf-8"?>
 <p:sld xmlns:a="http://schemas.openxmlformats.org/drawingml/2006/main" xmlns:r="http://schemas.openxmlformats.org/officeDocument/2006/relationships" xmlns:p="http://schemas.openxmlformats.org/presentationml/2006/main">
   <p:cSld>
+    <p:bg>
+      <p:bgPr>
+        <a:solidFill>
+          <a:schemeClr val="bg1">
+            <a:alpha val="50000"/>
+          </a:schemeClr>
+        </a:solidFill>
+        <a:effectLst/>
+      </p:bgPr>
+    </p:bg>
     <p:spTree>
       <p:nvGrpSpPr>
         <p:cNvPr id="1" name=""/>
@@ -3976,10 +4258,10 @@
       </p:grpSpPr>
       <p:pic>
         <p:nvPicPr>
-          <p:cNvPr id="2" name="Picture 1">
-            <a:extLst>
-              <a:ext uri="{FF2B5EF4-FFF2-40B4-BE49-F238E27FC236}">
-                <a16:creationId xmlns:a16="http://schemas.microsoft.com/office/drawing/2014/main" id="{CC99171C-6DDA-4CB5-A423-1200CB9949F8}"/>
+          <p:cNvPr id="3" name="Graphic 2">
+            <a:extLst>
+              <a:ext uri="{FF2B5EF4-FFF2-40B4-BE49-F238E27FC236}">
+                <a16:creationId xmlns:a16="http://schemas.microsoft.com/office/drawing/2014/main" id="{376E6864-76B2-477F-92EC-131D77423139}"/>
               </a:ext>
             </a:extLst>
           </p:cNvPr>
@@ -3989,15 +4271,24 @@
           <p:nvPr/>
         </p:nvPicPr>
         <p:blipFill>
-          <a:blip r:embed="rId2"/>
+          <a:blip r:embed="rId2">
+            <a:extLst>
+              <a:ext uri="{28A0092B-C50C-407E-A947-70E740481C1C}">
+                <a14:useLocalDpi xmlns:a14="http://schemas.microsoft.com/office/drawing/2010/main" val="0"/>
+              </a:ext>
+              <a:ext uri="{96DAC541-7B7A-43D3-8B79-37D633B846F1}">
+                <asvg:svgBlip xmlns:asvg="http://schemas.microsoft.com/office/drawing/2016/SVG/main" r:embed="rId3"/>
+              </a:ext>
+            </a:extLst>
+          </a:blip>
           <a:stretch>
             <a:fillRect/>
           </a:stretch>
         </p:blipFill>
         <p:spPr>
           <a:xfrm>
-            <a:off x="2015405" y="0"/>
-            <a:ext cx="8161190" cy="6858000"/>
+            <a:off x="2711116" y="44116"/>
+            <a:ext cx="6769768" cy="6769768"/>
           </a:xfrm>
           <a:prstGeom prst="rect">
             <a:avLst/>
@@ -4091,7 +4382,7 @@
                 </a:effectLst>
                 <a:latin typeface="Segoe UI Light"/>
               </a:rPr>
-              <a:t>Resource Group</a:t>
+              <a:t>Blockchain</a:t>
             </a:r>
           </a:p>
         </p:txBody>
@@ -4099,245 +4390,7 @@
     </p:spTree>
     <p:extLst>
       <p:ext uri="{BB962C8B-B14F-4D97-AF65-F5344CB8AC3E}">
-        <p14:creationId xmlns:p14="http://schemas.microsoft.com/office/powerpoint/2010/main" val="2295619804"/>
-      </p:ext>
-    </p:extLst>
-  </p:cSld>
-  <p:clrMapOvr>
-    <a:masterClrMapping/>
-  </p:clrMapOvr>
-  <p:timing>
-    <p:tnLst>
-      <p:par>
-        <p:cTn id="1" dur="indefinite" restart="never" nodeType="tmRoot">
-          <p:childTnLst>
-            <p:seq concurrent="1" nextAc="seek">
-              <p:cTn id="2" dur="indefinite" nodeType="mainSeq">
-                <p:childTnLst>
-                  <p:par>
-                    <p:cTn id="3" fill="hold">
-                      <p:stCondLst>
-                        <p:cond delay="indefinite"/>
-                      </p:stCondLst>
-                      <p:childTnLst>
-                        <p:par>
-                          <p:cTn id="4" fill="hold">
-                            <p:stCondLst>
-                              <p:cond delay="0"/>
-                            </p:stCondLst>
-                            <p:childTnLst>
-                              <p:par>
-                                <p:cTn id="5" presetID="10" presetClass="entr" presetSubtype="0" fill="hold" grpId="0" nodeType="clickEffect">
-                                  <p:stCondLst>
-                                    <p:cond delay="0"/>
-                                  </p:stCondLst>
-                                  <p:childTnLst>
-                                    <p:set>
-                                      <p:cBhvr>
-                                        <p:cTn id="6" dur="1" fill="hold">
-                                          <p:stCondLst>
-                                            <p:cond delay="0"/>
-                                          </p:stCondLst>
-                                        </p:cTn>
-                                        <p:tgtEl>
-                                          <p:spTgt spid="9"/>
-                                        </p:tgtEl>
-                                        <p:attrNameLst>
-                                          <p:attrName>style.visibility</p:attrName>
-                                        </p:attrNameLst>
-                                      </p:cBhvr>
-                                      <p:to>
-                                        <p:strVal val="visible"/>
-                                      </p:to>
-                                    </p:set>
-                                    <p:animEffect transition="in" filter="fade">
-                                      <p:cBhvr>
-                                        <p:cTn id="7" dur="500"/>
-                                        <p:tgtEl>
-                                          <p:spTgt spid="9"/>
-                                        </p:tgtEl>
-                                      </p:cBhvr>
-                                    </p:animEffect>
-                                  </p:childTnLst>
-                                </p:cTn>
-                              </p:par>
-                            </p:childTnLst>
-                          </p:cTn>
-                        </p:par>
-                      </p:childTnLst>
-                    </p:cTn>
-                  </p:par>
-                </p:childTnLst>
-              </p:cTn>
-              <p:prevCondLst>
-                <p:cond evt="onPrev" delay="0">
-                  <p:tgtEl>
-                    <p:sldTgt/>
-                  </p:tgtEl>
-                </p:cond>
-              </p:prevCondLst>
-              <p:nextCondLst>
-                <p:cond evt="onNext" delay="0">
-                  <p:tgtEl>
-                    <p:sldTgt/>
-                  </p:tgtEl>
-                </p:cond>
-              </p:nextCondLst>
-            </p:seq>
-          </p:childTnLst>
-        </p:cTn>
-      </p:par>
-    </p:tnLst>
-    <p:bldLst>
-      <p:bldP spid="9" grpId="0" animBg="1"/>
-    </p:bldLst>
-  </p:timing>
-</p:sld>
-</file>
-
-<file path=ppt/slides/slide12.xml><?xml version="1.0" encoding="utf-8"?>
-<p:sld xmlns:a="http://schemas.openxmlformats.org/drawingml/2006/main" xmlns:r="http://schemas.openxmlformats.org/officeDocument/2006/relationships" xmlns:p="http://schemas.openxmlformats.org/presentationml/2006/main">
-  <p:cSld>
-    <p:spTree>
-      <p:nvGrpSpPr>
-        <p:cNvPr id="1" name=""/>
-        <p:cNvGrpSpPr/>
-        <p:nvPr/>
-      </p:nvGrpSpPr>
-      <p:grpSpPr>
-        <a:xfrm>
-          <a:off x="0" y="0"/>
-          <a:ext cx="0" cy="0"/>
-          <a:chOff x="0" y="0"/>
-          <a:chExt cx="0" cy="0"/>
-        </a:xfrm>
-      </p:grpSpPr>
-      <p:pic>
-        <p:nvPicPr>
-          <p:cNvPr id="2" name="Picture 1">
-            <a:extLst>
-              <a:ext uri="{FF2B5EF4-FFF2-40B4-BE49-F238E27FC236}">
-                <a16:creationId xmlns:a16="http://schemas.microsoft.com/office/drawing/2014/main" id="{DFCBF99B-DEED-4980-8C79-B1BD2293E22B}"/>
-              </a:ext>
-            </a:extLst>
-          </p:cNvPr>
-          <p:cNvPicPr>
-            <a:picLocks noChangeAspect="1"/>
-          </p:cNvPicPr>
-          <p:nvPr/>
-        </p:nvPicPr>
-        <p:blipFill>
-          <a:blip r:embed="rId2"/>
-          <a:stretch>
-            <a:fillRect/>
-          </a:stretch>
-        </p:blipFill>
-        <p:spPr>
-          <a:xfrm>
-            <a:off x="1396059" y="717733"/>
-            <a:ext cx="9399882" cy="5422534"/>
-          </a:xfrm>
-          <a:prstGeom prst="rect">
-            <a:avLst/>
-          </a:prstGeom>
-        </p:spPr>
-      </p:pic>
-      <p:sp>
-        <p:nvSpPr>
-          <p:cNvPr id="9" name="Title 2">
-            <a:extLst>
-              <a:ext uri="{FF2B5EF4-FFF2-40B4-BE49-F238E27FC236}">
-                <a16:creationId xmlns:a16="http://schemas.microsoft.com/office/drawing/2014/main" id="{CB877719-98D4-4914-B56E-634238E5C0E6}"/>
-              </a:ext>
-            </a:extLst>
-          </p:cNvPr>
-          <p:cNvSpPr txBox="1">
-            <a:spLocks/>
-          </p:cNvSpPr>
-          <p:nvPr/>
-        </p:nvSpPr>
-        <p:spPr>
-          <a:xfrm>
-            <a:off x="1" y="2834881"/>
-            <a:ext cx="12191999" cy="1191639"/>
-          </a:xfrm>
-          <a:prstGeom prst="rect">
-            <a:avLst/>
-          </a:prstGeom>
-          <a:solidFill>
-            <a:schemeClr val="bg1">
-              <a:alpha val="50000"/>
-            </a:schemeClr>
-          </a:solidFill>
-        </p:spPr>
-        <p:txBody>
-          <a:bodyPr vert="horz" wrap="square" lIns="143428" tIns="89642" rIns="143428" bIns="89642" rtlCol="0" anchor="t" anchorCtr="0">
-            <a:noAutofit/>
-          </a:bodyPr>
-          <a:lstStyle>
-            <a:lvl1pPr algn="l" defTabSz="932578" rtl="0" eaLnBrk="1" latinLnBrk="0" hangingPunct="1">
-              <a:lnSpc>
-                <a:spcPct val="90000"/>
-              </a:lnSpc>
-              <a:spcBef>
-                <a:spcPct val="0"/>
-              </a:spcBef>
-              <a:buNone/>
-              <a:defRPr lang="en-US" sz="5999" b="0" kern="1200" cap="none" spc="-100" baseline="0">
-                <a:ln w="3175">
-                  <a:noFill/>
-                </a:ln>
-                <a:gradFill>
-                  <a:gsLst>
-                    <a:gs pos="3333">
-                      <a:schemeClr val="tx1"/>
-                    </a:gs>
-                    <a:gs pos="39000">
-                      <a:schemeClr val="tx1"/>
-                    </a:gs>
-                  </a:gsLst>
-                  <a:lin ang="5400000" scaled="0"/>
-                </a:gradFill>
-                <a:effectLst/>
-                <a:latin typeface="+mj-lt"/>
-                <a:ea typeface="+mn-ea"/>
-                <a:cs typeface="Segoe UI" pitchFamily="34" charset="0"/>
-              </a:defRPr>
-            </a:lvl1pPr>
-          </a:lstStyle>
-          <a:p>
-            <a:pPr algn="ctr">
-              <a:spcBef>
-                <a:spcPts val="1200"/>
-              </a:spcBef>
-              <a:spcAft>
-                <a:spcPts val="1200"/>
-              </a:spcAft>
-              <a:defRPr/>
-            </a:pPr>
-            <a:r>
-              <a:rPr lang="en-GB" sz="7200" b="1" dirty="0">
-                <a:solidFill>
-                  <a:schemeClr val="tx1"/>
-                </a:solidFill>
-                <a:effectLst>
-                  <a:outerShdw blurRad="38100" dist="38100" dir="2700000" algn="tl">
-                    <a:srgbClr val="000000">
-                      <a:alpha val="43137"/>
-                    </a:srgbClr>
-                  </a:outerShdw>
-                </a:effectLst>
-                <a:latin typeface="Segoe UI Light"/>
-              </a:rPr>
-              <a:t>Virtual Network</a:t>
-            </a:r>
-          </a:p>
-        </p:txBody>
-      </p:sp>
-    </p:spTree>
-    <p:extLst>
-      <p:ext uri="{BB962C8B-B14F-4D97-AF65-F5344CB8AC3E}">
-        <p14:creationId xmlns:p14="http://schemas.microsoft.com/office/powerpoint/2010/main" val="215655951"/>
+        <p14:creationId xmlns:p14="http://schemas.microsoft.com/office/powerpoint/2010/main" val="434111893"/>
       </p:ext>
     </p:extLst>
   </p:cSld>
@@ -4452,10 +4505,10 @@
       </p:grpSpPr>
       <p:pic>
         <p:nvPicPr>
-          <p:cNvPr id="4" name="Picture 3">
-            <a:extLst>
-              <a:ext uri="{FF2B5EF4-FFF2-40B4-BE49-F238E27FC236}">
-                <a16:creationId xmlns:a16="http://schemas.microsoft.com/office/drawing/2014/main" id="{5D4ECF83-CB4A-48DF-B28A-22C464AD1D88}"/>
+          <p:cNvPr id="4" name="Graphic 3">
+            <a:extLst>
+              <a:ext uri="{FF2B5EF4-FFF2-40B4-BE49-F238E27FC236}">
+                <a16:creationId xmlns:a16="http://schemas.microsoft.com/office/drawing/2014/main" id="{4DBEA99D-F88D-4BB6-A7BE-0476F6156BEE}"/>
               </a:ext>
             </a:extLst>
           </p:cNvPr>
@@ -4465,15 +4518,24 @@
           <p:nvPr/>
         </p:nvPicPr>
         <p:blipFill>
-          <a:blip r:embed="rId2"/>
+          <a:blip r:embed="rId2">
+            <a:extLst>
+              <a:ext uri="{28A0092B-C50C-407E-A947-70E740481C1C}">
+                <a14:useLocalDpi xmlns:a14="http://schemas.microsoft.com/office/drawing/2010/main" val="0"/>
+              </a:ext>
+              <a:ext uri="{96DAC541-7B7A-43D3-8B79-37D633B846F1}">
+                <asvg:svgBlip xmlns:asvg="http://schemas.microsoft.com/office/drawing/2016/SVG/main" r:embed="rId3"/>
+              </a:ext>
+            </a:extLst>
+          </a:blip>
           <a:stretch>
             <a:fillRect/>
           </a:stretch>
         </p:blipFill>
         <p:spPr>
           <a:xfrm>
-            <a:off x="862361" y="289932"/>
-            <a:ext cx="10377706" cy="6332794"/>
+            <a:off x="2671010" y="8021"/>
+            <a:ext cx="6849979" cy="6849979"/>
           </a:xfrm>
           <a:prstGeom prst="rect">
             <a:avLst/>
@@ -4567,7 +4629,7 @@
                 </a:effectLst>
                 <a:latin typeface="Segoe UI Light"/>
               </a:rPr>
-              <a:t>Express Route</a:t>
+              <a:t>Resource Group</a:t>
             </a:r>
           </a:p>
         </p:txBody>
@@ -4575,7 +4637,7 @@
     </p:spTree>
     <p:extLst>
       <p:ext uri="{BB962C8B-B14F-4D97-AF65-F5344CB8AC3E}">
-        <p14:creationId xmlns:p14="http://schemas.microsoft.com/office/powerpoint/2010/main" val="2151157918"/>
+        <p14:creationId xmlns:p14="http://schemas.microsoft.com/office/powerpoint/2010/main" val="2295619804"/>
       </p:ext>
     </p:extLst>
   </p:cSld>
@@ -4690,10 +4752,10 @@
       </p:grpSpPr>
       <p:pic>
         <p:nvPicPr>
-          <p:cNvPr id="2" name="Picture 1">
-            <a:extLst>
-              <a:ext uri="{FF2B5EF4-FFF2-40B4-BE49-F238E27FC236}">
-                <a16:creationId xmlns:a16="http://schemas.microsoft.com/office/drawing/2014/main" id="{1D0A27D3-8F20-4E32-B406-30C2DA12495F}"/>
+          <p:cNvPr id="4" name="Graphic 3">
+            <a:extLst>
+              <a:ext uri="{FF2B5EF4-FFF2-40B4-BE49-F238E27FC236}">
+                <a16:creationId xmlns:a16="http://schemas.microsoft.com/office/drawing/2014/main" id="{EAD9AF3C-1126-4E90-869E-890EAA3E09F4}"/>
               </a:ext>
             </a:extLst>
           </p:cNvPr>
@@ -4702,16 +4764,24 @@
           </p:cNvPicPr>
           <p:nvPr/>
         </p:nvPicPr>
-        <p:blipFill>
-          <a:blip r:embed="rId2"/>
-          <a:stretch>
-            <a:fillRect/>
-          </a:stretch>
+        <p:blipFill rotWithShape="1">
+          <a:blip r:embed="rId2">
+            <a:extLst>
+              <a:ext uri="{28A0092B-C50C-407E-A947-70E740481C1C}">
+                <a14:useLocalDpi xmlns:a14="http://schemas.microsoft.com/office/drawing/2010/main" val="0"/>
+              </a:ext>
+              <a:ext uri="{96DAC541-7B7A-43D3-8B79-37D633B846F1}">
+                <asvg:svgBlip xmlns:asvg="http://schemas.microsoft.com/office/drawing/2016/SVG/main" r:embed="rId3"/>
+              </a:ext>
+            </a:extLst>
+          </a:blip>
+          <a:srcRect t="17682" b="15457"/>
+          <a:stretch/>
         </p:blipFill>
         <p:spPr>
           <a:xfrm>
-            <a:off x="2625824" y="61133"/>
-            <a:ext cx="6940351" cy="6735734"/>
+            <a:off x="1034716" y="44933"/>
+            <a:ext cx="10122568" cy="6768133"/>
           </a:xfrm>
           <a:prstGeom prst="rect">
             <a:avLst/>
@@ -4805,7 +4875,7 @@
                 </a:effectLst>
                 <a:latin typeface="Segoe UI Light"/>
               </a:rPr>
-              <a:t>SQL Data Warehouse</a:t>
+              <a:t>Virtual Network</a:t>
             </a:r>
           </a:p>
         </p:txBody>
@@ -4813,7 +4883,7 @@
     </p:spTree>
     <p:extLst>
       <p:ext uri="{BB962C8B-B14F-4D97-AF65-F5344CB8AC3E}">
-        <p14:creationId xmlns:p14="http://schemas.microsoft.com/office/powerpoint/2010/main" val="3108944933"/>
+        <p14:creationId xmlns:p14="http://schemas.microsoft.com/office/powerpoint/2010/main" val="215655951"/>
       </p:ext>
     </p:extLst>
   </p:cSld>
@@ -4928,10 +4998,10 @@
       </p:grpSpPr>
       <p:pic>
         <p:nvPicPr>
-          <p:cNvPr id="3" name="Picture 2">
-            <a:extLst>
-              <a:ext uri="{FF2B5EF4-FFF2-40B4-BE49-F238E27FC236}">
-                <a16:creationId xmlns:a16="http://schemas.microsoft.com/office/drawing/2014/main" id="{A5CF1A64-DE82-4D5B-A0C9-0B9D87E969AC}"/>
+          <p:cNvPr id="3" name="Graphic 2">
+            <a:extLst>
+              <a:ext uri="{FF2B5EF4-FFF2-40B4-BE49-F238E27FC236}">
+                <a16:creationId xmlns:a16="http://schemas.microsoft.com/office/drawing/2014/main" id="{9D5B0508-A0B0-46C7-95A9-F1E33D342A23}"/>
               </a:ext>
             </a:extLst>
           </p:cNvPr>
@@ -4940,16 +5010,24 @@
           </p:cNvPicPr>
           <p:nvPr/>
         </p:nvPicPr>
-        <p:blipFill>
-          <a:blip r:embed="rId2"/>
-          <a:stretch>
-            <a:fillRect/>
-          </a:stretch>
+        <p:blipFill rotWithShape="1">
+          <a:blip r:embed="rId2">
+            <a:extLst>
+              <a:ext uri="{28A0092B-C50C-407E-A947-70E740481C1C}">
+                <a14:useLocalDpi xmlns:a14="http://schemas.microsoft.com/office/drawing/2010/main" val="0"/>
+              </a:ext>
+              <a:ext uri="{96DAC541-7B7A-43D3-8B79-37D633B846F1}">
+                <asvg:svgBlip xmlns:asvg="http://schemas.microsoft.com/office/drawing/2016/SVG/main" r:embed="rId3"/>
+              </a:ext>
+            </a:extLst>
+          </a:blip>
+          <a:srcRect t="6339" b="5983"/>
+          <a:stretch/>
         </p:blipFill>
         <p:spPr>
           <a:xfrm>
-            <a:off x="1400531" y="632866"/>
-            <a:ext cx="9390938" cy="5592267"/>
+            <a:off x="2201779" y="14635"/>
+            <a:ext cx="7788442" cy="6828729"/>
           </a:xfrm>
           <a:prstGeom prst="rect">
             <a:avLst/>
@@ -5043,7 +5121,7 @@
                 </a:effectLst>
                 <a:latin typeface="Segoe UI Light"/>
               </a:rPr>
-              <a:t>Cognitive Services</a:t>
+              <a:t>Network Interface</a:t>
             </a:r>
           </a:p>
         </p:txBody>
@@ -5051,7 +5129,7 @@
     </p:spTree>
     <p:extLst>
       <p:ext uri="{BB962C8B-B14F-4D97-AF65-F5344CB8AC3E}">
-        <p14:creationId xmlns:p14="http://schemas.microsoft.com/office/powerpoint/2010/main" val="4121548687"/>
+        <p14:creationId xmlns:p14="http://schemas.microsoft.com/office/powerpoint/2010/main" val="3506305875"/>
       </p:ext>
     </p:extLst>
   </p:cSld>
@@ -5166,10 +5244,10 @@
       </p:grpSpPr>
       <p:pic>
         <p:nvPicPr>
-          <p:cNvPr id="3" name="Picture 2">
-            <a:extLst>
-              <a:ext uri="{FF2B5EF4-FFF2-40B4-BE49-F238E27FC236}">
-                <a16:creationId xmlns:a16="http://schemas.microsoft.com/office/drawing/2014/main" id="{72013A8F-952A-4745-853A-9AE64F6AF49E}"/>
+          <p:cNvPr id="3" name="Graphic 2">
+            <a:extLst>
+              <a:ext uri="{FF2B5EF4-FFF2-40B4-BE49-F238E27FC236}">
+                <a16:creationId xmlns:a16="http://schemas.microsoft.com/office/drawing/2014/main" id="{AD27A819-E24A-4961-8C2F-9FCF1C2B8A61}"/>
               </a:ext>
             </a:extLst>
           </p:cNvPr>
@@ -5179,15 +5257,24 @@
           <p:nvPr/>
         </p:nvPicPr>
         <p:blipFill>
-          <a:blip r:embed="rId2"/>
+          <a:blip r:embed="rId2">
+            <a:extLst>
+              <a:ext uri="{28A0092B-C50C-407E-A947-70E740481C1C}">
+                <a14:useLocalDpi xmlns:a14="http://schemas.microsoft.com/office/drawing/2010/main" val="0"/>
+              </a:ext>
+              <a:ext uri="{96DAC541-7B7A-43D3-8B79-37D633B846F1}">
+                <asvg:svgBlip xmlns:asvg="http://schemas.microsoft.com/office/drawing/2016/SVG/main" r:embed="rId3"/>
+              </a:ext>
+            </a:extLst>
+          </a:blip>
           <a:stretch>
             <a:fillRect/>
           </a:stretch>
         </p:blipFill>
         <p:spPr>
           <a:xfrm>
-            <a:off x="2864420" y="0"/>
-            <a:ext cx="6463160" cy="6858000"/>
+            <a:off x="2681287" y="14287"/>
+            <a:ext cx="6829425" cy="6829425"/>
           </a:xfrm>
           <a:prstGeom prst="rect">
             <a:avLst/>
@@ -5281,7 +5368,7 @@
                 </a:effectLst>
                 <a:latin typeface="Segoe UI Light"/>
               </a:rPr>
-              <a:t>Databricks</a:t>
+              <a:t>Express Route</a:t>
             </a:r>
           </a:p>
         </p:txBody>
@@ -5289,7 +5376,7 @@
     </p:spTree>
     <p:extLst>
       <p:ext uri="{BB962C8B-B14F-4D97-AF65-F5344CB8AC3E}">
-        <p14:creationId xmlns:p14="http://schemas.microsoft.com/office/powerpoint/2010/main" val="2471656630"/>
+        <p14:creationId xmlns:p14="http://schemas.microsoft.com/office/powerpoint/2010/main" val="2151157918"/>
       </p:ext>
     </p:extLst>
   </p:cSld>
@@ -5404,10 +5491,10 @@
       </p:grpSpPr>
       <p:pic>
         <p:nvPicPr>
-          <p:cNvPr id="2" name="Picture 1">
-            <a:extLst>
-              <a:ext uri="{FF2B5EF4-FFF2-40B4-BE49-F238E27FC236}">
-                <a16:creationId xmlns:a16="http://schemas.microsoft.com/office/drawing/2014/main" id="{76CAA769-89D0-4606-8AA3-50B36A51587E}"/>
+          <p:cNvPr id="4" name="Graphic 3">
+            <a:extLst>
+              <a:ext uri="{FF2B5EF4-FFF2-40B4-BE49-F238E27FC236}">
+                <a16:creationId xmlns:a16="http://schemas.microsoft.com/office/drawing/2014/main" id="{0F173D41-E98E-414A-A109-783A7BA77ADB}"/>
               </a:ext>
             </a:extLst>
           </p:cNvPr>
@@ -5416,16 +5503,24 @@
           </p:cNvPicPr>
           <p:nvPr/>
         </p:nvPicPr>
-        <p:blipFill>
-          <a:blip r:embed="rId2"/>
-          <a:stretch>
-            <a:fillRect/>
-          </a:stretch>
+        <p:blipFill rotWithShape="1">
+          <a:blip r:embed="rId2">
+            <a:extLst>
+              <a:ext uri="{28A0092B-C50C-407E-A947-70E740481C1C}">
+                <a14:useLocalDpi xmlns:a14="http://schemas.microsoft.com/office/drawing/2010/main" val="0"/>
+              </a:ext>
+              <a:ext uri="{96DAC541-7B7A-43D3-8B79-37D633B846F1}">
+                <asvg:svgBlip xmlns:asvg="http://schemas.microsoft.com/office/drawing/2016/SVG/main" r:embed="rId3"/>
+              </a:ext>
+            </a:extLst>
+          </a:blip>
+          <a:srcRect t="12368" b="12016"/>
+          <a:stretch/>
         </p:blipFill>
         <p:spPr>
           <a:xfrm>
-            <a:off x="2022615" y="0"/>
-            <a:ext cx="8146770" cy="6858000"/>
+            <a:off x="1764631" y="153814"/>
+            <a:ext cx="8662737" cy="6550371"/>
           </a:xfrm>
           <a:prstGeom prst="rect">
             <a:avLst/>
@@ -5519,7 +5614,7 @@
                 </a:effectLst>
                 <a:latin typeface="Segoe UI Light"/>
               </a:rPr>
-              <a:t>Redis Cache</a:t>
+              <a:t>Cognitive Services</a:t>
             </a:r>
           </a:p>
         </p:txBody>
@@ -5527,7 +5622,7 @@
     </p:spTree>
     <p:extLst>
       <p:ext uri="{BB962C8B-B14F-4D97-AF65-F5344CB8AC3E}">
-        <p14:creationId xmlns:p14="http://schemas.microsoft.com/office/powerpoint/2010/main" val="1999776992"/>
+        <p14:creationId xmlns:p14="http://schemas.microsoft.com/office/powerpoint/2010/main" val="4121548687"/>
       </p:ext>
     </p:extLst>
   </p:cSld>
@@ -5642,10 +5737,10 @@
       </p:grpSpPr>
       <p:pic>
         <p:nvPicPr>
-          <p:cNvPr id="2" name="Picture 1">
-            <a:extLst>
-              <a:ext uri="{FF2B5EF4-FFF2-40B4-BE49-F238E27FC236}">
-                <a16:creationId xmlns:a16="http://schemas.microsoft.com/office/drawing/2014/main" id="{D26CFE51-372B-434A-A678-C469BF8E2A85}"/>
+          <p:cNvPr id="3" name="Picture 2">
+            <a:extLst>
+              <a:ext uri="{FF2B5EF4-FFF2-40B4-BE49-F238E27FC236}">
+                <a16:creationId xmlns:a16="http://schemas.microsoft.com/office/drawing/2014/main" id="{72013A8F-952A-4745-853A-9AE64F6AF49E}"/>
               </a:ext>
             </a:extLst>
           </p:cNvPr>
@@ -5662,8 +5757,8 @@
         </p:blipFill>
         <p:spPr>
           <a:xfrm>
-            <a:off x="2791284" y="61133"/>
-            <a:ext cx="6609432" cy="6735734"/>
+            <a:off x="2864420" y="0"/>
+            <a:ext cx="6463160" cy="6858000"/>
           </a:xfrm>
           <a:prstGeom prst="rect">
             <a:avLst/>
@@ -5757,7 +5852,7 @@
                 </a:effectLst>
                 <a:latin typeface="Segoe UI Light"/>
               </a:rPr>
-              <a:t>Machine Learning</a:t>
+              <a:t>Databricks</a:t>
             </a:r>
           </a:p>
         </p:txBody>
@@ -5765,7 +5860,7 @@
     </p:spTree>
     <p:extLst>
       <p:ext uri="{BB962C8B-B14F-4D97-AF65-F5344CB8AC3E}">
-        <p14:creationId xmlns:p14="http://schemas.microsoft.com/office/powerpoint/2010/main" val="2654462013"/>
+        <p14:creationId xmlns:p14="http://schemas.microsoft.com/office/powerpoint/2010/main" val="2471656630"/>
       </p:ext>
     </p:extLst>
   </p:cSld>
@@ -5880,10 +5975,10 @@
       </p:grpSpPr>
       <p:pic>
         <p:nvPicPr>
-          <p:cNvPr id="3" name="Picture 2">
-            <a:extLst>
-              <a:ext uri="{FF2B5EF4-FFF2-40B4-BE49-F238E27FC236}">
-                <a16:creationId xmlns:a16="http://schemas.microsoft.com/office/drawing/2014/main" id="{7D905101-6B8F-40C3-B498-71B7702E8DCE}"/>
+          <p:cNvPr id="4" name="Graphic 3">
+            <a:extLst>
+              <a:ext uri="{FF2B5EF4-FFF2-40B4-BE49-F238E27FC236}">
+                <a16:creationId xmlns:a16="http://schemas.microsoft.com/office/drawing/2014/main" id="{1A3F471B-95CF-45B2-AF82-7AEE27580790}"/>
               </a:ext>
             </a:extLst>
           </p:cNvPr>
@@ -5892,16 +5987,24 @@
           </p:cNvPicPr>
           <p:nvPr/>
         </p:nvPicPr>
-        <p:blipFill>
-          <a:blip r:embed="rId2"/>
-          <a:stretch>
-            <a:fillRect/>
-          </a:stretch>
+        <p:blipFill rotWithShape="1">
+          <a:blip r:embed="rId2">
+            <a:extLst>
+              <a:ext uri="{28A0092B-C50C-407E-A947-70E740481C1C}">
+                <a14:useLocalDpi xmlns:a14="http://schemas.microsoft.com/office/drawing/2010/main" val="0"/>
+              </a:ext>
+              <a:ext uri="{96DAC541-7B7A-43D3-8B79-37D633B846F1}">
+                <asvg:svgBlip xmlns:asvg="http://schemas.microsoft.com/office/drawing/2016/SVG/main" r:embed="rId3"/>
+              </a:ext>
+            </a:extLst>
+          </a:blip>
+          <a:srcRect t="8284" b="7814"/>
+          <a:stretch/>
         </p:blipFill>
         <p:spPr>
           <a:xfrm>
-            <a:off x="2192052" y="96866"/>
-            <a:ext cx="7807895" cy="6664267"/>
+            <a:off x="2025315" y="13643"/>
+            <a:ext cx="8141369" cy="6830714"/>
           </a:xfrm>
           <a:prstGeom prst="rect">
             <a:avLst/>
@@ -5995,7 +6098,7 @@
                 </a:effectLst>
                 <a:latin typeface="Segoe UI Light"/>
               </a:rPr>
-              <a:t>Storage Account</a:t>
+              <a:t>Redis Cache</a:t>
             </a:r>
           </a:p>
         </p:txBody>
@@ -6003,7 +6106,7 @@
     </p:spTree>
     <p:extLst>
       <p:ext uri="{BB962C8B-B14F-4D97-AF65-F5344CB8AC3E}">
-        <p14:creationId xmlns:p14="http://schemas.microsoft.com/office/powerpoint/2010/main" val="3409526432"/>
+        <p14:creationId xmlns:p14="http://schemas.microsoft.com/office/powerpoint/2010/main" val="1999776992"/>
       </p:ext>
     </p:extLst>
   </p:cSld>
@@ -6356,10 +6459,10 @@
       </p:grpSpPr>
       <p:pic>
         <p:nvPicPr>
-          <p:cNvPr id="3" name="Picture 2">
-            <a:extLst>
-              <a:ext uri="{FF2B5EF4-FFF2-40B4-BE49-F238E27FC236}">
-                <a16:creationId xmlns:a16="http://schemas.microsoft.com/office/drawing/2014/main" id="{B00D2694-C425-43CB-95ED-D322D0079D84}"/>
+          <p:cNvPr id="4" name="Graphic 3">
+            <a:extLst>
+              <a:ext uri="{FF2B5EF4-FFF2-40B4-BE49-F238E27FC236}">
+                <a16:creationId xmlns:a16="http://schemas.microsoft.com/office/drawing/2014/main" id="{F25AB863-18EC-4EFA-90FF-35571D123325}"/>
               </a:ext>
             </a:extLst>
           </p:cNvPr>
@@ -6369,45 +6472,24 @@
           <p:nvPr/>
         </p:nvPicPr>
         <p:blipFill>
-          <a:blip r:embed="rId2"/>
+          <a:blip r:embed="rId2">
+            <a:extLst>
+              <a:ext uri="{28A0092B-C50C-407E-A947-70E740481C1C}">
+                <a14:useLocalDpi xmlns:a14="http://schemas.microsoft.com/office/drawing/2010/main" val="0"/>
+              </a:ext>
+              <a:ext uri="{96DAC541-7B7A-43D3-8B79-37D633B846F1}">
+                <asvg:svgBlip xmlns:asvg="http://schemas.microsoft.com/office/drawing/2016/SVG/main" r:embed="rId3"/>
+              </a:ext>
+            </a:extLst>
+          </a:blip>
           <a:stretch>
             <a:fillRect/>
           </a:stretch>
         </p:blipFill>
         <p:spPr>
           <a:xfrm>
-            <a:off x="3493223" y="0"/>
-            <a:ext cx="5205553" cy="6858000"/>
-          </a:xfrm>
-          <a:prstGeom prst="rect">
-            <a:avLst/>
-          </a:prstGeom>
-        </p:spPr>
-      </p:pic>
-      <p:pic>
-        <p:nvPicPr>
-          <p:cNvPr id="2" name="Picture 1">
-            <a:extLst>
-              <a:ext uri="{FF2B5EF4-FFF2-40B4-BE49-F238E27FC236}">
-                <a16:creationId xmlns:a16="http://schemas.microsoft.com/office/drawing/2014/main" id="{61A332A1-A5CF-4183-96C1-700A13D3709E}"/>
-              </a:ext>
-            </a:extLst>
-          </p:cNvPr>
-          <p:cNvPicPr>
-            <a:picLocks noChangeAspect="1"/>
-          </p:cNvPicPr>
-          <p:nvPr/>
-        </p:nvPicPr>
-        <p:blipFill>
-          <a:blip r:embed="rId3"/>
-          <a:stretch>
-            <a:fillRect/>
-          </a:stretch>
-        </p:blipFill>
-        <p:spPr>
-          <a:xfrm>
-            <a:off x="83447" y="5334903"/>
-            <a:ext cx="1840604" cy="1447380"/>
+            <a:off x="2911450" y="0"/>
+            <a:ext cx="6369100" cy="6858000"/>
           </a:xfrm>
           <a:prstGeom prst="rect">
             <a:avLst/>
@@ -6501,7 +6583,7 @@
                 </a:effectLst>
                 <a:latin typeface="Segoe UI Light"/>
               </a:rPr>
-              <a:t>Data Lake Store</a:t>
+              <a:t>Machine Learning</a:t>
             </a:r>
           </a:p>
         </p:txBody>
@@ -6509,7 +6591,7 @@
     </p:spTree>
     <p:extLst>
       <p:ext uri="{BB962C8B-B14F-4D97-AF65-F5344CB8AC3E}">
-        <p14:creationId xmlns:p14="http://schemas.microsoft.com/office/powerpoint/2010/main" val="1630679092"/>
+        <p14:creationId xmlns:p14="http://schemas.microsoft.com/office/powerpoint/2010/main" val="2654462013"/>
       </p:ext>
     </p:extLst>
   </p:cSld>
@@ -6571,41 +6653,6 @@
                                   </p:childTnLst>
                                 </p:cTn>
                               </p:par>
-                              <p:par>
-                                <p:cTn id="8" presetID="10" presetClass="entr" presetSubtype="0" fill="hold" nodeType="withEffect">
-                                  <p:stCondLst>
-                                    <p:cond delay="0"/>
-                                  </p:stCondLst>
-                                  <p:childTnLst>
-                                    <p:set>
-                                      <p:cBhvr>
-                                        <p:cTn id="9" dur="1" fill="hold">
-                                          <p:stCondLst>
-                                            <p:cond delay="0"/>
-                                          </p:stCondLst>
-                                        </p:cTn>
-                                        <p:tgtEl>
-                                          <p:spTgt spid="2"/>
-                                        </p:tgtEl>
-                                        <p:attrNameLst>
-                                          <p:attrName>style.visibility</p:attrName>
-                                        </p:attrNameLst>
-                                      </p:cBhvr>
-                                      <p:to>
-                                        <p:strVal val="visible"/>
-                                      </p:to>
-                                    </p:set>
-                                    <p:animEffect transition="in" filter="fade">
-                                      <p:cBhvr>
-                                        <p:cTn id="10" dur="500"/>
-                                        <p:tgtEl>
-                                          <p:spTgt spid="2"/>
-                                        </p:tgtEl>
-                                      </p:cBhvr>
-                                    </p:animEffect>
-                                  </p:childTnLst>
-                                </p:cTn>
-                              </p:par>
                             </p:childTnLst>
                           </p:cTn>
                         </p:par>
@@ -6659,10 +6706,10 @@
       </p:grpSpPr>
       <p:pic>
         <p:nvPicPr>
-          <p:cNvPr id="3" name="Picture 2">
-            <a:extLst>
-              <a:ext uri="{FF2B5EF4-FFF2-40B4-BE49-F238E27FC236}">
-                <a16:creationId xmlns:a16="http://schemas.microsoft.com/office/drawing/2014/main" id="{7FFBD379-1125-454D-884C-BE0C71819F86}"/>
+          <p:cNvPr id="4" name="Graphic 3">
+            <a:extLst>
+              <a:ext uri="{FF2B5EF4-FFF2-40B4-BE49-F238E27FC236}">
+                <a16:creationId xmlns:a16="http://schemas.microsoft.com/office/drawing/2014/main" id="{FFACA3F0-2D10-4BD2-B22B-791BCA0CF7BB}"/>
               </a:ext>
             </a:extLst>
           </p:cNvPr>
@@ -6671,16 +6718,24 @@
           </p:cNvPicPr>
           <p:nvPr/>
         </p:nvPicPr>
-        <p:blipFill>
-          <a:blip r:embed="rId2"/>
-          <a:stretch>
-            <a:fillRect/>
-          </a:stretch>
+        <p:blipFill rotWithShape="1">
+          <a:blip r:embed="rId2">
+            <a:extLst>
+              <a:ext uri="{28A0092B-C50C-407E-A947-70E740481C1C}">
+                <a14:useLocalDpi xmlns:a14="http://schemas.microsoft.com/office/drawing/2010/main" val="0"/>
+              </a:ext>
+              <a:ext uri="{96DAC541-7B7A-43D3-8B79-37D633B846F1}">
+                <asvg:svgBlip xmlns:asvg="http://schemas.microsoft.com/office/drawing/2016/SVG/main" r:embed="rId3"/>
+              </a:ext>
+            </a:extLst>
+          </a:blip>
+          <a:srcRect t="9086" b="9086"/>
+          <a:stretch/>
         </p:blipFill>
         <p:spPr>
           <a:xfrm>
-            <a:off x="2733149" y="70066"/>
-            <a:ext cx="6725701" cy="6717867"/>
+            <a:off x="1953126" y="38934"/>
+            <a:ext cx="8285747" cy="6780132"/>
           </a:xfrm>
           <a:prstGeom prst="rect">
             <a:avLst/>
@@ -6774,7 +6829,7 @@
                 </a:effectLst>
                 <a:latin typeface="Segoe UI Light"/>
               </a:rPr>
-              <a:t>Data Lake Analytics</a:t>
+              <a:t>Storage Account</a:t>
             </a:r>
           </a:p>
         </p:txBody>
@@ -6782,7 +6837,7 @@
     </p:spTree>
     <p:extLst>
       <p:ext uri="{BB962C8B-B14F-4D97-AF65-F5344CB8AC3E}">
-        <p14:creationId xmlns:p14="http://schemas.microsoft.com/office/powerpoint/2010/main" val="2120805870"/>
+        <p14:creationId xmlns:p14="http://schemas.microsoft.com/office/powerpoint/2010/main" val="3409526432"/>
       </p:ext>
     </p:extLst>
   </p:cSld>
@@ -6897,10 +6952,10 @@
       </p:grpSpPr>
       <p:pic>
         <p:nvPicPr>
-          <p:cNvPr id="2" name="Picture 1">
-            <a:extLst>
-              <a:ext uri="{FF2B5EF4-FFF2-40B4-BE49-F238E27FC236}">
-                <a16:creationId xmlns:a16="http://schemas.microsoft.com/office/drawing/2014/main" id="{C38964DD-8EC1-45F2-B3F2-C3FCC3003704}"/>
+          <p:cNvPr id="5" name="Graphic 4">
+            <a:extLst>
+              <a:ext uri="{FF2B5EF4-FFF2-40B4-BE49-F238E27FC236}">
+                <a16:creationId xmlns:a16="http://schemas.microsoft.com/office/drawing/2014/main" id="{E0E7937D-F3AB-483B-86B5-72E1629529DB}"/>
               </a:ext>
             </a:extLst>
           </p:cNvPr>
@@ -6909,16 +6964,24 @@
           </p:cNvPicPr>
           <p:nvPr/>
         </p:nvPicPr>
-        <p:blipFill>
-          <a:blip r:embed="rId2"/>
-          <a:stretch>
-            <a:fillRect/>
-          </a:stretch>
+        <p:blipFill rotWithShape="1">
+          <a:blip r:embed="rId2">
+            <a:extLst>
+              <a:ext uri="{28A0092B-C50C-407E-A947-70E740481C1C}">
+                <a14:useLocalDpi xmlns:a14="http://schemas.microsoft.com/office/drawing/2010/main" val="0"/>
+              </a:ext>
+              <a:ext uri="{96DAC541-7B7A-43D3-8B79-37D633B846F1}">
+                <asvg:svgBlip xmlns:asvg="http://schemas.microsoft.com/office/drawing/2016/SVG/main" r:embed="rId3"/>
+              </a:ext>
+            </a:extLst>
+          </a:blip>
+          <a:srcRect t="8595" b="7661"/>
+          <a:stretch/>
         </p:blipFill>
         <p:spPr>
           <a:xfrm>
-            <a:off x="2719734" y="61133"/>
-            <a:ext cx="6752532" cy="6735734"/>
+            <a:off x="1993231" y="0"/>
+            <a:ext cx="8205537" cy="6871539"/>
           </a:xfrm>
           <a:prstGeom prst="rect">
             <a:avLst/>
@@ -7012,7 +7075,7 @@
                 </a:effectLst>
                 <a:latin typeface="Segoe UI Light"/>
               </a:rPr>
-              <a:t>Data Factory</a:t>
+              <a:t>Data Lake Store (Gen1)</a:t>
             </a:r>
           </a:p>
         </p:txBody>
@@ -7020,7 +7083,7 @@
     </p:spTree>
     <p:extLst>
       <p:ext uri="{BB962C8B-B14F-4D97-AF65-F5344CB8AC3E}">
-        <p14:creationId xmlns:p14="http://schemas.microsoft.com/office/powerpoint/2010/main" val="3269637605"/>
+        <p14:creationId xmlns:p14="http://schemas.microsoft.com/office/powerpoint/2010/main" val="1630679092"/>
       </p:ext>
     </p:extLst>
   </p:cSld>
@@ -7135,10 +7198,10 @@
       </p:grpSpPr>
       <p:pic>
         <p:nvPicPr>
-          <p:cNvPr id="3" name="Picture 2">
-            <a:extLst>
-              <a:ext uri="{FF2B5EF4-FFF2-40B4-BE49-F238E27FC236}">
-                <a16:creationId xmlns:a16="http://schemas.microsoft.com/office/drawing/2014/main" id="{2FC316C0-0397-4BD6-9718-EDAB2D852ED2}"/>
+          <p:cNvPr id="4" name="Graphic 3">
+            <a:extLst>
+              <a:ext uri="{FF2B5EF4-FFF2-40B4-BE49-F238E27FC236}">
+                <a16:creationId xmlns:a16="http://schemas.microsoft.com/office/drawing/2014/main" id="{4CBCDF20-F44D-4409-B898-012A6193B4C8}"/>
               </a:ext>
             </a:extLst>
           </p:cNvPr>
@@ -7148,15 +7211,24 @@
           <p:nvPr/>
         </p:nvPicPr>
         <p:blipFill>
-          <a:blip r:embed="rId2"/>
+          <a:blip r:embed="rId2">
+            <a:extLst>
+              <a:ext uri="{28A0092B-C50C-407E-A947-70E740481C1C}">
+                <a14:useLocalDpi xmlns:a14="http://schemas.microsoft.com/office/drawing/2010/main" val="0"/>
+              </a:ext>
+              <a:ext uri="{96DAC541-7B7A-43D3-8B79-37D633B846F1}">
+                <asvg:svgBlip xmlns:asvg="http://schemas.microsoft.com/office/drawing/2016/SVG/main" r:embed="rId3"/>
+              </a:ext>
+            </a:extLst>
+          </a:blip>
           <a:stretch>
             <a:fillRect/>
           </a:stretch>
         </p:blipFill>
         <p:spPr>
           <a:xfrm>
-            <a:off x="2455893" y="52199"/>
-            <a:ext cx="7280213" cy="6753601"/>
+            <a:off x="2662989" y="0"/>
+            <a:ext cx="6866021" cy="6866021"/>
           </a:xfrm>
           <a:prstGeom prst="rect">
             <a:avLst/>
@@ -7250,7 +7322,7 @@
                 </a:effectLst>
                 <a:latin typeface="Segoe UI Light"/>
               </a:rPr>
-              <a:t>Batch Service</a:t>
+              <a:t>Synapse Analytics</a:t>
             </a:r>
           </a:p>
         </p:txBody>
@@ -7258,7 +7330,7 @@
     </p:spTree>
     <p:extLst>
       <p:ext uri="{BB962C8B-B14F-4D97-AF65-F5344CB8AC3E}">
-        <p14:creationId xmlns:p14="http://schemas.microsoft.com/office/powerpoint/2010/main" val="3653908531"/>
+        <p14:creationId xmlns:p14="http://schemas.microsoft.com/office/powerpoint/2010/main" val="2120805870"/>
       </p:ext>
     </p:extLst>
   </p:cSld>
@@ -7373,10 +7445,10 @@
       </p:grpSpPr>
       <p:pic>
         <p:nvPicPr>
-          <p:cNvPr id="2" name="Picture 1">
-            <a:extLst>
-              <a:ext uri="{FF2B5EF4-FFF2-40B4-BE49-F238E27FC236}">
-                <a16:creationId xmlns:a16="http://schemas.microsoft.com/office/drawing/2014/main" id="{CADC9F19-C808-496C-8907-5BBC0E85FC48}"/>
+          <p:cNvPr id="4" name="Graphic 3">
+            <a:extLst>
+              <a:ext uri="{FF2B5EF4-FFF2-40B4-BE49-F238E27FC236}">
+                <a16:creationId xmlns:a16="http://schemas.microsoft.com/office/drawing/2014/main" id="{019224AF-1D16-4F2F-8578-A478F83B48AF}"/>
               </a:ext>
             </a:extLst>
           </p:cNvPr>
@@ -7386,15 +7458,24 @@
           <p:nvPr/>
         </p:nvPicPr>
         <p:blipFill>
-          <a:blip r:embed="rId2"/>
+          <a:blip r:embed="rId2">
+            <a:extLst>
+              <a:ext uri="{28A0092B-C50C-407E-A947-70E740481C1C}">
+                <a14:useLocalDpi xmlns:a14="http://schemas.microsoft.com/office/drawing/2010/main" val="0"/>
+              </a:ext>
+              <a:ext uri="{96DAC541-7B7A-43D3-8B79-37D633B846F1}">
+                <asvg:svgBlip xmlns:asvg="http://schemas.microsoft.com/office/drawing/2016/SVG/main" r:embed="rId3"/>
+              </a:ext>
+            </a:extLst>
+          </a:blip>
           <a:stretch>
             <a:fillRect/>
           </a:stretch>
         </p:blipFill>
         <p:spPr>
           <a:xfrm>
-            <a:off x="2429062" y="110266"/>
-            <a:ext cx="7333876" cy="6637467"/>
+            <a:off x="2671762" y="9525"/>
+            <a:ext cx="6848475" cy="6848475"/>
           </a:xfrm>
           <a:prstGeom prst="rect">
             <a:avLst/>
@@ -7488,7 +7569,7 @@
                 </a:effectLst>
                 <a:latin typeface="Segoe UI Light"/>
               </a:rPr>
-              <a:t>Automation</a:t>
+              <a:t>Data Factory</a:t>
             </a:r>
           </a:p>
         </p:txBody>
@@ -7496,7 +7577,7 @@
     </p:spTree>
     <p:extLst>
       <p:ext uri="{BB962C8B-B14F-4D97-AF65-F5344CB8AC3E}">
-        <p14:creationId xmlns:p14="http://schemas.microsoft.com/office/powerpoint/2010/main" val="3517388517"/>
+        <p14:creationId xmlns:p14="http://schemas.microsoft.com/office/powerpoint/2010/main" val="3269637605"/>
       </p:ext>
     </p:extLst>
   </p:cSld>
@@ -7611,10 +7692,10 @@
       </p:grpSpPr>
       <p:pic>
         <p:nvPicPr>
-          <p:cNvPr id="2" name="Picture 1">
-            <a:extLst>
-              <a:ext uri="{FF2B5EF4-FFF2-40B4-BE49-F238E27FC236}">
-                <a16:creationId xmlns:a16="http://schemas.microsoft.com/office/drawing/2014/main" id="{50F73E81-00C0-4B00-A50D-7B25324EDCAA}"/>
+          <p:cNvPr id="4" name="Graphic 3">
+            <a:extLst>
+              <a:ext uri="{FF2B5EF4-FFF2-40B4-BE49-F238E27FC236}">
+                <a16:creationId xmlns:a16="http://schemas.microsoft.com/office/drawing/2014/main" id="{C1C5A813-4E38-47D6-AB7A-91110B83A338}"/>
               </a:ext>
             </a:extLst>
           </p:cNvPr>
@@ -7624,15 +7705,24 @@
           <p:nvPr/>
         </p:nvPicPr>
         <p:blipFill>
-          <a:blip r:embed="rId2"/>
+          <a:blip r:embed="rId2">
+            <a:extLst>
+              <a:ext uri="{28A0092B-C50C-407E-A947-70E740481C1C}">
+                <a14:useLocalDpi xmlns:a14="http://schemas.microsoft.com/office/drawing/2010/main" val="0"/>
+              </a:ext>
+              <a:ext uri="{96DAC541-7B7A-43D3-8B79-37D633B846F1}">
+                <asvg:svgBlip xmlns:asvg="http://schemas.microsoft.com/office/drawing/2016/SVG/main" r:embed="rId3"/>
+              </a:ext>
+            </a:extLst>
+          </a:blip>
           <a:stretch>
             <a:fillRect/>
           </a:stretch>
         </p:blipFill>
         <p:spPr>
           <a:xfrm>
-            <a:off x="2464837" y="87933"/>
-            <a:ext cx="7262326" cy="6682134"/>
+            <a:off x="2671011" y="8022"/>
+            <a:ext cx="6849978" cy="6849978"/>
           </a:xfrm>
           <a:prstGeom prst="rect">
             <a:avLst/>
@@ -7726,7 +7816,7 @@
                 </a:effectLst>
                 <a:latin typeface="Segoe UI Light"/>
               </a:rPr>
-              <a:t>Functions</a:t>
+              <a:t>Bot Services</a:t>
             </a:r>
           </a:p>
         </p:txBody>
@@ -7734,7 +7824,7 @@
     </p:spTree>
     <p:extLst>
       <p:ext uri="{BB962C8B-B14F-4D97-AF65-F5344CB8AC3E}">
-        <p14:creationId xmlns:p14="http://schemas.microsoft.com/office/powerpoint/2010/main" val="1387030895"/>
+        <p14:creationId xmlns:p14="http://schemas.microsoft.com/office/powerpoint/2010/main" val="3653908531"/>
       </p:ext>
     </p:extLst>
   </p:cSld>
@@ -7849,10 +7939,10 @@
       </p:grpSpPr>
       <p:pic>
         <p:nvPicPr>
-          <p:cNvPr id="3" name="Picture 2">
-            <a:extLst>
-              <a:ext uri="{FF2B5EF4-FFF2-40B4-BE49-F238E27FC236}">
-                <a16:creationId xmlns:a16="http://schemas.microsoft.com/office/drawing/2014/main" id="{3037B186-89CD-4244-8408-C10B6BBB660E}"/>
+          <p:cNvPr id="4" name="Graphic 3">
+            <a:extLst>
+              <a:ext uri="{FF2B5EF4-FFF2-40B4-BE49-F238E27FC236}">
+                <a16:creationId xmlns:a16="http://schemas.microsoft.com/office/drawing/2014/main" id="{45DF9FFA-ECF0-44F1-9A4C-C722CA108101}"/>
               </a:ext>
             </a:extLst>
           </p:cNvPr>
@@ -7862,15 +7952,24 @@
           <p:nvPr/>
         </p:nvPicPr>
         <p:blipFill>
-          <a:blip r:embed="rId2"/>
+          <a:blip r:embed="rId2">
+            <a:extLst>
+              <a:ext uri="{28A0092B-C50C-407E-A947-70E740481C1C}">
+                <a14:useLocalDpi xmlns:a14="http://schemas.microsoft.com/office/drawing/2010/main" val="0"/>
+              </a:ext>
+              <a:ext uri="{96DAC541-7B7A-43D3-8B79-37D633B846F1}">
+                <asvg:svgBlip xmlns:asvg="http://schemas.microsoft.com/office/drawing/2016/SVG/main" r:embed="rId3"/>
+              </a:ext>
+            </a:extLst>
+          </a:blip>
           <a:stretch>
             <a:fillRect/>
           </a:stretch>
         </p:blipFill>
         <p:spPr>
           <a:xfrm>
-            <a:off x="1825359" y="105799"/>
-            <a:ext cx="8541282" cy="6646401"/>
+            <a:off x="2691063" y="48127"/>
+            <a:ext cx="6809873" cy="6809873"/>
           </a:xfrm>
           <a:prstGeom prst="rect">
             <a:avLst/>
@@ -7964,7 +8063,7 @@
                 </a:effectLst>
                 <a:latin typeface="Segoe UI Light"/>
               </a:rPr>
-              <a:t>Logic Apps</a:t>
+              <a:t>Automation</a:t>
             </a:r>
           </a:p>
         </p:txBody>
@@ -7972,7 +8071,7 @@
     </p:spTree>
     <p:extLst>
       <p:ext uri="{BB962C8B-B14F-4D97-AF65-F5344CB8AC3E}">
-        <p14:creationId xmlns:p14="http://schemas.microsoft.com/office/powerpoint/2010/main" val="3034824262"/>
+        <p14:creationId xmlns:p14="http://schemas.microsoft.com/office/powerpoint/2010/main" val="3517388517"/>
       </p:ext>
     </p:extLst>
   </p:cSld>
@@ -8087,10 +8186,10 @@
       </p:grpSpPr>
       <p:pic>
         <p:nvPicPr>
-          <p:cNvPr id="3" name="Picture 2">
-            <a:extLst>
-              <a:ext uri="{FF2B5EF4-FFF2-40B4-BE49-F238E27FC236}">
-                <a16:creationId xmlns:a16="http://schemas.microsoft.com/office/drawing/2014/main" id="{A76642D8-39F1-456B-ACFF-1B354DDC3DC5}"/>
+          <p:cNvPr id="4" name="Graphic 3">
+            <a:extLst>
+              <a:ext uri="{FF2B5EF4-FFF2-40B4-BE49-F238E27FC236}">
+                <a16:creationId xmlns:a16="http://schemas.microsoft.com/office/drawing/2014/main" id="{2ACCA5A3-71AD-43D3-B5CB-1747C1106084}"/>
               </a:ext>
             </a:extLst>
           </p:cNvPr>
@@ -8100,15 +8199,24 @@
           <p:nvPr/>
         </p:nvPicPr>
         <p:blipFill>
-          <a:blip r:embed="rId2"/>
+          <a:blip r:embed="rId2">
+            <a:extLst>
+              <a:ext uri="{28A0092B-C50C-407E-A947-70E740481C1C}">
+                <a14:useLocalDpi xmlns:a14="http://schemas.microsoft.com/office/drawing/2010/main" val="0"/>
+              </a:ext>
+              <a:ext uri="{96DAC541-7B7A-43D3-8B79-37D633B846F1}">
+                <asvg:svgBlip xmlns:asvg="http://schemas.microsoft.com/office/drawing/2016/SVG/main" r:embed="rId3"/>
+              </a:ext>
+            </a:extLst>
+          </a:blip>
           <a:stretch>
             <a:fillRect/>
           </a:stretch>
         </p:blipFill>
         <p:spPr>
           <a:xfrm>
-            <a:off x="1928212" y="43266"/>
-            <a:ext cx="8335576" cy="6771467"/>
+            <a:off x="2686050" y="19050"/>
+            <a:ext cx="6819900" cy="6819900"/>
           </a:xfrm>
           <a:prstGeom prst="rect">
             <a:avLst/>
@@ -8202,7 +8310,7 @@
                 </a:effectLst>
                 <a:latin typeface="Segoe UI Light"/>
               </a:rPr>
-              <a:t>Analysis Services</a:t>
+              <a:t>Functions</a:t>
             </a:r>
           </a:p>
         </p:txBody>
@@ -8210,7 +8318,7 @@
     </p:spTree>
     <p:extLst>
       <p:ext uri="{BB962C8B-B14F-4D97-AF65-F5344CB8AC3E}">
-        <p14:creationId xmlns:p14="http://schemas.microsoft.com/office/powerpoint/2010/main" val="794762057"/>
+        <p14:creationId xmlns:p14="http://schemas.microsoft.com/office/powerpoint/2010/main" val="1387030895"/>
       </p:ext>
     </p:extLst>
   </p:cSld>
@@ -8325,10 +8433,10 @@
       </p:grpSpPr>
       <p:pic>
         <p:nvPicPr>
-          <p:cNvPr id="2" name="Picture 1">
-            <a:extLst>
-              <a:ext uri="{FF2B5EF4-FFF2-40B4-BE49-F238E27FC236}">
-                <a16:creationId xmlns:a16="http://schemas.microsoft.com/office/drawing/2014/main" id="{EB1AE970-1F0D-4B30-B185-B22186BFF870}"/>
+          <p:cNvPr id="4" name="Graphic 3">
+            <a:extLst>
+              <a:ext uri="{FF2B5EF4-FFF2-40B4-BE49-F238E27FC236}">
+                <a16:creationId xmlns:a16="http://schemas.microsoft.com/office/drawing/2014/main" id="{78C2D6D0-BC4D-4A00-A2AC-714E8491519A}"/>
               </a:ext>
             </a:extLst>
           </p:cNvPr>
@@ -8337,16 +8445,24 @@
           </p:cNvPicPr>
           <p:nvPr/>
         </p:nvPicPr>
-        <p:blipFill>
-          <a:blip r:embed="rId2"/>
-          <a:stretch>
-            <a:fillRect/>
-          </a:stretch>
+        <p:blipFill rotWithShape="1">
+          <a:blip r:embed="rId2">
+            <a:extLst>
+              <a:ext uri="{28A0092B-C50C-407E-A947-70E740481C1C}">
+                <a14:useLocalDpi xmlns:a14="http://schemas.microsoft.com/office/drawing/2010/main" val="0"/>
+              </a:ext>
+              <a:ext uri="{96DAC541-7B7A-43D3-8B79-37D633B846F1}">
+                <asvg:svgBlip xmlns:asvg="http://schemas.microsoft.com/office/drawing/2016/SVG/main" r:embed="rId3"/>
+              </a:ext>
+            </a:extLst>
+          </a:blip>
+          <a:srcRect t="8872" b="8754"/>
+          <a:stretch/>
         </p:blipFill>
         <p:spPr>
           <a:xfrm>
-            <a:off x="2706318" y="47733"/>
-            <a:ext cx="6779363" cy="6762534"/>
+            <a:off x="1961147" y="22969"/>
+            <a:ext cx="8269705" cy="6812061"/>
           </a:xfrm>
           <a:prstGeom prst="rect">
             <a:avLst/>
@@ -8440,7 +8556,7 @@
                 </a:effectLst>
                 <a:latin typeface="Segoe UI Light"/>
               </a:rPr>
-              <a:t>Event Grid</a:t>
+              <a:t>Logic Apps</a:t>
             </a:r>
           </a:p>
         </p:txBody>
@@ -8448,7 +8564,7 @@
     </p:spTree>
     <p:extLst>
       <p:ext uri="{BB962C8B-B14F-4D97-AF65-F5344CB8AC3E}">
-        <p14:creationId xmlns:p14="http://schemas.microsoft.com/office/powerpoint/2010/main" val="3447951919"/>
+        <p14:creationId xmlns:p14="http://schemas.microsoft.com/office/powerpoint/2010/main" val="3034824262"/>
       </p:ext>
     </p:extLst>
   </p:cSld>
@@ -8563,10 +8679,10 @@
       </p:grpSpPr>
       <p:pic>
         <p:nvPicPr>
-          <p:cNvPr id="5" name="Picture 4">
-            <a:extLst>
-              <a:ext uri="{FF2B5EF4-FFF2-40B4-BE49-F238E27FC236}">
-                <a16:creationId xmlns:a16="http://schemas.microsoft.com/office/drawing/2014/main" id="{4DC88D3A-6239-40E7-92AE-B028AF9AB476}"/>
+          <p:cNvPr id="4" name="Graphic 3">
+            <a:extLst>
+              <a:ext uri="{FF2B5EF4-FFF2-40B4-BE49-F238E27FC236}">
+                <a16:creationId xmlns:a16="http://schemas.microsoft.com/office/drawing/2014/main" id="{E96CAF73-2A8D-49E6-BC57-C6E6875AB4A5}"/>
               </a:ext>
             </a:extLst>
           </p:cNvPr>
@@ -8575,16 +8691,24 @@
           </p:cNvPicPr>
           <p:nvPr/>
         </p:nvPicPr>
-        <p:blipFill>
-          <a:blip r:embed="rId2"/>
-          <a:stretch>
-            <a:fillRect/>
-          </a:stretch>
+        <p:blipFill rotWithShape="1">
+          <a:blip r:embed="rId2">
+            <a:extLst>
+              <a:ext uri="{28A0092B-C50C-407E-A947-70E740481C1C}">
+                <a14:useLocalDpi xmlns:a14="http://schemas.microsoft.com/office/drawing/2010/main" val="0"/>
+              </a:ext>
+              <a:ext uri="{96DAC541-7B7A-43D3-8B79-37D633B846F1}">
+                <asvg:svgBlip xmlns:asvg="http://schemas.microsoft.com/office/drawing/2016/SVG/main" r:embed="rId3"/>
+              </a:ext>
+            </a:extLst>
+          </a:blip>
+          <a:srcRect t="10948" b="10480"/>
+          <a:stretch/>
         </p:blipFill>
         <p:spPr>
           <a:xfrm>
-            <a:off x="2840474" y="87933"/>
-            <a:ext cx="6511051" cy="6682134"/>
+            <a:off x="1736557" y="7448"/>
+            <a:ext cx="8718885" cy="6850552"/>
           </a:xfrm>
           <a:prstGeom prst="rect">
             <a:avLst/>
@@ -8678,7 +8802,7 @@
                 </a:effectLst>
                 <a:latin typeface="Segoe UI Light"/>
               </a:rPr>
-              <a:t>Event Hub</a:t>
+              <a:t>Analysis Services</a:t>
             </a:r>
           </a:p>
         </p:txBody>
@@ -8686,7 +8810,7 @@
     </p:spTree>
     <p:extLst>
       <p:ext uri="{BB962C8B-B14F-4D97-AF65-F5344CB8AC3E}">
-        <p14:creationId xmlns:p14="http://schemas.microsoft.com/office/powerpoint/2010/main" val="2388929640"/>
+        <p14:creationId xmlns:p14="http://schemas.microsoft.com/office/powerpoint/2010/main" val="794762057"/>
       </p:ext>
     </p:extLst>
   </p:cSld>
@@ -8801,10 +8925,10 @@
       </p:grpSpPr>
       <p:pic>
         <p:nvPicPr>
-          <p:cNvPr id="2" name="Picture 1">
-            <a:extLst>
-              <a:ext uri="{FF2B5EF4-FFF2-40B4-BE49-F238E27FC236}">
-                <a16:creationId xmlns:a16="http://schemas.microsoft.com/office/drawing/2014/main" id="{07AB261B-5B38-4005-AD8F-7C6BE257CD96}"/>
+          <p:cNvPr id="4" name="Graphic 3">
+            <a:extLst>
+              <a:ext uri="{FF2B5EF4-FFF2-40B4-BE49-F238E27FC236}">
+                <a16:creationId xmlns:a16="http://schemas.microsoft.com/office/drawing/2014/main" id="{C916EED3-41B9-49A4-BBAB-940FB2691BD4}"/>
               </a:ext>
             </a:extLst>
           </p:cNvPr>
@@ -8814,15 +8938,24 @@
           <p:nvPr/>
         </p:nvPicPr>
         <p:blipFill>
-          <a:blip r:embed="rId2"/>
+          <a:blip r:embed="rId2">
+            <a:extLst>
+              <a:ext uri="{28A0092B-C50C-407E-A947-70E740481C1C}">
+                <a14:useLocalDpi xmlns:a14="http://schemas.microsoft.com/office/drawing/2010/main" val="0"/>
+              </a:ext>
+              <a:ext uri="{96DAC541-7B7A-43D3-8B79-37D633B846F1}">
+                <asvg:svgBlip xmlns:asvg="http://schemas.microsoft.com/office/drawing/2016/SVG/main" r:embed="rId3"/>
+              </a:ext>
+            </a:extLst>
+          </a:blip>
           <a:stretch>
             <a:fillRect/>
           </a:stretch>
         </p:blipFill>
         <p:spPr>
           <a:xfrm>
-            <a:off x="2073530" y="0"/>
-            <a:ext cx="8044939" cy="6858000"/>
+            <a:off x="2679032" y="12032"/>
+            <a:ext cx="6833936" cy="6833936"/>
           </a:xfrm>
           <a:prstGeom prst="rect">
             <a:avLst/>
@@ -8916,7 +9049,7 @@
                 </a:effectLst>
                 <a:latin typeface="Segoe UI Light"/>
               </a:rPr>
-              <a:t>Azure Portal</a:t>
+              <a:t>Users</a:t>
             </a:r>
           </a:p>
         </p:txBody>
@@ -9039,10 +9172,10 @@
       </p:grpSpPr>
       <p:pic>
         <p:nvPicPr>
-          <p:cNvPr id="4" name="Picture 3">
-            <a:extLst>
-              <a:ext uri="{FF2B5EF4-FFF2-40B4-BE49-F238E27FC236}">
-                <a16:creationId xmlns:a16="http://schemas.microsoft.com/office/drawing/2014/main" id="{A5952FD6-013B-4B15-A3E1-35E28832EB9E}"/>
+          <p:cNvPr id="4" name="Graphic 3">
+            <a:extLst>
+              <a:ext uri="{FF2B5EF4-FFF2-40B4-BE49-F238E27FC236}">
+                <a16:creationId xmlns:a16="http://schemas.microsoft.com/office/drawing/2014/main" id="{E9A81353-4156-4D4F-99C2-59A11327013A}"/>
               </a:ext>
             </a:extLst>
           </p:cNvPr>
@@ -9051,16 +9184,24 @@
           </p:cNvPicPr>
           <p:nvPr/>
         </p:nvPicPr>
-        <p:blipFill>
-          <a:blip r:embed="rId2"/>
-          <a:stretch>
-            <a:fillRect/>
-          </a:stretch>
+        <p:blipFill rotWithShape="1">
+          <a:blip r:embed="rId2">
+            <a:extLst>
+              <a:ext uri="{28A0092B-C50C-407E-A947-70E740481C1C}">
+                <a14:useLocalDpi xmlns:a14="http://schemas.microsoft.com/office/drawing/2010/main" val="0"/>
+              </a:ext>
+              <a:ext uri="{96DAC541-7B7A-43D3-8B79-37D633B846F1}">
+                <asvg:svgBlip xmlns:asvg="http://schemas.microsoft.com/office/drawing/2016/SVG/main" r:embed="rId3"/>
+              </a:ext>
+            </a:extLst>
+          </a:blip>
+          <a:srcRect t="5810" b="5810"/>
+          <a:stretch/>
         </p:blipFill>
         <p:spPr>
           <a:xfrm>
-            <a:off x="1753809" y="52199"/>
-            <a:ext cx="8684382" cy="6753601"/>
+            <a:off x="2217821" y="2910"/>
+            <a:ext cx="7756357" cy="6855090"/>
           </a:xfrm>
           <a:prstGeom prst="rect">
             <a:avLst/>
@@ -9154,7 +9295,7 @@
                 </a:effectLst>
                 <a:latin typeface="Segoe UI Light"/>
               </a:rPr>
-              <a:t>Stream Analytics</a:t>
+              <a:t>Event Grid</a:t>
             </a:r>
           </a:p>
         </p:txBody>
@@ -9162,7 +9303,7 @@
     </p:spTree>
     <p:extLst>
       <p:ext uri="{BB962C8B-B14F-4D97-AF65-F5344CB8AC3E}">
-        <p14:creationId xmlns:p14="http://schemas.microsoft.com/office/powerpoint/2010/main" val="2031741729"/>
+        <p14:creationId xmlns:p14="http://schemas.microsoft.com/office/powerpoint/2010/main" val="3447951919"/>
       </p:ext>
     </p:extLst>
   </p:cSld>
@@ -9277,10 +9418,10 @@
       </p:grpSpPr>
       <p:pic>
         <p:nvPicPr>
-          <p:cNvPr id="3" name="Picture 2">
-            <a:extLst>
-              <a:ext uri="{FF2B5EF4-FFF2-40B4-BE49-F238E27FC236}">
-                <a16:creationId xmlns:a16="http://schemas.microsoft.com/office/drawing/2014/main" id="{2E4ACD74-D39D-4621-81F3-565B9AEE80B1}"/>
+          <p:cNvPr id="3" name="Graphic 2">
+            <a:extLst>
+              <a:ext uri="{FF2B5EF4-FFF2-40B4-BE49-F238E27FC236}">
+                <a16:creationId xmlns:a16="http://schemas.microsoft.com/office/drawing/2014/main" id="{D40AA4C4-FF17-4788-B81C-53AF8A413DE0}"/>
               </a:ext>
             </a:extLst>
           </p:cNvPr>
@@ -9289,16 +9430,24 @@
           </p:cNvPicPr>
           <p:nvPr/>
         </p:nvPicPr>
-        <p:blipFill>
-          <a:blip r:embed="rId2"/>
-          <a:stretch>
-            <a:fillRect/>
-          </a:stretch>
+        <p:blipFill rotWithShape="1">
+          <a:blip r:embed="rId2">
+            <a:extLst>
+              <a:ext uri="{28A0092B-C50C-407E-A947-70E740481C1C}">
+                <a14:useLocalDpi xmlns:a14="http://schemas.microsoft.com/office/drawing/2010/main" val="0"/>
+              </a:ext>
+              <a:ext uri="{96DAC541-7B7A-43D3-8B79-37D633B846F1}">
+                <asvg:svgBlip xmlns:asvg="http://schemas.microsoft.com/office/drawing/2016/SVG/main" r:embed="rId3"/>
+              </a:ext>
+            </a:extLst>
+          </a:blip>
+          <a:srcRect t="6286" b="5464"/>
+          <a:stretch/>
         </p:blipFill>
         <p:spPr>
           <a:xfrm>
-            <a:off x="1518669" y="0"/>
-            <a:ext cx="9154662" cy="6858000"/>
+            <a:off x="2209800" y="0"/>
+            <a:ext cx="7772400" cy="6859075"/>
           </a:xfrm>
           <a:prstGeom prst="rect">
             <a:avLst/>
@@ -9392,7 +9541,7 @@
                 </a:effectLst>
                 <a:latin typeface="Segoe UI Light"/>
               </a:rPr>
-              <a:t>Power BI</a:t>
+              <a:t>Event Hub</a:t>
             </a:r>
           </a:p>
         </p:txBody>
@@ -9400,7 +9549,7 @@
     </p:spTree>
     <p:extLst>
       <p:ext uri="{BB962C8B-B14F-4D97-AF65-F5344CB8AC3E}">
-        <p14:creationId xmlns:p14="http://schemas.microsoft.com/office/powerpoint/2010/main" val="2067566175"/>
+        <p14:creationId xmlns:p14="http://schemas.microsoft.com/office/powerpoint/2010/main" val="2388929640"/>
       </p:ext>
     </p:extLst>
   </p:cSld>
@@ -9515,10 +9664,10 @@
       </p:grpSpPr>
       <p:pic>
         <p:nvPicPr>
-          <p:cNvPr id="2" name="Picture 1">
-            <a:extLst>
-              <a:ext uri="{FF2B5EF4-FFF2-40B4-BE49-F238E27FC236}">
-                <a16:creationId xmlns:a16="http://schemas.microsoft.com/office/drawing/2014/main" id="{CB00F877-62D4-4191-A1C0-BCA26D3AAD76}"/>
+          <p:cNvPr id="3" name="Graphic 2">
+            <a:extLst>
+              <a:ext uri="{FF2B5EF4-FFF2-40B4-BE49-F238E27FC236}">
+                <a16:creationId xmlns:a16="http://schemas.microsoft.com/office/drawing/2014/main" id="{67C6D9B7-4424-480B-B01A-1DA3898E9214}"/>
               </a:ext>
             </a:extLst>
           </p:cNvPr>
@@ -9527,16 +9676,24 @@
           </p:cNvPicPr>
           <p:nvPr/>
         </p:nvPicPr>
-        <p:blipFill>
-          <a:blip r:embed="rId2"/>
-          <a:stretch>
-            <a:fillRect/>
-          </a:stretch>
+        <p:blipFill rotWithShape="1">
+          <a:blip r:embed="rId2">
+            <a:extLst>
+              <a:ext uri="{28A0092B-C50C-407E-A947-70E740481C1C}">
+                <a14:useLocalDpi xmlns:a14="http://schemas.microsoft.com/office/drawing/2010/main" val="0"/>
+              </a:ext>
+              <a:ext uri="{96DAC541-7B7A-43D3-8B79-37D633B846F1}">
+                <asvg:svgBlip xmlns:asvg="http://schemas.microsoft.com/office/drawing/2016/SVG/main" r:embed="rId3"/>
+              </a:ext>
+            </a:extLst>
+          </a:blip>
+          <a:srcRect t="5122" b="5239"/>
+          <a:stretch/>
         </p:blipFill>
         <p:spPr>
           <a:xfrm>
-            <a:off x="2925440" y="52199"/>
-            <a:ext cx="6341119" cy="6753601"/>
+            <a:off x="2265947" y="-8452"/>
+            <a:ext cx="7660106" cy="6866452"/>
           </a:xfrm>
           <a:prstGeom prst="rect">
             <a:avLst/>
@@ -9630,7 +9787,7 @@
                 </a:effectLst>
                 <a:latin typeface="Segoe UI Light"/>
               </a:rPr>
-              <a:t>Data Catalogue</a:t>
+              <a:t>Stream Analytics</a:t>
             </a:r>
           </a:p>
         </p:txBody>
@@ -9638,7 +9795,7 @@
     </p:spTree>
     <p:extLst>
       <p:ext uri="{BB962C8B-B14F-4D97-AF65-F5344CB8AC3E}">
-        <p14:creationId xmlns:p14="http://schemas.microsoft.com/office/powerpoint/2010/main" val="4014089120"/>
+        <p14:creationId xmlns:p14="http://schemas.microsoft.com/office/powerpoint/2010/main" val="2031741729"/>
       </p:ext>
     </p:extLst>
   </p:cSld>
@@ -9753,10 +9910,10 @@
       </p:grpSpPr>
       <p:pic>
         <p:nvPicPr>
-          <p:cNvPr id="3" name="Picture 2">
-            <a:extLst>
-              <a:ext uri="{FF2B5EF4-FFF2-40B4-BE49-F238E27FC236}">
-                <a16:creationId xmlns:a16="http://schemas.microsoft.com/office/drawing/2014/main" id="{C05ADA2A-281E-4FD1-B782-E3CA3666A6F6}"/>
+          <p:cNvPr id="4" name="Graphic 3">
+            <a:extLst>
+              <a:ext uri="{FF2B5EF4-FFF2-40B4-BE49-F238E27FC236}">
+                <a16:creationId xmlns:a16="http://schemas.microsoft.com/office/drawing/2014/main" id="{9D844F7B-1757-485C-BE91-2A609D950074}"/>
               </a:ext>
             </a:extLst>
           </p:cNvPr>
@@ -9766,15 +9923,24 @@
           <p:nvPr/>
         </p:nvPicPr>
         <p:blipFill>
-          <a:blip r:embed="rId2"/>
+          <a:blip r:embed="rId2">
+            <a:extLst>
+              <a:ext uri="{28A0092B-C50C-407E-A947-70E740481C1C}">
+                <a14:useLocalDpi xmlns:a14="http://schemas.microsoft.com/office/drawing/2010/main" val="0"/>
+              </a:ext>
+              <a:ext uri="{96DAC541-7B7A-43D3-8B79-37D633B846F1}">
+                <asvg:svgBlip xmlns:asvg="http://schemas.microsoft.com/office/drawing/2016/SVG/main" r:embed="rId3"/>
+              </a:ext>
+            </a:extLst>
+          </a:blip>
           <a:stretch>
             <a:fillRect/>
           </a:stretch>
         </p:blipFill>
         <p:spPr>
           <a:xfrm>
-            <a:off x="3018139" y="0"/>
-            <a:ext cx="6155721" cy="6858000"/>
+            <a:off x="2683042" y="16042"/>
+            <a:ext cx="6825915" cy="6825915"/>
           </a:xfrm>
           <a:prstGeom prst="rect">
             <a:avLst/>
@@ -9868,7 +10034,7 @@
                 </a:effectLst>
                 <a:latin typeface="Segoe UI Light"/>
               </a:rPr>
-              <a:t>Key Vault</a:t>
+              <a:t>Power Platform</a:t>
             </a:r>
           </a:p>
         </p:txBody>
@@ -9876,7 +10042,7 @@
     </p:spTree>
     <p:extLst>
       <p:ext uri="{BB962C8B-B14F-4D97-AF65-F5344CB8AC3E}">
-        <p14:creationId xmlns:p14="http://schemas.microsoft.com/office/powerpoint/2010/main" val="1384612691"/>
+        <p14:creationId xmlns:p14="http://schemas.microsoft.com/office/powerpoint/2010/main" val="2067566175"/>
       </p:ext>
     </p:extLst>
   </p:cSld>
@@ -9991,6 +10157,1764 @@
       </p:grpSpPr>
       <p:pic>
         <p:nvPicPr>
+          <p:cNvPr id="4" name="Graphic 3">
+            <a:extLst>
+              <a:ext uri="{FF2B5EF4-FFF2-40B4-BE49-F238E27FC236}">
+                <a16:creationId xmlns:a16="http://schemas.microsoft.com/office/drawing/2014/main" id="{FE222D1F-E2F3-4F62-838F-ED20E5F9C5BF}"/>
+              </a:ext>
+            </a:extLst>
+          </p:cNvPr>
+          <p:cNvPicPr>
+            <a:picLocks noChangeAspect="1"/>
+          </p:cNvPicPr>
+          <p:nvPr/>
+        </p:nvPicPr>
+        <p:blipFill>
+          <a:blip r:embed="rId2">
+            <a:extLst>
+              <a:ext uri="{28A0092B-C50C-407E-A947-70E740481C1C}">
+                <a14:useLocalDpi xmlns:a14="http://schemas.microsoft.com/office/drawing/2010/main" val="0"/>
+              </a:ext>
+              <a:ext uri="{96DAC541-7B7A-43D3-8B79-37D633B846F1}">
+                <asvg:svgBlip xmlns:asvg="http://schemas.microsoft.com/office/drawing/2016/SVG/main" r:embed="rId3"/>
+              </a:ext>
+            </a:extLst>
+          </a:blip>
+          <a:stretch>
+            <a:fillRect/>
+          </a:stretch>
+        </p:blipFill>
+        <p:spPr>
+          <a:xfrm>
+            <a:off x="2667000" y="0"/>
+            <a:ext cx="6858000" cy="6858000"/>
+          </a:xfrm>
+          <a:prstGeom prst="rect">
+            <a:avLst/>
+          </a:prstGeom>
+        </p:spPr>
+      </p:pic>
+      <p:sp>
+        <p:nvSpPr>
+          <p:cNvPr id="9" name="Title 2">
+            <a:extLst>
+              <a:ext uri="{FF2B5EF4-FFF2-40B4-BE49-F238E27FC236}">
+                <a16:creationId xmlns:a16="http://schemas.microsoft.com/office/drawing/2014/main" id="{CB877719-98D4-4914-B56E-634238E5C0E6}"/>
+              </a:ext>
+            </a:extLst>
+          </p:cNvPr>
+          <p:cNvSpPr txBox="1">
+            <a:spLocks/>
+          </p:cNvSpPr>
+          <p:nvPr/>
+        </p:nvSpPr>
+        <p:spPr>
+          <a:xfrm>
+            <a:off x="1" y="2834881"/>
+            <a:ext cx="12191999" cy="1191639"/>
+          </a:xfrm>
+          <a:prstGeom prst="rect">
+            <a:avLst/>
+          </a:prstGeom>
+          <a:solidFill>
+            <a:schemeClr val="bg1">
+              <a:alpha val="50000"/>
+            </a:schemeClr>
+          </a:solidFill>
+        </p:spPr>
+        <p:txBody>
+          <a:bodyPr vert="horz" wrap="square" lIns="143428" tIns="89642" rIns="143428" bIns="89642" rtlCol="0" anchor="t" anchorCtr="0">
+            <a:noAutofit/>
+          </a:bodyPr>
+          <a:lstStyle>
+            <a:lvl1pPr algn="l" defTabSz="932578" rtl="0" eaLnBrk="1" latinLnBrk="0" hangingPunct="1">
+              <a:lnSpc>
+                <a:spcPct val="90000"/>
+              </a:lnSpc>
+              <a:spcBef>
+                <a:spcPct val="0"/>
+              </a:spcBef>
+              <a:buNone/>
+              <a:defRPr lang="en-US" sz="5999" b="0" kern="1200" cap="none" spc="-100" baseline="0">
+                <a:ln w="3175">
+                  <a:noFill/>
+                </a:ln>
+                <a:gradFill>
+                  <a:gsLst>
+                    <a:gs pos="3333">
+                      <a:schemeClr val="tx1"/>
+                    </a:gs>
+                    <a:gs pos="39000">
+                      <a:schemeClr val="tx1"/>
+                    </a:gs>
+                  </a:gsLst>
+                  <a:lin ang="5400000" scaled="0"/>
+                </a:gradFill>
+                <a:effectLst/>
+                <a:latin typeface="+mj-lt"/>
+                <a:ea typeface="+mn-ea"/>
+                <a:cs typeface="Segoe UI" pitchFamily="34" charset="0"/>
+              </a:defRPr>
+            </a:lvl1pPr>
+          </a:lstStyle>
+          <a:p>
+            <a:pPr algn="ctr">
+              <a:spcBef>
+                <a:spcPts val="1200"/>
+              </a:spcBef>
+              <a:spcAft>
+                <a:spcPts val="1200"/>
+              </a:spcAft>
+              <a:defRPr/>
+            </a:pPr>
+            <a:r>
+              <a:rPr lang="en-GB" sz="7200" b="1" dirty="0">
+                <a:solidFill>
+                  <a:schemeClr val="tx1"/>
+                </a:solidFill>
+                <a:effectLst>
+                  <a:outerShdw blurRad="38100" dist="38100" dir="2700000" algn="tl">
+                    <a:srgbClr val="000000">
+                      <a:alpha val="43137"/>
+                    </a:srgbClr>
+                  </a:outerShdw>
+                </a:effectLst>
+                <a:latin typeface="Segoe UI Light"/>
+              </a:rPr>
+              <a:t>App Services</a:t>
+            </a:r>
+          </a:p>
+        </p:txBody>
+      </p:sp>
+    </p:spTree>
+    <p:extLst>
+      <p:ext uri="{BB962C8B-B14F-4D97-AF65-F5344CB8AC3E}">
+        <p14:creationId xmlns:p14="http://schemas.microsoft.com/office/powerpoint/2010/main" val="4014089120"/>
+      </p:ext>
+    </p:extLst>
+  </p:cSld>
+  <p:clrMapOvr>
+    <a:masterClrMapping/>
+  </p:clrMapOvr>
+  <p:timing>
+    <p:tnLst>
+      <p:par>
+        <p:cTn id="1" dur="indefinite" restart="never" nodeType="tmRoot">
+          <p:childTnLst>
+            <p:seq concurrent="1" nextAc="seek">
+              <p:cTn id="2" dur="indefinite" nodeType="mainSeq">
+                <p:childTnLst>
+                  <p:par>
+                    <p:cTn id="3" fill="hold">
+                      <p:stCondLst>
+                        <p:cond delay="indefinite"/>
+                      </p:stCondLst>
+                      <p:childTnLst>
+                        <p:par>
+                          <p:cTn id="4" fill="hold">
+                            <p:stCondLst>
+                              <p:cond delay="0"/>
+                            </p:stCondLst>
+                            <p:childTnLst>
+                              <p:par>
+                                <p:cTn id="5" presetID="10" presetClass="entr" presetSubtype="0" fill="hold" grpId="0" nodeType="clickEffect">
+                                  <p:stCondLst>
+                                    <p:cond delay="0"/>
+                                  </p:stCondLst>
+                                  <p:childTnLst>
+                                    <p:set>
+                                      <p:cBhvr>
+                                        <p:cTn id="6" dur="1" fill="hold">
+                                          <p:stCondLst>
+                                            <p:cond delay="0"/>
+                                          </p:stCondLst>
+                                        </p:cTn>
+                                        <p:tgtEl>
+                                          <p:spTgt spid="9"/>
+                                        </p:tgtEl>
+                                        <p:attrNameLst>
+                                          <p:attrName>style.visibility</p:attrName>
+                                        </p:attrNameLst>
+                                      </p:cBhvr>
+                                      <p:to>
+                                        <p:strVal val="visible"/>
+                                      </p:to>
+                                    </p:set>
+                                    <p:animEffect transition="in" filter="fade">
+                                      <p:cBhvr>
+                                        <p:cTn id="7" dur="500"/>
+                                        <p:tgtEl>
+                                          <p:spTgt spid="9"/>
+                                        </p:tgtEl>
+                                      </p:cBhvr>
+                                    </p:animEffect>
+                                  </p:childTnLst>
+                                </p:cTn>
+                              </p:par>
+                            </p:childTnLst>
+                          </p:cTn>
+                        </p:par>
+                      </p:childTnLst>
+                    </p:cTn>
+                  </p:par>
+                </p:childTnLst>
+              </p:cTn>
+              <p:prevCondLst>
+                <p:cond evt="onPrev" delay="0">
+                  <p:tgtEl>
+                    <p:sldTgt/>
+                  </p:tgtEl>
+                </p:cond>
+              </p:prevCondLst>
+              <p:nextCondLst>
+                <p:cond evt="onNext" delay="0">
+                  <p:tgtEl>
+                    <p:sldTgt/>
+                  </p:tgtEl>
+                </p:cond>
+              </p:nextCondLst>
+            </p:seq>
+          </p:childTnLst>
+        </p:cTn>
+      </p:par>
+    </p:tnLst>
+    <p:bldLst>
+      <p:bldP spid="9" grpId="0" animBg="1"/>
+    </p:bldLst>
+  </p:timing>
+</p:sld>
+</file>
+
+<file path=ppt/slides/slide35.xml><?xml version="1.0" encoding="utf-8"?>
+<p:sld xmlns:a="http://schemas.openxmlformats.org/drawingml/2006/main" xmlns:r="http://schemas.openxmlformats.org/officeDocument/2006/relationships" xmlns:p="http://schemas.openxmlformats.org/presentationml/2006/main">
+  <p:cSld>
+    <p:spTree>
+      <p:nvGrpSpPr>
+        <p:cNvPr id="1" name=""/>
+        <p:cNvGrpSpPr/>
+        <p:nvPr/>
+      </p:nvGrpSpPr>
+      <p:grpSpPr>
+        <a:xfrm>
+          <a:off x="0" y="0"/>
+          <a:ext cx="0" cy="0"/>
+          <a:chOff x="0" y="0"/>
+          <a:chExt cx="0" cy="0"/>
+        </a:xfrm>
+      </p:grpSpPr>
+      <p:pic>
+        <p:nvPicPr>
+          <p:cNvPr id="3" name="Graphic 2">
+            <a:extLst>
+              <a:ext uri="{FF2B5EF4-FFF2-40B4-BE49-F238E27FC236}">
+                <a16:creationId xmlns:a16="http://schemas.microsoft.com/office/drawing/2014/main" id="{C7279561-04F4-485C-BCA4-E9A3BF2D6EC6}"/>
+              </a:ext>
+            </a:extLst>
+          </p:cNvPr>
+          <p:cNvPicPr>
+            <a:picLocks noChangeAspect="1"/>
+          </p:cNvPicPr>
+          <p:nvPr/>
+        </p:nvPicPr>
+        <p:blipFill>
+          <a:blip r:embed="rId2">
+            <a:extLst>
+              <a:ext uri="{28A0092B-C50C-407E-A947-70E740481C1C}">
+                <a14:useLocalDpi xmlns:a14="http://schemas.microsoft.com/office/drawing/2010/main" val="0"/>
+              </a:ext>
+              <a:ext uri="{96DAC541-7B7A-43D3-8B79-37D633B846F1}">
+                <asvg:svgBlip xmlns:asvg="http://schemas.microsoft.com/office/drawing/2016/SVG/main" r:embed="rId3"/>
+              </a:ext>
+            </a:extLst>
+          </a:blip>
+          <a:stretch>
+            <a:fillRect/>
+          </a:stretch>
+        </p:blipFill>
+        <p:spPr>
+          <a:xfrm>
+            <a:off x="2703095" y="36095"/>
+            <a:ext cx="6785810" cy="6785810"/>
+          </a:xfrm>
+          <a:prstGeom prst="rect">
+            <a:avLst/>
+          </a:prstGeom>
+        </p:spPr>
+      </p:pic>
+      <p:sp>
+        <p:nvSpPr>
+          <p:cNvPr id="9" name="Title 2">
+            <a:extLst>
+              <a:ext uri="{FF2B5EF4-FFF2-40B4-BE49-F238E27FC236}">
+                <a16:creationId xmlns:a16="http://schemas.microsoft.com/office/drawing/2014/main" id="{CB877719-98D4-4914-B56E-634238E5C0E6}"/>
+              </a:ext>
+            </a:extLst>
+          </p:cNvPr>
+          <p:cNvSpPr txBox="1">
+            <a:spLocks/>
+          </p:cNvSpPr>
+          <p:nvPr/>
+        </p:nvSpPr>
+        <p:spPr>
+          <a:xfrm>
+            <a:off x="1" y="2834881"/>
+            <a:ext cx="12191999" cy="1191639"/>
+          </a:xfrm>
+          <a:prstGeom prst="rect">
+            <a:avLst/>
+          </a:prstGeom>
+          <a:solidFill>
+            <a:schemeClr val="bg1">
+              <a:alpha val="50000"/>
+            </a:schemeClr>
+          </a:solidFill>
+        </p:spPr>
+        <p:txBody>
+          <a:bodyPr vert="horz" wrap="square" lIns="143428" tIns="89642" rIns="143428" bIns="89642" rtlCol="0" anchor="t" anchorCtr="0">
+            <a:noAutofit/>
+          </a:bodyPr>
+          <a:lstStyle>
+            <a:lvl1pPr algn="l" defTabSz="932578" rtl="0" eaLnBrk="1" latinLnBrk="0" hangingPunct="1">
+              <a:lnSpc>
+                <a:spcPct val="90000"/>
+              </a:lnSpc>
+              <a:spcBef>
+                <a:spcPct val="0"/>
+              </a:spcBef>
+              <a:buNone/>
+              <a:defRPr lang="en-US" sz="5999" b="0" kern="1200" cap="none" spc="-100" baseline="0">
+                <a:ln w="3175">
+                  <a:noFill/>
+                </a:ln>
+                <a:gradFill>
+                  <a:gsLst>
+                    <a:gs pos="3333">
+                      <a:schemeClr val="tx1"/>
+                    </a:gs>
+                    <a:gs pos="39000">
+                      <a:schemeClr val="tx1"/>
+                    </a:gs>
+                  </a:gsLst>
+                  <a:lin ang="5400000" scaled="0"/>
+                </a:gradFill>
+                <a:effectLst/>
+                <a:latin typeface="+mj-lt"/>
+                <a:ea typeface="+mn-ea"/>
+                <a:cs typeface="Segoe UI" pitchFamily="34" charset="0"/>
+              </a:defRPr>
+            </a:lvl1pPr>
+          </a:lstStyle>
+          <a:p>
+            <a:pPr algn="ctr">
+              <a:spcBef>
+                <a:spcPts val="1200"/>
+              </a:spcBef>
+              <a:spcAft>
+                <a:spcPts val="1200"/>
+              </a:spcAft>
+              <a:defRPr/>
+            </a:pPr>
+            <a:r>
+              <a:rPr lang="en-GB" sz="7200" b="1" dirty="0">
+                <a:solidFill>
+                  <a:schemeClr val="tx1"/>
+                </a:solidFill>
+                <a:effectLst>
+                  <a:outerShdw blurRad="38100" dist="38100" dir="2700000" algn="tl">
+                    <a:srgbClr val="000000">
+                      <a:alpha val="43137"/>
+                    </a:srgbClr>
+                  </a:outerShdw>
+                </a:effectLst>
+                <a:latin typeface="Segoe UI Light"/>
+              </a:rPr>
+              <a:t>Log Analytics</a:t>
+            </a:r>
+          </a:p>
+        </p:txBody>
+      </p:sp>
+    </p:spTree>
+    <p:extLst>
+      <p:ext uri="{BB962C8B-B14F-4D97-AF65-F5344CB8AC3E}">
+        <p14:creationId xmlns:p14="http://schemas.microsoft.com/office/powerpoint/2010/main" val="3401418368"/>
+      </p:ext>
+    </p:extLst>
+  </p:cSld>
+  <p:clrMapOvr>
+    <a:masterClrMapping/>
+  </p:clrMapOvr>
+  <p:timing>
+    <p:tnLst>
+      <p:par>
+        <p:cTn id="1" dur="indefinite" restart="never" nodeType="tmRoot">
+          <p:childTnLst>
+            <p:seq concurrent="1" nextAc="seek">
+              <p:cTn id="2" dur="indefinite" nodeType="mainSeq">
+                <p:childTnLst>
+                  <p:par>
+                    <p:cTn id="3" fill="hold">
+                      <p:stCondLst>
+                        <p:cond delay="indefinite"/>
+                      </p:stCondLst>
+                      <p:childTnLst>
+                        <p:par>
+                          <p:cTn id="4" fill="hold">
+                            <p:stCondLst>
+                              <p:cond delay="0"/>
+                            </p:stCondLst>
+                            <p:childTnLst>
+                              <p:par>
+                                <p:cTn id="5" presetID="10" presetClass="entr" presetSubtype="0" fill="hold" grpId="0" nodeType="clickEffect">
+                                  <p:stCondLst>
+                                    <p:cond delay="0"/>
+                                  </p:stCondLst>
+                                  <p:childTnLst>
+                                    <p:set>
+                                      <p:cBhvr>
+                                        <p:cTn id="6" dur="1" fill="hold">
+                                          <p:stCondLst>
+                                            <p:cond delay="0"/>
+                                          </p:stCondLst>
+                                        </p:cTn>
+                                        <p:tgtEl>
+                                          <p:spTgt spid="9"/>
+                                        </p:tgtEl>
+                                        <p:attrNameLst>
+                                          <p:attrName>style.visibility</p:attrName>
+                                        </p:attrNameLst>
+                                      </p:cBhvr>
+                                      <p:to>
+                                        <p:strVal val="visible"/>
+                                      </p:to>
+                                    </p:set>
+                                    <p:animEffect transition="in" filter="fade">
+                                      <p:cBhvr>
+                                        <p:cTn id="7" dur="500"/>
+                                        <p:tgtEl>
+                                          <p:spTgt spid="9"/>
+                                        </p:tgtEl>
+                                      </p:cBhvr>
+                                    </p:animEffect>
+                                  </p:childTnLst>
+                                </p:cTn>
+                              </p:par>
+                            </p:childTnLst>
+                          </p:cTn>
+                        </p:par>
+                      </p:childTnLst>
+                    </p:cTn>
+                  </p:par>
+                </p:childTnLst>
+              </p:cTn>
+              <p:prevCondLst>
+                <p:cond evt="onPrev" delay="0">
+                  <p:tgtEl>
+                    <p:sldTgt/>
+                  </p:tgtEl>
+                </p:cond>
+              </p:prevCondLst>
+              <p:nextCondLst>
+                <p:cond evt="onNext" delay="0">
+                  <p:tgtEl>
+                    <p:sldTgt/>
+                  </p:tgtEl>
+                </p:cond>
+              </p:nextCondLst>
+            </p:seq>
+          </p:childTnLst>
+        </p:cTn>
+      </p:par>
+    </p:tnLst>
+    <p:bldLst>
+      <p:bldP spid="9" grpId="0" animBg="1"/>
+    </p:bldLst>
+  </p:timing>
+</p:sld>
+</file>
+
+<file path=ppt/slides/slide36.xml><?xml version="1.0" encoding="utf-8"?>
+<p:sld xmlns:a="http://schemas.openxmlformats.org/drawingml/2006/main" xmlns:r="http://schemas.openxmlformats.org/officeDocument/2006/relationships" xmlns:p="http://schemas.openxmlformats.org/presentationml/2006/main">
+  <p:cSld>
+    <p:spTree>
+      <p:nvGrpSpPr>
+        <p:cNvPr id="1" name=""/>
+        <p:cNvGrpSpPr/>
+        <p:nvPr/>
+      </p:nvGrpSpPr>
+      <p:grpSpPr>
+        <a:xfrm>
+          <a:off x="0" y="0"/>
+          <a:ext cx="0" cy="0"/>
+          <a:chOff x="0" y="0"/>
+          <a:chExt cx="0" cy="0"/>
+        </a:xfrm>
+      </p:grpSpPr>
+      <p:pic>
+        <p:nvPicPr>
+          <p:cNvPr id="4" name="Graphic 3">
+            <a:extLst>
+              <a:ext uri="{FF2B5EF4-FFF2-40B4-BE49-F238E27FC236}">
+                <a16:creationId xmlns:a16="http://schemas.microsoft.com/office/drawing/2014/main" id="{8528BD4B-3CA5-4571-AAC9-498E0D05D072}"/>
+              </a:ext>
+            </a:extLst>
+          </p:cNvPr>
+          <p:cNvPicPr>
+            <a:picLocks noChangeAspect="1"/>
+          </p:cNvPicPr>
+          <p:nvPr/>
+        </p:nvPicPr>
+        <p:blipFill>
+          <a:blip r:embed="rId2">
+            <a:extLst>
+              <a:ext uri="{28A0092B-C50C-407E-A947-70E740481C1C}">
+                <a14:useLocalDpi xmlns:a14="http://schemas.microsoft.com/office/drawing/2010/main" val="0"/>
+              </a:ext>
+              <a:ext uri="{96DAC541-7B7A-43D3-8B79-37D633B846F1}">
+                <asvg:svgBlip xmlns:asvg="http://schemas.microsoft.com/office/drawing/2016/SVG/main" r:embed="rId3"/>
+              </a:ext>
+            </a:extLst>
+          </a:blip>
+          <a:stretch>
+            <a:fillRect/>
+          </a:stretch>
+        </p:blipFill>
+        <p:spPr>
+          <a:xfrm>
+            <a:off x="2658978" y="0"/>
+            <a:ext cx="6874043" cy="6874043"/>
+          </a:xfrm>
+          <a:prstGeom prst="rect">
+            <a:avLst/>
+          </a:prstGeom>
+        </p:spPr>
+      </p:pic>
+      <p:sp>
+        <p:nvSpPr>
+          <p:cNvPr id="9" name="Title 2">
+            <a:extLst>
+              <a:ext uri="{FF2B5EF4-FFF2-40B4-BE49-F238E27FC236}">
+                <a16:creationId xmlns:a16="http://schemas.microsoft.com/office/drawing/2014/main" id="{CB877719-98D4-4914-B56E-634238E5C0E6}"/>
+              </a:ext>
+            </a:extLst>
+          </p:cNvPr>
+          <p:cNvSpPr txBox="1">
+            <a:spLocks/>
+          </p:cNvSpPr>
+          <p:nvPr/>
+        </p:nvSpPr>
+        <p:spPr>
+          <a:xfrm>
+            <a:off x="1" y="2834881"/>
+            <a:ext cx="12191999" cy="1191639"/>
+          </a:xfrm>
+          <a:prstGeom prst="rect">
+            <a:avLst/>
+          </a:prstGeom>
+          <a:solidFill>
+            <a:schemeClr val="bg1">
+              <a:alpha val="50000"/>
+            </a:schemeClr>
+          </a:solidFill>
+        </p:spPr>
+        <p:txBody>
+          <a:bodyPr vert="horz" wrap="square" lIns="143428" tIns="89642" rIns="143428" bIns="89642" rtlCol="0" anchor="t" anchorCtr="0">
+            <a:noAutofit/>
+          </a:bodyPr>
+          <a:lstStyle>
+            <a:lvl1pPr algn="l" defTabSz="932578" rtl="0" eaLnBrk="1" latinLnBrk="0" hangingPunct="1">
+              <a:lnSpc>
+                <a:spcPct val="90000"/>
+              </a:lnSpc>
+              <a:spcBef>
+                <a:spcPct val="0"/>
+              </a:spcBef>
+              <a:buNone/>
+              <a:defRPr lang="en-US" sz="5999" b="0" kern="1200" cap="none" spc="-100" baseline="0">
+                <a:ln w="3175">
+                  <a:noFill/>
+                </a:ln>
+                <a:gradFill>
+                  <a:gsLst>
+                    <a:gs pos="3333">
+                      <a:schemeClr val="tx1"/>
+                    </a:gs>
+                    <a:gs pos="39000">
+                      <a:schemeClr val="tx1"/>
+                    </a:gs>
+                  </a:gsLst>
+                  <a:lin ang="5400000" scaled="0"/>
+                </a:gradFill>
+                <a:effectLst/>
+                <a:latin typeface="+mj-lt"/>
+                <a:ea typeface="+mn-ea"/>
+                <a:cs typeface="Segoe UI" pitchFamily="34" charset="0"/>
+              </a:defRPr>
+            </a:lvl1pPr>
+          </a:lstStyle>
+          <a:p>
+            <a:pPr algn="ctr">
+              <a:spcBef>
+                <a:spcPts val="1200"/>
+              </a:spcBef>
+              <a:spcAft>
+                <a:spcPts val="1200"/>
+              </a:spcAft>
+              <a:defRPr/>
+            </a:pPr>
+            <a:r>
+              <a:rPr lang="en-GB" sz="7200" b="1" dirty="0">
+                <a:solidFill>
+                  <a:schemeClr val="tx1"/>
+                </a:solidFill>
+                <a:effectLst>
+                  <a:outerShdw blurRad="38100" dist="38100" dir="2700000" algn="tl">
+                    <a:srgbClr val="000000">
+                      <a:alpha val="43137"/>
+                    </a:srgbClr>
+                  </a:outerShdw>
+                </a:effectLst>
+                <a:latin typeface="Segoe UI Light"/>
+              </a:rPr>
+              <a:t>Data Box</a:t>
+            </a:r>
+          </a:p>
+        </p:txBody>
+      </p:sp>
+    </p:spTree>
+    <p:extLst>
+      <p:ext uri="{BB962C8B-B14F-4D97-AF65-F5344CB8AC3E}">
+        <p14:creationId xmlns:p14="http://schemas.microsoft.com/office/powerpoint/2010/main" val="1768089092"/>
+      </p:ext>
+    </p:extLst>
+  </p:cSld>
+  <p:clrMapOvr>
+    <a:masterClrMapping/>
+  </p:clrMapOvr>
+  <p:timing>
+    <p:tnLst>
+      <p:par>
+        <p:cTn id="1" dur="indefinite" restart="never" nodeType="tmRoot">
+          <p:childTnLst>
+            <p:seq concurrent="1" nextAc="seek">
+              <p:cTn id="2" dur="indefinite" nodeType="mainSeq">
+                <p:childTnLst>
+                  <p:par>
+                    <p:cTn id="3" fill="hold">
+                      <p:stCondLst>
+                        <p:cond delay="indefinite"/>
+                      </p:stCondLst>
+                      <p:childTnLst>
+                        <p:par>
+                          <p:cTn id="4" fill="hold">
+                            <p:stCondLst>
+                              <p:cond delay="0"/>
+                            </p:stCondLst>
+                            <p:childTnLst>
+                              <p:par>
+                                <p:cTn id="5" presetID="10" presetClass="entr" presetSubtype="0" fill="hold" grpId="0" nodeType="clickEffect">
+                                  <p:stCondLst>
+                                    <p:cond delay="0"/>
+                                  </p:stCondLst>
+                                  <p:childTnLst>
+                                    <p:set>
+                                      <p:cBhvr>
+                                        <p:cTn id="6" dur="1" fill="hold">
+                                          <p:stCondLst>
+                                            <p:cond delay="0"/>
+                                          </p:stCondLst>
+                                        </p:cTn>
+                                        <p:tgtEl>
+                                          <p:spTgt spid="9"/>
+                                        </p:tgtEl>
+                                        <p:attrNameLst>
+                                          <p:attrName>style.visibility</p:attrName>
+                                        </p:attrNameLst>
+                                      </p:cBhvr>
+                                      <p:to>
+                                        <p:strVal val="visible"/>
+                                      </p:to>
+                                    </p:set>
+                                    <p:animEffect transition="in" filter="fade">
+                                      <p:cBhvr>
+                                        <p:cTn id="7" dur="500"/>
+                                        <p:tgtEl>
+                                          <p:spTgt spid="9"/>
+                                        </p:tgtEl>
+                                      </p:cBhvr>
+                                    </p:animEffect>
+                                  </p:childTnLst>
+                                </p:cTn>
+                              </p:par>
+                            </p:childTnLst>
+                          </p:cTn>
+                        </p:par>
+                      </p:childTnLst>
+                    </p:cTn>
+                  </p:par>
+                </p:childTnLst>
+              </p:cTn>
+              <p:prevCondLst>
+                <p:cond evt="onPrev" delay="0">
+                  <p:tgtEl>
+                    <p:sldTgt/>
+                  </p:tgtEl>
+                </p:cond>
+              </p:prevCondLst>
+              <p:nextCondLst>
+                <p:cond evt="onNext" delay="0">
+                  <p:tgtEl>
+                    <p:sldTgt/>
+                  </p:tgtEl>
+                </p:cond>
+              </p:nextCondLst>
+            </p:seq>
+          </p:childTnLst>
+        </p:cTn>
+      </p:par>
+    </p:tnLst>
+    <p:bldLst>
+      <p:bldP spid="9" grpId="0" animBg="1"/>
+    </p:bldLst>
+  </p:timing>
+</p:sld>
+</file>
+
+<file path=ppt/slides/slide37.xml><?xml version="1.0" encoding="utf-8"?>
+<p:sld xmlns:a="http://schemas.openxmlformats.org/drawingml/2006/main" xmlns:r="http://schemas.openxmlformats.org/officeDocument/2006/relationships" xmlns:p="http://schemas.openxmlformats.org/presentationml/2006/main">
+  <p:cSld>
+    <p:spTree>
+      <p:nvGrpSpPr>
+        <p:cNvPr id="1" name=""/>
+        <p:cNvGrpSpPr/>
+        <p:nvPr/>
+      </p:nvGrpSpPr>
+      <p:grpSpPr>
+        <a:xfrm>
+          <a:off x="0" y="0"/>
+          <a:ext cx="0" cy="0"/>
+          <a:chOff x="0" y="0"/>
+          <a:chExt cx="0" cy="0"/>
+        </a:xfrm>
+      </p:grpSpPr>
+      <p:pic>
+        <p:nvPicPr>
+          <p:cNvPr id="3" name="Graphic 2">
+            <a:extLst>
+              <a:ext uri="{FF2B5EF4-FFF2-40B4-BE49-F238E27FC236}">
+                <a16:creationId xmlns:a16="http://schemas.microsoft.com/office/drawing/2014/main" id="{C517C541-0EB2-4099-A7EE-9E1BA016C6DC}"/>
+              </a:ext>
+            </a:extLst>
+          </p:cNvPr>
+          <p:cNvPicPr>
+            <a:picLocks noChangeAspect="1"/>
+          </p:cNvPicPr>
+          <p:nvPr/>
+        </p:nvPicPr>
+        <p:blipFill>
+          <a:blip r:embed="rId2">
+            <a:extLst>
+              <a:ext uri="{28A0092B-C50C-407E-A947-70E740481C1C}">
+                <a14:useLocalDpi xmlns:a14="http://schemas.microsoft.com/office/drawing/2010/main" val="0"/>
+              </a:ext>
+              <a:ext uri="{96DAC541-7B7A-43D3-8B79-37D633B846F1}">
+                <asvg:svgBlip xmlns:asvg="http://schemas.microsoft.com/office/drawing/2016/SVG/main" r:embed="rId3"/>
+              </a:ext>
+            </a:extLst>
+          </a:blip>
+          <a:stretch>
+            <a:fillRect/>
+          </a:stretch>
+        </p:blipFill>
+        <p:spPr>
+          <a:xfrm>
+            <a:off x="2654968" y="0"/>
+            <a:ext cx="6882064" cy="6882064"/>
+          </a:xfrm>
+          <a:prstGeom prst="rect">
+            <a:avLst/>
+          </a:prstGeom>
+        </p:spPr>
+      </p:pic>
+      <p:sp>
+        <p:nvSpPr>
+          <p:cNvPr id="9" name="Title 2">
+            <a:extLst>
+              <a:ext uri="{FF2B5EF4-FFF2-40B4-BE49-F238E27FC236}">
+                <a16:creationId xmlns:a16="http://schemas.microsoft.com/office/drawing/2014/main" id="{CB877719-98D4-4914-B56E-634238E5C0E6}"/>
+              </a:ext>
+            </a:extLst>
+          </p:cNvPr>
+          <p:cNvSpPr txBox="1">
+            <a:spLocks/>
+          </p:cNvSpPr>
+          <p:nvPr/>
+        </p:nvSpPr>
+        <p:spPr>
+          <a:xfrm>
+            <a:off x="1" y="2834881"/>
+            <a:ext cx="12191999" cy="1191639"/>
+          </a:xfrm>
+          <a:prstGeom prst="rect">
+            <a:avLst/>
+          </a:prstGeom>
+          <a:solidFill>
+            <a:schemeClr val="bg1">
+              <a:alpha val="50000"/>
+            </a:schemeClr>
+          </a:solidFill>
+        </p:spPr>
+        <p:txBody>
+          <a:bodyPr vert="horz" wrap="square" lIns="143428" tIns="89642" rIns="143428" bIns="89642" rtlCol="0" anchor="t" anchorCtr="0">
+            <a:noAutofit/>
+          </a:bodyPr>
+          <a:lstStyle>
+            <a:lvl1pPr algn="l" defTabSz="932578" rtl="0" eaLnBrk="1" latinLnBrk="0" hangingPunct="1">
+              <a:lnSpc>
+                <a:spcPct val="90000"/>
+              </a:lnSpc>
+              <a:spcBef>
+                <a:spcPct val="0"/>
+              </a:spcBef>
+              <a:buNone/>
+              <a:defRPr lang="en-US" sz="5999" b="0" kern="1200" cap="none" spc="-100" baseline="0">
+                <a:ln w="3175">
+                  <a:noFill/>
+                </a:ln>
+                <a:gradFill>
+                  <a:gsLst>
+                    <a:gs pos="3333">
+                      <a:schemeClr val="tx1"/>
+                    </a:gs>
+                    <a:gs pos="39000">
+                      <a:schemeClr val="tx1"/>
+                    </a:gs>
+                  </a:gsLst>
+                  <a:lin ang="5400000" scaled="0"/>
+                </a:gradFill>
+                <a:effectLst/>
+                <a:latin typeface="+mj-lt"/>
+                <a:ea typeface="+mn-ea"/>
+                <a:cs typeface="Segoe UI" pitchFamily="34" charset="0"/>
+              </a:defRPr>
+            </a:lvl1pPr>
+          </a:lstStyle>
+          <a:p>
+            <a:pPr algn="ctr">
+              <a:spcBef>
+                <a:spcPts val="1200"/>
+              </a:spcBef>
+              <a:spcAft>
+                <a:spcPts val="1200"/>
+              </a:spcAft>
+              <a:defRPr/>
+            </a:pPr>
+            <a:r>
+              <a:rPr lang="en-GB" sz="7200" b="1" dirty="0">
+                <a:solidFill>
+                  <a:schemeClr val="tx1"/>
+                </a:solidFill>
+                <a:effectLst>
+                  <a:outerShdw blurRad="38100" dist="38100" dir="2700000" algn="tl">
+                    <a:srgbClr val="000000">
+                      <a:alpha val="43137"/>
+                    </a:srgbClr>
+                  </a:outerShdw>
+                </a:effectLst>
+                <a:latin typeface="Segoe UI Light"/>
+              </a:rPr>
+              <a:t>Data Explorer</a:t>
+            </a:r>
+          </a:p>
+        </p:txBody>
+      </p:sp>
+    </p:spTree>
+    <p:extLst>
+      <p:ext uri="{BB962C8B-B14F-4D97-AF65-F5344CB8AC3E}">
+        <p14:creationId xmlns:p14="http://schemas.microsoft.com/office/powerpoint/2010/main" val="3105477433"/>
+      </p:ext>
+    </p:extLst>
+  </p:cSld>
+  <p:clrMapOvr>
+    <a:masterClrMapping/>
+  </p:clrMapOvr>
+  <p:timing>
+    <p:tnLst>
+      <p:par>
+        <p:cTn id="1" dur="indefinite" restart="never" nodeType="tmRoot">
+          <p:childTnLst>
+            <p:seq concurrent="1" nextAc="seek">
+              <p:cTn id="2" dur="indefinite" nodeType="mainSeq">
+                <p:childTnLst>
+                  <p:par>
+                    <p:cTn id="3" fill="hold">
+                      <p:stCondLst>
+                        <p:cond delay="indefinite"/>
+                      </p:stCondLst>
+                      <p:childTnLst>
+                        <p:par>
+                          <p:cTn id="4" fill="hold">
+                            <p:stCondLst>
+                              <p:cond delay="0"/>
+                            </p:stCondLst>
+                            <p:childTnLst>
+                              <p:par>
+                                <p:cTn id="5" presetID="10" presetClass="entr" presetSubtype="0" fill="hold" grpId="0" nodeType="clickEffect">
+                                  <p:stCondLst>
+                                    <p:cond delay="0"/>
+                                  </p:stCondLst>
+                                  <p:childTnLst>
+                                    <p:set>
+                                      <p:cBhvr>
+                                        <p:cTn id="6" dur="1" fill="hold">
+                                          <p:stCondLst>
+                                            <p:cond delay="0"/>
+                                          </p:stCondLst>
+                                        </p:cTn>
+                                        <p:tgtEl>
+                                          <p:spTgt spid="9"/>
+                                        </p:tgtEl>
+                                        <p:attrNameLst>
+                                          <p:attrName>style.visibility</p:attrName>
+                                        </p:attrNameLst>
+                                      </p:cBhvr>
+                                      <p:to>
+                                        <p:strVal val="visible"/>
+                                      </p:to>
+                                    </p:set>
+                                    <p:animEffect transition="in" filter="fade">
+                                      <p:cBhvr>
+                                        <p:cTn id="7" dur="500"/>
+                                        <p:tgtEl>
+                                          <p:spTgt spid="9"/>
+                                        </p:tgtEl>
+                                      </p:cBhvr>
+                                    </p:animEffect>
+                                  </p:childTnLst>
+                                </p:cTn>
+                              </p:par>
+                            </p:childTnLst>
+                          </p:cTn>
+                        </p:par>
+                      </p:childTnLst>
+                    </p:cTn>
+                  </p:par>
+                </p:childTnLst>
+              </p:cTn>
+              <p:prevCondLst>
+                <p:cond evt="onPrev" delay="0">
+                  <p:tgtEl>
+                    <p:sldTgt/>
+                  </p:tgtEl>
+                </p:cond>
+              </p:prevCondLst>
+              <p:nextCondLst>
+                <p:cond evt="onNext" delay="0">
+                  <p:tgtEl>
+                    <p:sldTgt/>
+                  </p:tgtEl>
+                </p:cond>
+              </p:nextCondLst>
+            </p:seq>
+          </p:childTnLst>
+        </p:cTn>
+      </p:par>
+    </p:tnLst>
+    <p:bldLst>
+      <p:bldP spid="9" grpId="0" animBg="1"/>
+    </p:bldLst>
+  </p:timing>
+</p:sld>
+</file>
+
+<file path=ppt/slides/slide38.xml><?xml version="1.0" encoding="utf-8"?>
+<p:sld xmlns:a="http://schemas.openxmlformats.org/drawingml/2006/main" xmlns:r="http://schemas.openxmlformats.org/officeDocument/2006/relationships" xmlns:p="http://schemas.openxmlformats.org/presentationml/2006/main">
+  <p:cSld>
+    <p:spTree>
+      <p:nvGrpSpPr>
+        <p:cNvPr id="1" name=""/>
+        <p:cNvGrpSpPr/>
+        <p:nvPr/>
+      </p:nvGrpSpPr>
+      <p:grpSpPr>
+        <a:xfrm>
+          <a:off x="0" y="0"/>
+          <a:ext cx="0" cy="0"/>
+          <a:chOff x="0" y="0"/>
+          <a:chExt cx="0" cy="0"/>
+        </a:xfrm>
+      </p:grpSpPr>
+      <p:pic>
+        <p:nvPicPr>
+          <p:cNvPr id="4" name="Graphic 3">
+            <a:extLst>
+              <a:ext uri="{FF2B5EF4-FFF2-40B4-BE49-F238E27FC236}">
+                <a16:creationId xmlns:a16="http://schemas.microsoft.com/office/drawing/2014/main" id="{34A6EEBC-88B4-450A-B6AC-3DABDD34F0F2}"/>
+              </a:ext>
+            </a:extLst>
+          </p:cNvPr>
+          <p:cNvPicPr>
+            <a:picLocks noChangeAspect="1"/>
+          </p:cNvPicPr>
+          <p:nvPr/>
+        </p:nvPicPr>
+        <p:blipFill>
+          <a:blip r:embed="rId2">
+            <a:extLst>
+              <a:ext uri="{28A0092B-C50C-407E-A947-70E740481C1C}">
+                <a14:useLocalDpi xmlns:a14="http://schemas.microsoft.com/office/drawing/2010/main" val="0"/>
+              </a:ext>
+              <a:ext uri="{96DAC541-7B7A-43D3-8B79-37D633B846F1}">
+                <asvg:svgBlip xmlns:asvg="http://schemas.microsoft.com/office/drawing/2016/SVG/main" r:embed="rId3"/>
+              </a:ext>
+            </a:extLst>
+          </a:blip>
+          <a:stretch>
+            <a:fillRect/>
+          </a:stretch>
+        </p:blipFill>
+        <p:spPr>
+          <a:xfrm>
+            <a:off x="2654968" y="0"/>
+            <a:ext cx="6882064" cy="6882064"/>
+          </a:xfrm>
+          <a:prstGeom prst="rect">
+            <a:avLst/>
+          </a:prstGeom>
+        </p:spPr>
+      </p:pic>
+      <p:sp>
+        <p:nvSpPr>
+          <p:cNvPr id="9" name="Title 2">
+            <a:extLst>
+              <a:ext uri="{FF2B5EF4-FFF2-40B4-BE49-F238E27FC236}">
+                <a16:creationId xmlns:a16="http://schemas.microsoft.com/office/drawing/2014/main" id="{CB877719-98D4-4914-B56E-634238E5C0E6}"/>
+              </a:ext>
+            </a:extLst>
+          </p:cNvPr>
+          <p:cNvSpPr txBox="1">
+            <a:spLocks/>
+          </p:cNvSpPr>
+          <p:nvPr/>
+        </p:nvSpPr>
+        <p:spPr>
+          <a:xfrm>
+            <a:off x="1" y="2834881"/>
+            <a:ext cx="12191999" cy="1191639"/>
+          </a:xfrm>
+          <a:prstGeom prst="rect">
+            <a:avLst/>
+          </a:prstGeom>
+          <a:solidFill>
+            <a:schemeClr val="bg1">
+              <a:alpha val="50000"/>
+            </a:schemeClr>
+          </a:solidFill>
+        </p:spPr>
+        <p:txBody>
+          <a:bodyPr vert="horz" wrap="square" lIns="143428" tIns="89642" rIns="143428" bIns="89642" rtlCol="0" anchor="t" anchorCtr="0">
+            <a:noAutofit/>
+          </a:bodyPr>
+          <a:lstStyle>
+            <a:lvl1pPr algn="l" defTabSz="932578" rtl="0" eaLnBrk="1" latinLnBrk="0" hangingPunct="1">
+              <a:lnSpc>
+                <a:spcPct val="90000"/>
+              </a:lnSpc>
+              <a:spcBef>
+                <a:spcPct val="0"/>
+              </a:spcBef>
+              <a:buNone/>
+              <a:defRPr lang="en-US" sz="5999" b="0" kern="1200" cap="none" spc="-100" baseline="0">
+                <a:ln w="3175">
+                  <a:noFill/>
+                </a:ln>
+                <a:gradFill>
+                  <a:gsLst>
+                    <a:gs pos="3333">
+                      <a:schemeClr val="tx1"/>
+                    </a:gs>
+                    <a:gs pos="39000">
+                      <a:schemeClr val="tx1"/>
+                    </a:gs>
+                  </a:gsLst>
+                  <a:lin ang="5400000" scaled="0"/>
+                </a:gradFill>
+                <a:effectLst/>
+                <a:latin typeface="+mj-lt"/>
+                <a:ea typeface="+mn-ea"/>
+                <a:cs typeface="Segoe UI" pitchFamily="34" charset="0"/>
+              </a:defRPr>
+            </a:lvl1pPr>
+          </a:lstStyle>
+          <a:p>
+            <a:pPr algn="ctr">
+              <a:spcBef>
+                <a:spcPts val="1200"/>
+              </a:spcBef>
+              <a:spcAft>
+                <a:spcPts val="1200"/>
+              </a:spcAft>
+              <a:defRPr/>
+            </a:pPr>
+            <a:r>
+              <a:rPr lang="en-GB" sz="7200" b="1" dirty="0">
+                <a:solidFill>
+                  <a:schemeClr val="tx1"/>
+                </a:solidFill>
+                <a:effectLst>
+                  <a:outerShdw blurRad="38100" dist="38100" dir="2700000" algn="tl">
+                    <a:srgbClr val="000000">
+                      <a:alpha val="43137"/>
+                    </a:srgbClr>
+                  </a:outerShdw>
+                </a:effectLst>
+                <a:latin typeface="Segoe UI Light"/>
+              </a:rPr>
+              <a:t>Data </a:t>
+            </a:r>
+            <a:r>
+              <a:rPr lang="en-GB" sz="7200" b="1" dirty="0" err="1">
+                <a:solidFill>
+                  <a:schemeClr val="tx1"/>
+                </a:solidFill>
+                <a:effectLst>
+                  <a:outerShdw blurRad="38100" dist="38100" dir="2700000" algn="tl">
+                    <a:srgbClr val="000000">
+                      <a:alpha val="43137"/>
+                    </a:srgbClr>
+                  </a:outerShdw>
+                </a:effectLst>
+                <a:latin typeface="Segoe UI Light"/>
+              </a:rPr>
+              <a:t>Catalog</a:t>
+            </a:r>
+            <a:endParaRPr lang="en-GB" sz="7200" b="1" dirty="0">
+              <a:solidFill>
+                <a:schemeClr val="tx1"/>
+              </a:solidFill>
+              <a:effectLst>
+                <a:outerShdw blurRad="38100" dist="38100" dir="2700000" algn="tl">
+                  <a:srgbClr val="000000">
+                    <a:alpha val="43137"/>
+                  </a:srgbClr>
+                </a:outerShdw>
+              </a:effectLst>
+              <a:latin typeface="Segoe UI Light"/>
+            </a:endParaRPr>
+          </a:p>
+        </p:txBody>
+      </p:sp>
+    </p:spTree>
+    <p:extLst>
+      <p:ext uri="{BB962C8B-B14F-4D97-AF65-F5344CB8AC3E}">
+        <p14:creationId xmlns:p14="http://schemas.microsoft.com/office/powerpoint/2010/main" val="2011243451"/>
+      </p:ext>
+    </p:extLst>
+  </p:cSld>
+  <p:clrMapOvr>
+    <a:masterClrMapping/>
+  </p:clrMapOvr>
+  <p:timing>
+    <p:tnLst>
+      <p:par>
+        <p:cTn id="1" dur="indefinite" restart="never" nodeType="tmRoot">
+          <p:childTnLst>
+            <p:seq concurrent="1" nextAc="seek">
+              <p:cTn id="2" dur="indefinite" nodeType="mainSeq">
+                <p:childTnLst>
+                  <p:par>
+                    <p:cTn id="3" fill="hold">
+                      <p:stCondLst>
+                        <p:cond delay="indefinite"/>
+                      </p:stCondLst>
+                      <p:childTnLst>
+                        <p:par>
+                          <p:cTn id="4" fill="hold">
+                            <p:stCondLst>
+                              <p:cond delay="0"/>
+                            </p:stCondLst>
+                            <p:childTnLst>
+                              <p:par>
+                                <p:cTn id="5" presetID="10" presetClass="entr" presetSubtype="0" fill="hold" grpId="0" nodeType="clickEffect">
+                                  <p:stCondLst>
+                                    <p:cond delay="0"/>
+                                  </p:stCondLst>
+                                  <p:childTnLst>
+                                    <p:set>
+                                      <p:cBhvr>
+                                        <p:cTn id="6" dur="1" fill="hold">
+                                          <p:stCondLst>
+                                            <p:cond delay="0"/>
+                                          </p:stCondLst>
+                                        </p:cTn>
+                                        <p:tgtEl>
+                                          <p:spTgt spid="9"/>
+                                        </p:tgtEl>
+                                        <p:attrNameLst>
+                                          <p:attrName>style.visibility</p:attrName>
+                                        </p:attrNameLst>
+                                      </p:cBhvr>
+                                      <p:to>
+                                        <p:strVal val="visible"/>
+                                      </p:to>
+                                    </p:set>
+                                    <p:animEffect transition="in" filter="fade">
+                                      <p:cBhvr>
+                                        <p:cTn id="7" dur="500"/>
+                                        <p:tgtEl>
+                                          <p:spTgt spid="9"/>
+                                        </p:tgtEl>
+                                      </p:cBhvr>
+                                    </p:animEffect>
+                                  </p:childTnLst>
+                                </p:cTn>
+                              </p:par>
+                            </p:childTnLst>
+                          </p:cTn>
+                        </p:par>
+                      </p:childTnLst>
+                    </p:cTn>
+                  </p:par>
+                </p:childTnLst>
+              </p:cTn>
+              <p:prevCondLst>
+                <p:cond evt="onPrev" delay="0">
+                  <p:tgtEl>
+                    <p:sldTgt/>
+                  </p:tgtEl>
+                </p:cond>
+              </p:prevCondLst>
+              <p:nextCondLst>
+                <p:cond evt="onNext" delay="0">
+                  <p:tgtEl>
+                    <p:sldTgt/>
+                  </p:tgtEl>
+                </p:cond>
+              </p:nextCondLst>
+            </p:seq>
+          </p:childTnLst>
+        </p:cTn>
+      </p:par>
+    </p:tnLst>
+    <p:bldLst>
+      <p:bldP spid="9" grpId="0" animBg="1"/>
+    </p:bldLst>
+  </p:timing>
+</p:sld>
+</file>
+
+<file path=ppt/slides/slide39.xml><?xml version="1.0" encoding="utf-8"?>
+<p:sld xmlns:a="http://schemas.openxmlformats.org/drawingml/2006/main" xmlns:r="http://schemas.openxmlformats.org/officeDocument/2006/relationships" xmlns:p="http://schemas.openxmlformats.org/presentationml/2006/main">
+  <p:cSld>
+    <p:spTree>
+      <p:nvGrpSpPr>
+        <p:cNvPr id="1" name=""/>
+        <p:cNvGrpSpPr/>
+        <p:nvPr/>
+      </p:nvGrpSpPr>
+      <p:grpSpPr>
+        <a:xfrm>
+          <a:off x="0" y="0"/>
+          <a:ext cx="0" cy="0"/>
+          <a:chOff x="0" y="0"/>
+          <a:chExt cx="0" cy="0"/>
+        </a:xfrm>
+      </p:grpSpPr>
+      <p:pic>
+        <p:nvPicPr>
+          <p:cNvPr id="4" name="Graphic 3">
+            <a:extLst>
+              <a:ext uri="{FF2B5EF4-FFF2-40B4-BE49-F238E27FC236}">
+                <a16:creationId xmlns:a16="http://schemas.microsoft.com/office/drawing/2014/main" id="{860AB926-E0DD-47A3-AFFA-8E51D2E5D89D}"/>
+              </a:ext>
+            </a:extLst>
+          </p:cNvPr>
+          <p:cNvPicPr>
+            <a:picLocks noChangeAspect="1"/>
+          </p:cNvPicPr>
+          <p:nvPr/>
+        </p:nvPicPr>
+        <p:blipFill>
+          <a:blip r:embed="rId2">
+            <a:extLst>
+              <a:ext uri="{28A0092B-C50C-407E-A947-70E740481C1C}">
+                <a14:useLocalDpi xmlns:a14="http://schemas.microsoft.com/office/drawing/2010/main" val="0"/>
+              </a:ext>
+              <a:ext uri="{96DAC541-7B7A-43D3-8B79-37D633B846F1}">
+                <asvg:svgBlip xmlns:asvg="http://schemas.microsoft.com/office/drawing/2016/SVG/main" r:embed="rId3"/>
+              </a:ext>
+            </a:extLst>
+          </a:blip>
+          <a:stretch>
+            <a:fillRect/>
+          </a:stretch>
+        </p:blipFill>
+        <p:spPr>
+          <a:xfrm>
+            <a:off x="2681287" y="14287"/>
+            <a:ext cx="6829425" cy="6829425"/>
+          </a:xfrm>
+          <a:prstGeom prst="rect">
+            <a:avLst/>
+          </a:prstGeom>
+        </p:spPr>
+      </p:pic>
+      <p:sp>
+        <p:nvSpPr>
+          <p:cNvPr id="9" name="Title 2">
+            <a:extLst>
+              <a:ext uri="{FF2B5EF4-FFF2-40B4-BE49-F238E27FC236}">
+                <a16:creationId xmlns:a16="http://schemas.microsoft.com/office/drawing/2014/main" id="{CB877719-98D4-4914-B56E-634238E5C0E6}"/>
+              </a:ext>
+            </a:extLst>
+          </p:cNvPr>
+          <p:cNvSpPr txBox="1">
+            <a:spLocks/>
+          </p:cNvSpPr>
+          <p:nvPr/>
+        </p:nvSpPr>
+        <p:spPr>
+          <a:xfrm>
+            <a:off x="1" y="2834881"/>
+            <a:ext cx="12191999" cy="1191639"/>
+          </a:xfrm>
+          <a:prstGeom prst="rect">
+            <a:avLst/>
+          </a:prstGeom>
+          <a:solidFill>
+            <a:schemeClr val="bg1">
+              <a:alpha val="50000"/>
+            </a:schemeClr>
+          </a:solidFill>
+        </p:spPr>
+        <p:txBody>
+          <a:bodyPr vert="horz" wrap="square" lIns="143428" tIns="89642" rIns="143428" bIns="89642" rtlCol="0" anchor="t" anchorCtr="0">
+            <a:noAutofit/>
+          </a:bodyPr>
+          <a:lstStyle>
+            <a:lvl1pPr algn="l" defTabSz="932578" rtl="0" eaLnBrk="1" latinLnBrk="0" hangingPunct="1">
+              <a:lnSpc>
+                <a:spcPct val="90000"/>
+              </a:lnSpc>
+              <a:spcBef>
+                <a:spcPct val="0"/>
+              </a:spcBef>
+              <a:buNone/>
+              <a:defRPr lang="en-US" sz="5999" b="0" kern="1200" cap="none" spc="-100" baseline="0">
+                <a:ln w="3175">
+                  <a:noFill/>
+                </a:ln>
+                <a:gradFill>
+                  <a:gsLst>
+                    <a:gs pos="3333">
+                      <a:schemeClr val="tx1"/>
+                    </a:gs>
+                    <a:gs pos="39000">
+                      <a:schemeClr val="tx1"/>
+                    </a:gs>
+                  </a:gsLst>
+                  <a:lin ang="5400000" scaled="0"/>
+                </a:gradFill>
+                <a:effectLst/>
+                <a:latin typeface="+mj-lt"/>
+                <a:ea typeface="+mn-ea"/>
+                <a:cs typeface="Segoe UI" pitchFamily="34" charset="0"/>
+              </a:defRPr>
+            </a:lvl1pPr>
+          </a:lstStyle>
+          <a:p>
+            <a:pPr algn="ctr">
+              <a:spcBef>
+                <a:spcPts val="1200"/>
+              </a:spcBef>
+              <a:spcAft>
+                <a:spcPts val="1200"/>
+              </a:spcAft>
+              <a:defRPr/>
+            </a:pPr>
+            <a:r>
+              <a:rPr lang="en-GB" sz="7200" b="1" dirty="0">
+                <a:solidFill>
+                  <a:schemeClr val="tx1"/>
+                </a:solidFill>
+                <a:effectLst>
+                  <a:outerShdw blurRad="38100" dist="38100" dir="2700000" algn="tl">
+                    <a:srgbClr val="000000">
+                      <a:alpha val="43137"/>
+                    </a:srgbClr>
+                  </a:outerShdw>
+                </a:effectLst>
+                <a:latin typeface="Segoe UI Light"/>
+              </a:rPr>
+              <a:t>Key Vault</a:t>
+            </a:r>
+          </a:p>
+        </p:txBody>
+      </p:sp>
+    </p:spTree>
+    <p:extLst>
+      <p:ext uri="{BB962C8B-B14F-4D97-AF65-F5344CB8AC3E}">
+        <p14:creationId xmlns:p14="http://schemas.microsoft.com/office/powerpoint/2010/main" val="1384612691"/>
+      </p:ext>
+    </p:extLst>
+  </p:cSld>
+  <p:clrMapOvr>
+    <a:masterClrMapping/>
+  </p:clrMapOvr>
+  <p:timing>
+    <p:tnLst>
+      <p:par>
+        <p:cTn id="1" dur="indefinite" restart="never" nodeType="tmRoot">
+          <p:childTnLst>
+            <p:seq concurrent="1" nextAc="seek">
+              <p:cTn id="2" dur="indefinite" nodeType="mainSeq">
+                <p:childTnLst>
+                  <p:par>
+                    <p:cTn id="3" fill="hold">
+                      <p:stCondLst>
+                        <p:cond delay="indefinite"/>
+                      </p:stCondLst>
+                      <p:childTnLst>
+                        <p:par>
+                          <p:cTn id="4" fill="hold">
+                            <p:stCondLst>
+                              <p:cond delay="0"/>
+                            </p:stCondLst>
+                            <p:childTnLst>
+                              <p:par>
+                                <p:cTn id="5" presetID="10" presetClass="entr" presetSubtype="0" fill="hold" grpId="0" nodeType="clickEffect">
+                                  <p:stCondLst>
+                                    <p:cond delay="0"/>
+                                  </p:stCondLst>
+                                  <p:childTnLst>
+                                    <p:set>
+                                      <p:cBhvr>
+                                        <p:cTn id="6" dur="1" fill="hold">
+                                          <p:stCondLst>
+                                            <p:cond delay="0"/>
+                                          </p:stCondLst>
+                                        </p:cTn>
+                                        <p:tgtEl>
+                                          <p:spTgt spid="9"/>
+                                        </p:tgtEl>
+                                        <p:attrNameLst>
+                                          <p:attrName>style.visibility</p:attrName>
+                                        </p:attrNameLst>
+                                      </p:cBhvr>
+                                      <p:to>
+                                        <p:strVal val="visible"/>
+                                      </p:to>
+                                    </p:set>
+                                    <p:animEffect transition="in" filter="fade">
+                                      <p:cBhvr>
+                                        <p:cTn id="7" dur="500"/>
+                                        <p:tgtEl>
+                                          <p:spTgt spid="9"/>
+                                        </p:tgtEl>
+                                      </p:cBhvr>
+                                    </p:animEffect>
+                                  </p:childTnLst>
+                                </p:cTn>
+                              </p:par>
+                            </p:childTnLst>
+                          </p:cTn>
+                        </p:par>
+                      </p:childTnLst>
+                    </p:cTn>
+                  </p:par>
+                </p:childTnLst>
+              </p:cTn>
+              <p:prevCondLst>
+                <p:cond evt="onPrev" delay="0">
+                  <p:tgtEl>
+                    <p:sldTgt/>
+                  </p:tgtEl>
+                </p:cond>
+              </p:prevCondLst>
+              <p:nextCondLst>
+                <p:cond evt="onNext" delay="0">
+                  <p:tgtEl>
+                    <p:sldTgt/>
+                  </p:tgtEl>
+                </p:cond>
+              </p:nextCondLst>
+            </p:seq>
+          </p:childTnLst>
+        </p:cTn>
+      </p:par>
+    </p:tnLst>
+    <p:bldLst>
+      <p:bldP spid="9" grpId="0" animBg="1"/>
+    </p:bldLst>
+  </p:timing>
+</p:sld>
+</file>
+
+<file path=ppt/slides/slide4.xml><?xml version="1.0" encoding="utf-8"?>
+<p:sld xmlns:a="http://schemas.openxmlformats.org/drawingml/2006/main" xmlns:r="http://schemas.openxmlformats.org/officeDocument/2006/relationships" xmlns:p="http://schemas.openxmlformats.org/presentationml/2006/main">
+  <p:cSld>
+    <p:spTree>
+      <p:nvGrpSpPr>
+        <p:cNvPr id="1" name=""/>
+        <p:cNvGrpSpPr/>
+        <p:nvPr/>
+      </p:nvGrpSpPr>
+      <p:grpSpPr>
+        <a:xfrm>
+          <a:off x="0" y="0"/>
+          <a:ext cx="0" cy="0"/>
+          <a:chOff x="0" y="0"/>
+          <a:chExt cx="0" cy="0"/>
+        </a:xfrm>
+      </p:grpSpPr>
+      <p:pic>
+        <p:nvPicPr>
+          <p:cNvPr id="6" name="Graphic 5">
+            <a:extLst>
+              <a:ext uri="{FF2B5EF4-FFF2-40B4-BE49-F238E27FC236}">
+                <a16:creationId xmlns:a16="http://schemas.microsoft.com/office/drawing/2014/main" id="{D8D5FEE3-E793-49B7-8240-43E96A01EA92}"/>
+              </a:ext>
+            </a:extLst>
+          </p:cNvPr>
+          <p:cNvPicPr>
+            <a:picLocks noChangeAspect="1"/>
+          </p:cNvPicPr>
+          <p:nvPr/>
+        </p:nvPicPr>
+        <p:blipFill>
+          <a:blip r:embed="rId2">
+            <a:extLst>
+              <a:ext uri="{28A0092B-C50C-407E-A947-70E740481C1C}">
+                <a14:useLocalDpi xmlns:a14="http://schemas.microsoft.com/office/drawing/2010/main" val="0"/>
+              </a:ext>
+              <a:ext uri="{96DAC541-7B7A-43D3-8B79-37D633B846F1}">
+                <asvg:svgBlip xmlns:asvg="http://schemas.microsoft.com/office/drawing/2016/SVG/main" r:embed="rId3"/>
+              </a:ext>
+            </a:extLst>
+          </a:blip>
+          <a:stretch>
+            <a:fillRect/>
+          </a:stretch>
+        </p:blipFill>
+        <p:spPr>
+          <a:xfrm>
+            <a:off x="2679032" y="12032"/>
+            <a:ext cx="6833936" cy="6833936"/>
+          </a:xfrm>
+          <a:prstGeom prst="rect">
+            <a:avLst/>
+          </a:prstGeom>
+        </p:spPr>
+      </p:pic>
+      <p:sp>
+        <p:nvSpPr>
+          <p:cNvPr id="9" name="Title 2">
+            <a:extLst>
+              <a:ext uri="{FF2B5EF4-FFF2-40B4-BE49-F238E27FC236}">
+                <a16:creationId xmlns:a16="http://schemas.microsoft.com/office/drawing/2014/main" id="{CB877719-98D4-4914-B56E-634238E5C0E6}"/>
+              </a:ext>
+            </a:extLst>
+          </p:cNvPr>
+          <p:cNvSpPr txBox="1">
+            <a:spLocks/>
+          </p:cNvSpPr>
+          <p:nvPr/>
+        </p:nvSpPr>
+        <p:spPr>
+          <a:xfrm>
+            <a:off x="1" y="2834881"/>
+            <a:ext cx="12191999" cy="1191639"/>
+          </a:xfrm>
+          <a:prstGeom prst="rect">
+            <a:avLst/>
+          </a:prstGeom>
+          <a:solidFill>
+            <a:schemeClr val="bg1">
+              <a:alpha val="50000"/>
+            </a:schemeClr>
+          </a:solidFill>
+        </p:spPr>
+        <p:txBody>
+          <a:bodyPr vert="horz" wrap="square" lIns="143428" tIns="89642" rIns="143428" bIns="89642" rtlCol="0" anchor="t" anchorCtr="0">
+            <a:noAutofit/>
+          </a:bodyPr>
+          <a:lstStyle>
+            <a:lvl1pPr algn="l" defTabSz="932578" rtl="0" eaLnBrk="1" latinLnBrk="0" hangingPunct="1">
+              <a:lnSpc>
+                <a:spcPct val="90000"/>
+              </a:lnSpc>
+              <a:spcBef>
+                <a:spcPct val="0"/>
+              </a:spcBef>
+              <a:buNone/>
+              <a:defRPr lang="en-US" sz="5999" b="0" kern="1200" cap="none" spc="-100" baseline="0">
+                <a:ln w="3175">
+                  <a:noFill/>
+                </a:ln>
+                <a:gradFill>
+                  <a:gsLst>
+                    <a:gs pos="3333">
+                      <a:schemeClr val="tx1"/>
+                    </a:gs>
+                    <a:gs pos="39000">
+                      <a:schemeClr val="tx1"/>
+                    </a:gs>
+                  </a:gsLst>
+                  <a:lin ang="5400000" scaled="0"/>
+                </a:gradFill>
+                <a:effectLst/>
+                <a:latin typeface="+mj-lt"/>
+                <a:ea typeface="+mn-ea"/>
+                <a:cs typeface="Segoe UI" pitchFamily="34" charset="0"/>
+              </a:defRPr>
+            </a:lvl1pPr>
+          </a:lstStyle>
+          <a:p>
+            <a:pPr algn="ctr">
+              <a:spcBef>
+                <a:spcPts val="1200"/>
+              </a:spcBef>
+              <a:spcAft>
+                <a:spcPts val="1200"/>
+              </a:spcAft>
+              <a:defRPr/>
+            </a:pPr>
+            <a:r>
+              <a:rPr lang="en-GB" sz="7200" b="1" dirty="0">
+                <a:solidFill>
+                  <a:schemeClr val="tx1"/>
+                </a:solidFill>
+                <a:effectLst>
+                  <a:outerShdw blurRad="38100" dist="38100" dir="2700000" algn="tl">
+                    <a:srgbClr val="000000">
+                      <a:alpha val="43137"/>
+                    </a:srgbClr>
+                  </a:outerShdw>
+                </a:effectLst>
+                <a:latin typeface="Segoe UI Light"/>
+              </a:rPr>
+              <a:t>SQL Database</a:t>
+            </a:r>
+          </a:p>
+        </p:txBody>
+      </p:sp>
+    </p:spTree>
+    <p:extLst>
+      <p:ext uri="{BB962C8B-B14F-4D97-AF65-F5344CB8AC3E}">
+        <p14:creationId xmlns:p14="http://schemas.microsoft.com/office/powerpoint/2010/main" val="3244887524"/>
+      </p:ext>
+    </p:extLst>
+  </p:cSld>
+  <p:clrMapOvr>
+    <a:masterClrMapping/>
+  </p:clrMapOvr>
+  <p:timing>
+    <p:tnLst>
+      <p:par>
+        <p:cTn id="1" dur="indefinite" restart="never" nodeType="tmRoot">
+          <p:childTnLst>
+            <p:seq concurrent="1" nextAc="seek">
+              <p:cTn id="2" dur="indefinite" nodeType="mainSeq">
+                <p:childTnLst>
+                  <p:par>
+                    <p:cTn id="3" fill="hold">
+                      <p:stCondLst>
+                        <p:cond delay="indefinite"/>
+                      </p:stCondLst>
+                      <p:childTnLst>
+                        <p:par>
+                          <p:cTn id="4" fill="hold">
+                            <p:stCondLst>
+                              <p:cond delay="0"/>
+                            </p:stCondLst>
+                            <p:childTnLst>
+                              <p:par>
+                                <p:cTn id="5" presetID="10" presetClass="entr" presetSubtype="0" fill="hold" grpId="0" nodeType="clickEffect">
+                                  <p:stCondLst>
+                                    <p:cond delay="0"/>
+                                  </p:stCondLst>
+                                  <p:childTnLst>
+                                    <p:set>
+                                      <p:cBhvr>
+                                        <p:cTn id="6" dur="1" fill="hold">
+                                          <p:stCondLst>
+                                            <p:cond delay="0"/>
+                                          </p:stCondLst>
+                                        </p:cTn>
+                                        <p:tgtEl>
+                                          <p:spTgt spid="9"/>
+                                        </p:tgtEl>
+                                        <p:attrNameLst>
+                                          <p:attrName>style.visibility</p:attrName>
+                                        </p:attrNameLst>
+                                      </p:cBhvr>
+                                      <p:to>
+                                        <p:strVal val="visible"/>
+                                      </p:to>
+                                    </p:set>
+                                    <p:animEffect transition="in" filter="fade">
+                                      <p:cBhvr>
+                                        <p:cTn id="7" dur="500"/>
+                                        <p:tgtEl>
+                                          <p:spTgt spid="9"/>
+                                        </p:tgtEl>
+                                      </p:cBhvr>
+                                    </p:animEffect>
+                                  </p:childTnLst>
+                                </p:cTn>
+                              </p:par>
+                            </p:childTnLst>
+                          </p:cTn>
+                        </p:par>
+                      </p:childTnLst>
+                    </p:cTn>
+                  </p:par>
+                </p:childTnLst>
+              </p:cTn>
+              <p:prevCondLst>
+                <p:cond evt="onPrev" delay="0">
+                  <p:tgtEl>
+                    <p:sldTgt/>
+                  </p:tgtEl>
+                </p:cond>
+              </p:prevCondLst>
+              <p:nextCondLst>
+                <p:cond evt="onNext" delay="0">
+                  <p:tgtEl>
+                    <p:sldTgt/>
+                  </p:tgtEl>
+                </p:cond>
+              </p:nextCondLst>
+            </p:seq>
+          </p:childTnLst>
+        </p:cTn>
+      </p:par>
+    </p:tnLst>
+    <p:bldLst>
+      <p:bldP spid="9" grpId="0" animBg="1"/>
+    </p:bldLst>
+  </p:timing>
+</p:sld>
+</file>
+
+<file path=ppt/slides/slide40.xml><?xml version="1.0" encoding="utf-8"?>
+<p:sld xmlns:a="http://schemas.openxmlformats.org/drawingml/2006/main" xmlns:r="http://schemas.openxmlformats.org/officeDocument/2006/relationships" xmlns:p="http://schemas.openxmlformats.org/presentationml/2006/main">
+  <p:cSld>
+    <p:spTree>
+      <p:nvGrpSpPr>
+        <p:cNvPr id="1" name=""/>
+        <p:cNvGrpSpPr/>
+        <p:nvPr/>
+      </p:nvGrpSpPr>
+      <p:grpSpPr>
+        <a:xfrm>
+          <a:off x="0" y="0"/>
+          <a:ext cx="0" cy="0"/>
+          <a:chOff x="0" y="0"/>
+          <a:chExt cx="0" cy="0"/>
+        </a:xfrm>
+      </p:grpSpPr>
+      <p:pic>
+        <p:nvPicPr>
           <p:cNvPr id="3" name="Picture 2">
             <a:extLst>
               <a:ext uri="{FF2B5EF4-FFF2-40B4-BE49-F238E27FC236}">
@@ -10216,7 +12140,7 @@
 </p:sld>
 </file>
 
-<file path=ppt/slides/slide35.xml><?xml version="1.0" encoding="utf-8"?>
+<file path=ppt/slides/slide41.xml><?xml version="1.0" encoding="utf-8"?>
 <p:sld xmlns:a="http://schemas.openxmlformats.org/drawingml/2006/main" xmlns:r="http://schemas.openxmlformats.org/officeDocument/2006/relationships" xmlns:p="http://schemas.openxmlformats.org/presentationml/2006/main">
   <p:cSld>
     <p:spTree>
@@ -10235,10 +12159,10 @@
       </p:grpSpPr>
       <p:pic>
         <p:nvPicPr>
-          <p:cNvPr id="3" name="Picture 2">
-            <a:extLst>
-              <a:ext uri="{FF2B5EF4-FFF2-40B4-BE49-F238E27FC236}">
-                <a16:creationId xmlns:a16="http://schemas.microsoft.com/office/drawing/2014/main" id="{FCD69902-4B9B-4E07-8E56-2CDE55B6B45A}"/>
+          <p:cNvPr id="6" name="Picture 5">
+            <a:extLst>
+              <a:ext uri="{FF2B5EF4-FFF2-40B4-BE49-F238E27FC236}">
+                <a16:creationId xmlns:a16="http://schemas.microsoft.com/office/drawing/2014/main" id="{E2886EE7-822F-4525-8AC1-23E25342C267}"/>
               </a:ext>
             </a:extLst>
           </p:cNvPr>
@@ -10255,7 +12179,7 @@
         </p:blipFill>
         <p:spPr>
           <a:xfrm>
-            <a:off x="0" y="0"/>
+            <a:off x="-1" y="0"/>
             <a:ext cx="12192000" cy="6858000"/>
           </a:xfrm>
           <a:prstGeom prst="rect">
@@ -10550,7 +12474,7 @@
     </p:spTree>
     <p:extLst>
       <p:ext uri="{BB962C8B-B14F-4D97-AF65-F5344CB8AC3E}">
-        <p14:creationId xmlns:p14="http://schemas.microsoft.com/office/powerpoint/2010/main" val="4192887432"/>
+        <p14:creationId xmlns:p14="http://schemas.microsoft.com/office/powerpoint/2010/main" val="1759814533"/>
       </p:ext>
     </p:extLst>
   </p:cSld>
@@ -10560,7 +12484,7 @@
 </p:sld>
 </file>
 
-<file path=ppt/slides/slide36.xml><?xml version="1.0" encoding="utf-8"?>
+<file path=ppt/slides/slide42.xml><?xml version="1.0" encoding="utf-8"?>
 <p:sld xmlns:a="http://schemas.openxmlformats.org/drawingml/2006/main" xmlns:r="http://schemas.openxmlformats.org/officeDocument/2006/relationships" xmlns:p="http://schemas.openxmlformats.org/presentationml/2006/main">
   <p:cSld>
     <p:spTree>
@@ -10680,6 +12604,98 @@
           </a:p>
         </p:txBody>
       </p:sp>
+      <p:sp>
+        <p:nvSpPr>
+          <p:cNvPr id="5" name="Title 2">
+            <a:extLst>
+              <a:ext uri="{FF2B5EF4-FFF2-40B4-BE49-F238E27FC236}">
+                <a16:creationId xmlns:a16="http://schemas.microsoft.com/office/drawing/2014/main" id="{FA12A72B-6351-40A9-8180-2D9CAD7E64F6}"/>
+              </a:ext>
+            </a:extLst>
+          </p:cNvPr>
+          <p:cNvSpPr txBox="1">
+            <a:spLocks/>
+          </p:cNvSpPr>
+          <p:nvPr/>
+        </p:nvSpPr>
+        <p:spPr>
+          <a:xfrm>
+            <a:off x="8963194" y="1708539"/>
+            <a:ext cx="2765424" cy="702403"/>
+          </a:xfrm>
+          <a:prstGeom prst="rect">
+            <a:avLst/>
+          </a:prstGeom>
+          <a:solidFill>
+            <a:schemeClr val="bg1">
+              <a:alpha val="50000"/>
+            </a:schemeClr>
+          </a:solidFill>
+        </p:spPr>
+        <p:txBody>
+          <a:bodyPr vert="horz" wrap="square" lIns="143428" tIns="89642" rIns="143428" bIns="89642" rtlCol="0" anchor="t" anchorCtr="0">
+            <a:noAutofit/>
+          </a:bodyPr>
+          <a:lstStyle>
+            <a:lvl1pPr algn="l" defTabSz="932578" rtl="0" eaLnBrk="1" latinLnBrk="0" hangingPunct="1">
+              <a:lnSpc>
+                <a:spcPct val="90000"/>
+              </a:lnSpc>
+              <a:spcBef>
+                <a:spcPct val="0"/>
+              </a:spcBef>
+              <a:buNone/>
+              <a:defRPr lang="en-US" sz="5999" b="0" kern="1200" cap="none" spc="-100" baseline="0">
+                <a:ln w="3175">
+                  <a:noFill/>
+                </a:ln>
+                <a:gradFill>
+                  <a:gsLst>
+                    <a:gs pos="3333">
+                      <a:schemeClr val="tx1"/>
+                    </a:gs>
+                    <a:gs pos="39000">
+                      <a:schemeClr val="tx1"/>
+                    </a:gs>
+                  </a:gsLst>
+                  <a:lin ang="5400000" scaled="0"/>
+                </a:gradFill>
+                <a:effectLst/>
+                <a:latin typeface="+mj-lt"/>
+                <a:ea typeface="+mn-ea"/>
+                <a:cs typeface="Segoe UI" pitchFamily="34" charset="0"/>
+              </a:defRPr>
+            </a:lvl1pPr>
+          </a:lstStyle>
+          <a:p>
+            <a:pPr algn="ctr">
+              <a:spcBef>
+                <a:spcPts val="1200"/>
+              </a:spcBef>
+              <a:spcAft>
+                <a:spcPts val="1200"/>
+              </a:spcAft>
+              <a:defRPr/>
+            </a:pPr>
+            <a:r>
+              <a:rPr lang="en-GB" sz="4400" b="1" dirty="0">
+                <a:solidFill>
+                  <a:schemeClr val="tx1"/>
+                </a:solidFill>
+                <a:effectLst>
+                  <a:outerShdw blurRad="38100" dist="38100" dir="2700000" algn="tl">
+                    <a:srgbClr val="000000">
+                      <a:alpha val="43137"/>
+                    </a:srgbClr>
+                  </a:outerShdw>
+                </a:effectLst>
+                <a:latin typeface="Segoe UI Light"/>
+              </a:rPr>
+              <a:t>Old Icons</a:t>
+            </a:r>
+          </a:p>
+        </p:txBody>
+      </p:sp>
     </p:spTree>
     <p:extLst>
       <p:ext uri="{BB962C8B-B14F-4D97-AF65-F5344CB8AC3E}">
@@ -10690,10 +12706,96 @@
   <p:clrMapOvr>
     <a:masterClrMapping/>
   </p:clrMapOvr>
+  <p:timing>
+    <p:tnLst>
+      <p:par>
+        <p:cTn id="1" dur="indefinite" restart="never" nodeType="tmRoot">
+          <p:childTnLst>
+            <p:seq concurrent="1" nextAc="seek">
+              <p:cTn id="2" dur="indefinite" nodeType="mainSeq">
+                <p:childTnLst>
+                  <p:par>
+                    <p:cTn id="3" fill="hold">
+                      <p:stCondLst>
+                        <p:cond delay="indefinite"/>
+                      </p:stCondLst>
+                      <p:childTnLst>
+                        <p:par>
+                          <p:cTn id="4" fill="hold">
+                            <p:stCondLst>
+                              <p:cond delay="0"/>
+                            </p:stCondLst>
+                            <p:childTnLst>
+                              <p:par>
+                                <p:cTn id="5" presetID="10" presetClass="entr" presetSubtype="0" fill="hold" grpId="0" nodeType="clickEffect">
+                                  <p:stCondLst>
+                                    <p:cond delay="0"/>
+                                  </p:stCondLst>
+                                  <p:childTnLst>
+                                    <p:set>
+                                      <p:cBhvr>
+                                        <p:cTn id="6" dur="1" fill="hold">
+                                          <p:stCondLst>
+                                            <p:cond delay="0"/>
+                                          </p:stCondLst>
+                                        </p:cTn>
+                                        <p:tgtEl>
+                                          <p:spTgt spid="5"/>
+                                        </p:tgtEl>
+                                        <p:attrNameLst>
+                                          <p:attrName>style.visibility</p:attrName>
+                                        </p:attrNameLst>
+                                      </p:cBhvr>
+                                      <p:to>
+                                        <p:strVal val="visible"/>
+                                      </p:to>
+                                    </p:set>
+                                    <p:animEffect transition="in" filter="fade">
+                                      <p:cBhvr>
+                                        <p:cTn id="7" dur="500"/>
+                                        <p:tgtEl>
+                                          <p:spTgt spid="5"/>
+                                        </p:tgtEl>
+                                      </p:cBhvr>
+                                    </p:animEffect>
+                                  </p:childTnLst>
+                                </p:cTn>
+                              </p:par>
+                            </p:childTnLst>
+                          </p:cTn>
+                        </p:par>
+                      </p:childTnLst>
+                    </p:cTn>
+                  </p:par>
+                </p:childTnLst>
+              </p:cTn>
+              <p:prevCondLst>
+                <p:cond evt="onPrev" delay="0">
+                  <p:tgtEl>
+                    <p:sldTgt/>
+                  </p:tgtEl>
+                </p:cond>
+              </p:prevCondLst>
+              <p:nextCondLst>
+                <p:cond evt="onNext" delay="0">
+                  <p:tgtEl>
+                    <p:sldTgt/>
+                  </p:tgtEl>
+                </p:cond>
+              </p:nextCondLst>
+            </p:seq>
+          </p:childTnLst>
+        </p:cTn>
+      </p:par>
+    </p:tnLst>
+    <p:bldLst>
+      <p:bldP spid="5" grpId="0" animBg="1"/>
+    </p:bldLst>
+  </p:timing>
 </p:sld>
 </file>
 
-<file path=ppt/slides/slide4.xml><?xml version="1.0" encoding="utf-8"?>
+<file path=ppt/slides/slide5.xml><?xml version="1.0" encoding="utf-8"?>
 <p:sld xmlns:a="http://schemas.openxmlformats.org/drawingml/2006/main" xmlns:r="http://schemas.openxmlformats.org/officeDocument/2006/relationships" xmlns:p="http://schemas.openxmlformats.org/presentationml/2006/main">
   <p:cSld>
     <p:spTree>
@@ -10712,10 +12814,10 @@
       </p:grpSpPr>
       <p:pic>
         <p:nvPicPr>
-          <p:cNvPr id="3" name="Picture 2">
-            <a:extLst>
-              <a:ext uri="{FF2B5EF4-FFF2-40B4-BE49-F238E27FC236}">
-                <a16:creationId xmlns:a16="http://schemas.microsoft.com/office/drawing/2014/main" id="{1CA89D36-E1D9-4FD8-8869-059B5189D16C}"/>
+          <p:cNvPr id="3" name="Graphic 2">
+            <a:extLst>
+              <a:ext uri="{FF2B5EF4-FFF2-40B4-BE49-F238E27FC236}">
+                <a16:creationId xmlns:a16="http://schemas.microsoft.com/office/drawing/2014/main" id="{65D8B222-14C4-4A89-B583-56D24732A978}"/>
               </a:ext>
             </a:extLst>
           </p:cNvPr>
@@ -10725,15 +12827,24 @@
           <p:nvPr/>
         </p:nvPicPr>
         <p:blipFill>
-          <a:blip r:embed="rId2"/>
+          <a:blip r:embed="rId2">
+            <a:extLst>
+              <a:ext uri="{28A0092B-C50C-407E-A947-70E740481C1C}">
+                <a14:useLocalDpi xmlns:a14="http://schemas.microsoft.com/office/drawing/2010/main" val="0"/>
+              </a:ext>
+              <a:ext uri="{96DAC541-7B7A-43D3-8B79-37D633B846F1}">
+                <asvg:svgBlip xmlns:asvg="http://schemas.microsoft.com/office/drawing/2016/SVG/main" r:embed="rId3"/>
+              </a:ext>
+            </a:extLst>
+          </a:blip>
           <a:stretch>
             <a:fillRect/>
           </a:stretch>
         </p:blipFill>
         <p:spPr>
           <a:xfrm>
-            <a:off x="3542559" y="61133"/>
-            <a:ext cx="5106882" cy="6735734"/>
+            <a:off x="2679032" y="12032"/>
+            <a:ext cx="6833936" cy="6833936"/>
           </a:xfrm>
           <a:prstGeom prst="rect">
             <a:avLst/>
@@ -10827,7 +12938,7 @@
                 </a:effectLst>
                 <a:latin typeface="Segoe UI Light"/>
               </a:rPr>
-              <a:t>SQL Database</a:t>
+              <a:t>SQL Logical Instance</a:t>
             </a:r>
           </a:p>
         </p:txBody>
@@ -10835,245 +12946,7 @@
     </p:spTree>
     <p:extLst>
       <p:ext uri="{BB962C8B-B14F-4D97-AF65-F5344CB8AC3E}">
-        <p14:creationId xmlns:p14="http://schemas.microsoft.com/office/powerpoint/2010/main" val="3244887524"/>
-      </p:ext>
-    </p:extLst>
-  </p:cSld>
-  <p:clrMapOvr>
-    <a:masterClrMapping/>
-  </p:clrMapOvr>
-  <p:timing>
-    <p:tnLst>
-      <p:par>
-        <p:cTn id="1" dur="indefinite" restart="never" nodeType="tmRoot">
-          <p:childTnLst>
-            <p:seq concurrent="1" nextAc="seek">
-              <p:cTn id="2" dur="indefinite" nodeType="mainSeq">
-                <p:childTnLst>
-                  <p:par>
-                    <p:cTn id="3" fill="hold">
-                      <p:stCondLst>
-                        <p:cond delay="indefinite"/>
-                      </p:stCondLst>
-                      <p:childTnLst>
-                        <p:par>
-                          <p:cTn id="4" fill="hold">
-                            <p:stCondLst>
-                              <p:cond delay="0"/>
-                            </p:stCondLst>
-                            <p:childTnLst>
-                              <p:par>
-                                <p:cTn id="5" presetID="10" presetClass="entr" presetSubtype="0" fill="hold" grpId="0" nodeType="clickEffect">
-                                  <p:stCondLst>
-                                    <p:cond delay="0"/>
-                                  </p:stCondLst>
-                                  <p:childTnLst>
-                                    <p:set>
-                                      <p:cBhvr>
-                                        <p:cTn id="6" dur="1" fill="hold">
-                                          <p:stCondLst>
-                                            <p:cond delay="0"/>
-                                          </p:stCondLst>
-                                        </p:cTn>
-                                        <p:tgtEl>
-                                          <p:spTgt spid="9"/>
-                                        </p:tgtEl>
-                                        <p:attrNameLst>
-                                          <p:attrName>style.visibility</p:attrName>
-                                        </p:attrNameLst>
-                                      </p:cBhvr>
-                                      <p:to>
-                                        <p:strVal val="visible"/>
-                                      </p:to>
-                                    </p:set>
-                                    <p:animEffect transition="in" filter="fade">
-                                      <p:cBhvr>
-                                        <p:cTn id="7" dur="500"/>
-                                        <p:tgtEl>
-                                          <p:spTgt spid="9"/>
-                                        </p:tgtEl>
-                                      </p:cBhvr>
-                                    </p:animEffect>
-                                  </p:childTnLst>
-                                </p:cTn>
-                              </p:par>
-                            </p:childTnLst>
-                          </p:cTn>
-                        </p:par>
-                      </p:childTnLst>
-                    </p:cTn>
-                  </p:par>
-                </p:childTnLst>
-              </p:cTn>
-              <p:prevCondLst>
-                <p:cond evt="onPrev" delay="0">
-                  <p:tgtEl>
-                    <p:sldTgt/>
-                  </p:tgtEl>
-                </p:cond>
-              </p:prevCondLst>
-              <p:nextCondLst>
-                <p:cond evt="onNext" delay="0">
-                  <p:tgtEl>
-                    <p:sldTgt/>
-                  </p:tgtEl>
-                </p:cond>
-              </p:nextCondLst>
-            </p:seq>
-          </p:childTnLst>
-        </p:cTn>
-      </p:par>
-    </p:tnLst>
-    <p:bldLst>
-      <p:bldP spid="9" grpId="0" animBg="1"/>
-    </p:bldLst>
-  </p:timing>
-</p:sld>
-</file>
-
-<file path=ppt/slides/slide5.xml><?xml version="1.0" encoding="utf-8"?>
-<p:sld xmlns:a="http://schemas.openxmlformats.org/drawingml/2006/main" xmlns:r="http://schemas.openxmlformats.org/officeDocument/2006/relationships" xmlns:p="http://schemas.openxmlformats.org/presentationml/2006/main">
-  <p:cSld>
-    <p:spTree>
-      <p:nvGrpSpPr>
-        <p:cNvPr id="1" name=""/>
-        <p:cNvGrpSpPr/>
-        <p:nvPr/>
-      </p:nvGrpSpPr>
-      <p:grpSpPr>
-        <a:xfrm>
-          <a:off x="0" y="0"/>
-          <a:ext cx="0" cy="0"/>
-          <a:chOff x="0" y="0"/>
-          <a:chExt cx="0" cy="0"/>
-        </a:xfrm>
-      </p:grpSpPr>
-      <p:pic>
-        <p:nvPicPr>
-          <p:cNvPr id="2" name="Picture 1">
-            <a:extLst>
-              <a:ext uri="{FF2B5EF4-FFF2-40B4-BE49-F238E27FC236}">
-                <a16:creationId xmlns:a16="http://schemas.microsoft.com/office/drawing/2014/main" id="{B6F47EB0-1734-4A88-BFFA-40950BEACAE0}"/>
-              </a:ext>
-            </a:extLst>
-          </p:cNvPr>
-          <p:cNvPicPr>
-            <a:picLocks noChangeAspect="1"/>
-          </p:cNvPicPr>
-          <p:nvPr/>
-        </p:nvPicPr>
-        <p:blipFill>
-          <a:blip r:embed="rId2"/>
-          <a:stretch>
-            <a:fillRect/>
-          </a:stretch>
-        </p:blipFill>
-        <p:spPr>
-          <a:xfrm>
-            <a:off x="3480234" y="0"/>
-            <a:ext cx="5231531" cy="6858000"/>
-          </a:xfrm>
-          <a:prstGeom prst="rect">
-            <a:avLst/>
-          </a:prstGeom>
-        </p:spPr>
-      </p:pic>
-      <p:sp>
-        <p:nvSpPr>
-          <p:cNvPr id="9" name="Title 2">
-            <a:extLst>
-              <a:ext uri="{FF2B5EF4-FFF2-40B4-BE49-F238E27FC236}">
-                <a16:creationId xmlns:a16="http://schemas.microsoft.com/office/drawing/2014/main" id="{CB877719-98D4-4914-B56E-634238E5C0E6}"/>
-              </a:ext>
-            </a:extLst>
-          </p:cNvPr>
-          <p:cNvSpPr txBox="1">
-            <a:spLocks/>
-          </p:cNvSpPr>
-          <p:nvPr/>
-        </p:nvSpPr>
-        <p:spPr>
-          <a:xfrm>
-            <a:off x="1" y="2834881"/>
-            <a:ext cx="12191999" cy="1191639"/>
-          </a:xfrm>
-          <a:prstGeom prst="rect">
-            <a:avLst/>
-          </a:prstGeom>
-          <a:solidFill>
-            <a:schemeClr val="bg1">
-              <a:alpha val="50000"/>
-            </a:schemeClr>
-          </a:solidFill>
-        </p:spPr>
-        <p:txBody>
-          <a:bodyPr vert="horz" wrap="square" lIns="143428" tIns="89642" rIns="143428" bIns="89642" rtlCol="0" anchor="t" anchorCtr="0">
-            <a:noAutofit/>
-          </a:bodyPr>
-          <a:lstStyle>
-            <a:lvl1pPr algn="l" defTabSz="932578" rtl="0" eaLnBrk="1" latinLnBrk="0" hangingPunct="1">
-              <a:lnSpc>
-                <a:spcPct val="90000"/>
-              </a:lnSpc>
-              <a:spcBef>
-                <a:spcPct val="0"/>
-              </a:spcBef>
-              <a:buNone/>
-              <a:defRPr lang="en-US" sz="5999" b="0" kern="1200" cap="none" spc="-100" baseline="0">
-                <a:ln w="3175">
-                  <a:noFill/>
-                </a:ln>
-                <a:gradFill>
-                  <a:gsLst>
-                    <a:gs pos="3333">
-                      <a:schemeClr val="tx1"/>
-                    </a:gs>
-                    <a:gs pos="39000">
-                      <a:schemeClr val="tx1"/>
-                    </a:gs>
-                  </a:gsLst>
-                  <a:lin ang="5400000" scaled="0"/>
-                </a:gradFill>
-                <a:effectLst/>
-                <a:latin typeface="+mj-lt"/>
-                <a:ea typeface="+mn-ea"/>
-                <a:cs typeface="Segoe UI" pitchFamily="34" charset="0"/>
-              </a:defRPr>
-            </a:lvl1pPr>
-          </a:lstStyle>
-          <a:p>
-            <a:pPr algn="ctr">
-              <a:spcBef>
-                <a:spcPts val="1200"/>
-              </a:spcBef>
-              <a:spcAft>
-                <a:spcPts val="1200"/>
-              </a:spcAft>
-              <a:defRPr/>
-            </a:pPr>
-            <a:r>
-              <a:rPr lang="en-GB" sz="7200" b="1" dirty="0">
-                <a:solidFill>
-                  <a:schemeClr val="tx1"/>
-                </a:solidFill>
-                <a:effectLst>
-                  <a:outerShdw blurRad="38100" dist="38100" dir="2700000" algn="tl">
-                    <a:srgbClr val="000000">
-                      <a:alpha val="43137"/>
-                    </a:srgbClr>
-                  </a:outerShdw>
-                </a:effectLst>
-                <a:latin typeface="Segoe UI Light"/>
-              </a:rPr>
-              <a:t>PostgreSQL</a:t>
-            </a:r>
-          </a:p>
-        </p:txBody>
-      </p:sp>
-    </p:spTree>
-    <p:extLst>
-      <p:ext uri="{BB962C8B-B14F-4D97-AF65-F5344CB8AC3E}">
-        <p14:creationId xmlns:p14="http://schemas.microsoft.com/office/powerpoint/2010/main" val="2584251107"/>
+        <p14:creationId xmlns:p14="http://schemas.microsoft.com/office/powerpoint/2010/main" val="3104315025"/>
       </p:ext>
     </p:extLst>
   </p:cSld>
@@ -11172,16 +13045,6 @@
 <file path=ppt/slides/slide6.xml><?xml version="1.0" encoding="utf-8"?>
 <p:sld xmlns:a="http://schemas.openxmlformats.org/drawingml/2006/main" xmlns:r="http://schemas.openxmlformats.org/officeDocument/2006/relationships" xmlns:p="http://schemas.openxmlformats.org/presentationml/2006/main">
   <p:cSld>
-    <p:bg>
-      <p:bgPr>
-        <a:solidFill>
-          <a:schemeClr val="bg1">
-            <a:alpha val="50000"/>
-          </a:schemeClr>
-        </a:solidFill>
-        <a:effectLst/>
-      </p:bgPr>
-    </p:bg>
     <p:spTree>
       <p:nvGrpSpPr>
         <p:cNvPr id="1" name=""/>
@@ -11198,10 +13061,10 @@
       </p:grpSpPr>
       <p:pic>
         <p:nvPicPr>
-          <p:cNvPr id="2" name="Picture 1">
-            <a:extLst>
-              <a:ext uri="{FF2B5EF4-FFF2-40B4-BE49-F238E27FC236}">
-                <a16:creationId xmlns:a16="http://schemas.microsoft.com/office/drawing/2014/main" id="{3AA6EE47-A84B-4C5E-87E7-8103FE6102BE}"/>
+          <p:cNvPr id="4" name="Graphic 3">
+            <a:extLst>
+              <a:ext uri="{FF2B5EF4-FFF2-40B4-BE49-F238E27FC236}">
+                <a16:creationId xmlns:a16="http://schemas.microsoft.com/office/drawing/2014/main" id="{FFDC1D11-2C55-4E22-8BED-4A0ACE76B121}"/>
               </a:ext>
             </a:extLst>
           </p:cNvPr>
@@ -11211,15 +13074,24 @@
           <p:nvPr/>
         </p:nvPicPr>
         <p:blipFill>
-          <a:blip r:embed="rId2"/>
+          <a:blip r:embed="rId2">
+            <a:extLst>
+              <a:ext uri="{28A0092B-C50C-407E-A947-70E740481C1C}">
+                <a14:useLocalDpi xmlns:a14="http://schemas.microsoft.com/office/drawing/2010/main" val="0"/>
+              </a:ext>
+              <a:ext uri="{96DAC541-7B7A-43D3-8B79-37D633B846F1}">
+                <asvg:svgBlip xmlns:asvg="http://schemas.microsoft.com/office/drawing/2016/SVG/main" r:embed="rId3"/>
+              </a:ext>
+            </a:extLst>
+          </a:blip>
           <a:stretch>
             <a:fillRect/>
           </a:stretch>
         </p:blipFill>
         <p:spPr>
           <a:xfrm>
-            <a:off x="2464837" y="78999"/>
-            <a:ext cx="7262326" cy="6700001"/>
+            <a:off x="2671010" y="8021"/>
+            <a:ext cx="6849979" cy="6849979"/>
           </a:xfrm>
           <a:prstGeom prst="rect">
             <a:avLst/>
@@ -11313,7 +13185,7 @@
                 </a:effectLst>
                 <a:latin typeface="Segoe UI Light"/>
               </a:rPr>
-              <a:t>Virtual Machine</a:t>
+              <a:t>PostgreSQL</a:t>
             </a:r>
           </a:p>
         </p:txBody>
@@ -11321,7 +13193,7 @@
     </p:spTree>
     <p:extLst>
       <p:ext uri="{BB962C8B-B14F-4D97-AF65-F5344CB8AC3E}">
-        <p14:creationId xmlns:p14="http://schemas.microsoft.com/office/powerpoint/2010/main" val="3980733746"/>
+        <p14:creationId xmlns:p14="http://schemas.microsoft.com/office/powerpoint/2010/main" val="2584251107"/>
       </p:ext>
     </p:extLst>
   </p:cSld>
@@ -11436,10 +13308,10 @@
       </p:grpSpPr>
       <p:pic>
         <p:nvPicPr>
-          <p:cNvPr id="2" name="Picture 1">
-            <a:extLst>
-              <a:ext uri="{FF2B5EF4-FFF2-40B4-BE49-F238E27FC236}">
-                <a16:creationId xmlns:a16="http://schemas.microsoft.com/office/drawing/2014/main" id="{BD22FAD6-D41E-4384-9708-1EB110A619B8}"/>
+          <p:cNvPr id="3" name="Graphic 2">
+            <a:extLst>
+              <a:ext uri="{FF2B5EF4-FFF2-40B4-BE49-F238E27FC236}">
+                <a16:creationId xmlns:a16="http://schemas.microsoft.com/office/drawing/2014/main" id="{FC9AAB8D-7F9C-47CA-9DF7-21776CFA04C7}"/>
               </a:ext>
             </a:extLst>
           </p:cNvPr>
@@ -11449,15 +13321,24 @@
           <p:nvPr/>
         </p:nvPicPr>
         <p:blipFill>
-          <a:blip r:embed="rId2"/>
+          <a:blip r:embed="rId2">
+            <a:extLst>
+              <a:ext uri="{28A0092B-C50C-407E-A947-70E740481C1C}">
+                <a14:useLocalDpi xmlns:a14="http://schemas.microsoft.com/office/drawing/2010/main" val="0"/>
+              </a:ext>
+              <a:ext uri="{96DAC541-7B7A-43D3-8B79-37D633B846F1}">
+                <asvg:svgBlip xmlns:asvg="http://schemas.microsoft.com/office/drawing/2016/SVG/main" r:embed="rId3"/>
+              </a:ext>
+            </a:extLst>
+          </a:blip>
           <a:stretch>
             <a:fillRect/>
           </a:stretch>
         </p:blipFill>
         <p:spPr>
           <a:xfrm>
-            <a:off x="2369390" y="0"/>
-            <a:ext cx="7453220" cy="6858000"/>
+            <a:off x="2654968" y="-12032"/>
+            <a:ext cx="6882064" cy="6882064"/>
           </a:xfrm>
           <a:prstGeom prst="rect">
             <a:avLst/>
@@ -11551,7 +13432,7 @@
                 </a:effectLst>
                 <a:latin typeface="Segoe UI Light"/>
               </a:rPr>
-              <a:t>Cosmos DB</a:t>
+              <a:t>MySQL</a:t>
             </a:r>
           </a:p>
         </p:txBody>
@@ -11559,7 +13440,7 @@
     </p:spTree>
     <p:extLst>
       <p:ext uri="{BB962C8B-B14F-4D97-AF65-F5344CB8AC3E}">
-        <p14:creationId xmlns:p14="http://schemas.microsoft.com/office/powerpoint/2010/main" val="2680484976"/>
+        <p14:creationId xmlns:p14="http://schemas.microsoft.com/office/powerpoint/2010/main" val="1265217250"/>
       </p:ext>
     </p:extLst>
   </p:cSld>
@@ -11658,6 +13539,16 @@
 <file path=ppt/slides/slide8.xml><?xml version="1.0" encoding="utf-8"?>
 <p:sld xmlns:a="http://schemas.openxmlformats.org/drawingml/2006/main" xmlns:r="http://schemas.openxmlformats.org/officeDocument/2006/relationships" xmlns:p="http://schemas.openxmlformats.org/presentationml/2006/main">
   <p:cSld>
+    <p:bg>
+      <p:bgPr>
+        <a:solidFill>
+          <a:schemeClr val="bg1">
+            <a:alpha val="50000"/>
+          </a:schemeClr>
+        </a:solidFill>
+        <a:effectLst/>
+      </p:bgPr>
+    </p:bg>
     <p:spTree>
       <p:nvGrpSpPr>
         <p:cNvPr id="1" name=""/>
@@ -11674,10 +13565,10 @@
       </p:grpSpPr>
       <p:pic>
         <p:nvPicPr>
-          <p:cNvPr id="3" name="Picture 2">
-            <a:extLst>
-              <a:ext uri="{FF2B5EF4-FFF2-40B4-BE49-F238E27FC236}">
-                <a16:creationId xmlns:a16="http://schemas.microsoft.com/office/drawing/2014/main" id="{91BCAE1B-13BF-4A38-9C19-FCFC3FCC9F2A}"/>
+          <p:cNvPr id="4" name="Graphic 3">
+            <a:extLst>
+              <a:ext uri="{FF2B5EF4-FFF2-40B4-BE49-F238E27FC236}">
+                <a16:creationId xmlns:a16="http://schemas.microsoft.com/office/drawing/2014/main" id="{C589B353-B88D-4762-976D-F8598CB25EB8}"/>
               </a:ext>
             </a:extLst>
           </p:cNvPr>
@@ -11686,46 +13577,24 @@
           </p:cNvPicPr>
           <p:nvPr/>
         </p:nvPicPr>
-        <p:blipFill>
-          <a:blip r:embed="rId2"/>
-          <a:stretch>
-            <a:fillRect/>
-          </a:stretch>
+        <p:blipFill rotWithShape="1">
+          <a:blip r:embed="rId2">
+            <a:extLst>
+              <a:ext uri="{28A0092B-C50C-407E-A947-70E740481C1C}">
+                <a14:useLocalDpi xmlns:a14="http://schemas.microsoft.com/office/drawing/2010/main" val="0"/>
+              </a:ext>
+              <a:ext uri="{96DAC541-7B7A-43D3-8B79-37D633B846F1}">
+                <asvg:svgBlip xmlns:asvg="http://schemas.microsoft.com/office/drawing/2016/SVG/main" r:embed="rId3"/>
+              </a:ext>
+            </a:extLst>
+          </a:blip>
+          <a:srcRect b="4420"/>
+          <a:stretch/>
         </p:blipFill>
         <p:spPr>
           <a:xfrm>
-            <a:off x="2984692" y="0"/>
-            <a:ext cx="6222616" cy="6858000"/>
-          </a:xfrm>
-          <a:prstGeom prst="rect">
-            <a:avLst/>
-          </a:prstGeom>
-        </p:spPr>
-      </p:pic>
-      <p:pic>
-        <p:nvPicPr>
-          <p:cNvPr id="2" name="Picture 1">
-            <a:extLst>
-              <a:ext uri="{FF2B5EF4-FFF2-40B4-BE49-F238E27FC236}">
-                <a16:creationId xmlns:a16="http://schemas.microsoft.com/office/drawing/2014/main" id="{BD22FAD6-D41E-4384-9708-1EB110A619B8}"/>
-              </a:ext>
-            </a:extLst>
-          </p:cNvPr>
-          <p:cNvPicPr>
-            <a:picLocks noChangeAspect="1"/>
-          </p:cNvPicPr>
-          <p:nvPr/>
-        </p:nvPicPr>
-        <p:blipFill>
-          <a:blip r:embed="rId3"/>
-          <a:stretch>
-            <a:fillRect/>
-          </a:stretch>
-        </p:blipFill>
-        <p:spPr>
-          <a:xfrm>
-            <a:off x="0" y="5666361"/>
-            <a:ext cx="1295064" cy="1191639"/>
+            <a:off x="2517231" y="16816"/>
+            <a:ext cx="7157537" cy="6841184"/>
           </a:xfrm>
           <a:prstGeom prst="rect">
             <a:avLst/>
@@ -11819,44 +13688,15 @@
                 </a:effectLst>
                 <a:latin typeface="Segoe UI Light"/>
               </a:rPr>
-              <a:t>Gremlin API for </a:t>
+              <a:t>Virtual Machine</a:t>
             </a:r>
-            <a:r>
-              <a:rPr lang="en-GB" sz="7200" b="1" dirty="0" err="1">
-                <a:solidFill>
-                  <a:schemeClr val="tx1"/>
-                </a:solidFill>
-                <a:effectLst>
-                  <a:outerShdw blurRad="38100" dist="38100" dir="2700000" algn="tl">
-                    <a:srgbClr val="000000">
-                      <a:alpha val="43137"/>
-                    </a:srgbClr>
-                  </a:outerShdw>
-                </a:effectLst>
-                <a:latin typeface="Segoe UI Light"/>
-              </a:rPr>
-              <a:t>CosmosDB</a:t>
-            </a:r>
-            <a:endParaRPr lang="en-GB" sz="7200" b="1" dirty="0">
-              <a:solidFill>
-                <a:schemeClr val="tx1"/>
-              </a:solidFill>
-              <a:effectLst>
-                <a:outerShdw blurRad="38100" dist="38100" dir="2700000" algn="tl">
-                  <a:srgbClr val="000000">
-                    <a:alpha val="43137"/>
-                  </a:srgbClr>
-                </a:outerShdw>
-              </a:effectLst>
-              <a:latin typeface="Segoe UI Light"/>
-            </a:endParaRPr>
           </a:p>
         </p:txBody>
       </p:sp>
     </p:spTree>
     <p:extLst>
       <p:ext uri="{BB962C8B-B14F-4D97-AF65-F5344CB8AC3E}">
-        <p14:creationId xmlns:p14="http://schemas.microsoft.com/office/powerpoint/2010/main" val="2222739253"/>
+        <p14:creationId xmlns:p14="http://schemas.microsoft.com/office/powerpoint/2010/main" val="3980733746"/>
       </p:ext>
     </p:extLst>
   </p:cSld>
@@ -11918,41 +13758,6 @@
                                   </p:childTnLst>
                                 </p:cTn>
                               </p:par>
-                              <p:par>
-                                <p:cTn id="8" presetID="10" presetClass="entr" presetSubtype="0" fill="hold" nodeType="withEffect">
-                                  <p:stCondLst>
-                                    <p:cond delay="0"/>
-                                  </p:stCondLst>
-                                  <p:childTnLst>
-                                    <p:set>
-                                      <p:cBhvr>
-                                        <p:cTn id="9" dur="1" fill="hold">
-                                          <p:stCondLst>
-                                            <p:cond delay="0"/>
-                                          </p:stCondLst>
-                                        </p:cTn>
-                                        <p:tgtEl>
-                                          <p:spTgt spid="2"/>
-                                        </p:tgtEl>
-                                        <p:attrNameLst>
-                                          <p:attrName>style.visibility</p:attrName>
-                                        </p:attrNameLst>
-                                      </p:cBhvr>
-                                      <p:to>
-                                        <p:strVal val="visible"/>
-                                      </p:to>
-                                    </p:set>
-                                    <p:animEffect transition="in" filter="fade">
-                                      <p:cBhvr>
-                                        <p:cTn id="10" dur="500"/>
-                                        <p:tgtEl>
-                                          <p:spTgt spid="2"/>
-                                        </p:tgtEl>
-                                      </p:cBhvr>
-                                    </p:animEffect>
-                                  </p:childTnLst>
-                                </p:cTn>
-                              </p:par>
                             </p:childTnLst>
                           </p:cTn>
                         </p:par>
@@ -11990,16 +13795,6 @@
 <file path=ppt/slides/slide9.xml><?xml version="1.0" encoding="utf-8"?>
 <p:sld xmlns:a="http://schemas.openxmlformats.org/drawingml/2006/main" xmlns:r="http://schemas.openxmlformats.org/officeDocument/2006/relationships" xmlns:p="http://schemas.openxmlformats.org/presentationml/2006/main">
   <p:cSld>
-    <p:bg>
-      <p:bgPr>
-        <a:solidFill>
-          <a:schemeClr val="bg1">
-            <a:alpha val="50000"/>
-          </a:schemeClr>
-        </a:solidFill>
-        <a:effectLst/>
-      </p:bgPr>
-    </p:bg>
     <p:spTree>
       <p:nvGrpSpPr>
         <p:cNvPr id="1" name=""/>
@@ -12016,10 +13811,10 @@
       </p:grpSpPr>
       <p:pic>
         <p:nvPicPr>
-          <p:cNvPr id="3" name="Picture 2">
-            <a:extLst>
-              <a:ext uri="{FF2B5EF4-FFF2-40B4-BE49-F238E27FC236}">
-                <a16:creationId xmlns:a16="http://schemas.microsoft.com/office/drawing/2014/main" id="{9A68ECC0-C578-4F42-8AD2-063ED47D4C68}"/>
+          <p:cNvPr id="4" name="Graphic 3">
+            <a:extLst>
+              <a:ext uri="{FF2B5EF4-FFF2-40B4-BE49-F238E27FC236}">
+                <a16:creationId xmlns:a16="http://schemas.microsoft.com/office/drawing/2014/main" id="{659F58BE-AE0E-45E2-800B-5BC4C433537D}"/>
               </a:ext>
             </a:extLst>
           </p:cNvPr>
@@ -12029,15 +13824,24 @@
           <p:nvPr/>
         </p:nvPicPr>
         <p:blipFill>
-          <a:blip r:embed="rId2"/>
+          <a:blip r:embed="rId2">
+            <a:extLst>
+              <a:ext uri="{28A0092B-C50C-407E-A947-70E740481C1C}">
+                <a14:useLocalDpi xmlns:a14="http://schemas.microsoft.com/office/drawing/2010/main" val="0"/>
+              </a:ext>
+              <a:ext uri="{96DAC541-7B7A-43D3-8B79-37D633B846F1}">
+                <asvg:svgBlip xmlns:asvg="http://schemas.microsoft.com/office/drawing/2016/SVG/main" r:embed="rId3"/>
+              </a:ext>
+            </a:extLst>
+          </a:blip>
           <a:stretch>
             <a:fillRect/>
           </a:stretch>
         </p:blipFill>
         <p:spPr>
           <a:xfrm>
-            <a:off x="2719734" y="56666"/>
-            <a:ext cx="6752532" cy="6744667"/>
+            <a:off x="2687053" y="40106"/>
+            <a:ext cx="6817894" cy="6817894"/>
           </a:xfrm>
           <a:prstGeom prst="rect">
             <a:avLst/>
@@ -12131,7 +13935,7 @@
                 </a:effectLst>
                 <a:latin typeface="Segoe UI Light"/>
               </a:rPr>
-              <a:t>Azure Active Directory</a:t>
+              <a:t>Cosmos DB</a:t>
             </a:r>
           </a:p>
         </p:txBody>
@@ -12139,7 +13943,7 @@
     </p:spTree>
     <p:extLst>
       <p:ext uri="{BB962C8B-B14F-4D97-AF65-F5344CB8AC3E}">
-        <p14:creationId xmlns:p14="http://schemas.microsoft.com/office/powerpoint/2010/main" val="2470710082"/>
+        <p14:creationId xmlns:p14="http://schemas.microsoft.com/office/powerpoint/2010/main" val="2680484976"/>
       </p:ext>
     </p:extLst>
   </p:cSld>

</xml_diff>